<commit_message>
Update Data-Engineering Blog - 2
</commit_message>
<xml_diff>
--- a/#Data-Engineering/DataEngineering.pptx
+++ b/#Data-Engineering/DataEngineering.pptx
@@ -12,6 +12,7 @@
     <p:sldId id="261" r:id="rId6"/>
     <p:sldId id="262" r:id="rId7"/>
     <p:sldId id="263" r:id="rId8"/>
+    <p:sldId id="264" r:id="rId9"/>
   </p:sldIdLst>
   <p:sldSz cx="12192000" cy="6858000"/>
   <p:notesSz cx="6858000" cy="9144000"/>
@@ -8897,6 +8898,324 @@
 </p:sld>
 </file>
 
+<file path=ppt/slides/slide8.xml><?xml version="1.0" encoding="utf-8"?>
+<p:sld xmlns:a="http://schemas.openxmlformats.org/drawingml/2006/main" xmlns:r="http://schemas.openxmlformats.org/officeDocument/2006/relationships" xmlns:p="http://schemas.openxmlformats.org/presentationml/2006/main">
+  <p:cSld>
+    <p:spTree>
+      <p:nvGrpSpPr>
+        <p:cNvPr id="1" name=""/>
+        <p:cNvGrpSpPr/>
+        <p:nvPr/>
+      </p:nvGrpSpPr>
+      <p:grpSpPr>
+        <a:xfrm>
+          <a:off x="0" y="0"/>
+          <a:ext cx="0" cy="0"/>
+          <a:chOff x="0" y="0"/>
+          <a:chExt cx="0" cy="0"/>
+        </a:xfrm>
+      </p:grpSpPr>
+      <p:pic>
+        <p:nvPicPr>
+          <p:cNvPr id="9" name="Imagem 8">
+            <a:extLst>
+              <a:ext uri="{FF2B5EF4-FFF2-40B4-BE49-F238E27FC236}">
+                <a16:creationId xmlns:a16="http://schemas.microsoft.com/office/drawing/2014/main" id="{AC124EA9-E973-4D6C-9CBF-A31A61E90394}"/>
+              </a:ext>
+            </a:extLst>
+          </p:cNvPr>
+          <p:cNvPicPr>
+            <a:picLocks noChangeAspect="1"/>
+          </p:cNvPicPr>
+          <p:nvPr/>
+        </p:nvPicPr>
+        <p:blipFill>
+          <a:blip r:embed="rId2"/>
+          <a:stretch>
+            <a:fillRect/>
+          </a:stretch>
+        </p:blipFill>
+        <p:spPr>
+          <a:xfrm>
+            <a:off x="0" y="0"/>
+            <a:ext cx="12192001" cy="6858001"/>
+          </a:xfrm>
+          <a:prstGeom prst="rect">
+            <a:avLst/>
+          </a:prstGeom>
+        </p:spPr>
+      </p:pic>
+      <p:sp>
+        <p:nvSpPr>
+          <p:cNvPr id="12" name="Retângulo 11">
+            <a:extLst>
+              <a:ext uri="{FF2B5EF4-FFF2-40B4-BE49-F238E27FC236}">
+                <a16:creationId xmlns:a16="http://schemas.microsoft.com/office/drawing/2014/main" id="{FF470781-876F-4106-AEC7-264985113BB3}"/>
+              </a:ext>
+            </a:extLst>
+          </p:cNvPr>
+          <p:cNvSpPr/>
+          <p:nvPr/>
+        </p:nvSpPr>
+        <p:spPr>
+          <a:xfrm>
+            <a:off x="1537855" y="166255"/>
+            <a:ext cx="9116290" cy="623454"/>
+          </a:xfrm>
+          <a:prstGeom prst="rect">
+            <a:avLst/>
+          </a:prstGeom>
+          <a:solidFill>
+            <a:srgbClr val="050A06"/>
+          </a:solidFill>
+          <a:ln>
+            <a:noFill/>
+          </a:ln>
+        </p:spPr>
+        <p:style>
+          <a:lnRef idx="2">
+            <a:schemeClr val="accent1">
+              <a:shade val="50000"/>
+            </a:schemeClr>
+          </a:lnRef>
+          <a:fillRef idx="1">
+            <a:schemeClr val="accent1"/>
+          </a:fillRef>
+          <a:effectRef idx="0">
+            <a:schemeClr val="accent1"/>
+          </a:effectRef>
+          <a:fontRef idx="minor">
+            <a:schemeClr val="lt1"/>
+          </a:fontRef>
+        </p:style>
+        <p:txBody>
+          <a:bodyPr rtlCol="0" anchor="ctr"/>
+          <a:lstStyle/>
+          <a:p>
+            <a:pPr algn="ctr"/>
+            <a:endParaRPr lang="pt-BR"/>
+          </a:p>
+        </p:txBody>
+      </p:sp>
+      <p:sp>
+        <p:nvSpPr>
+          <p:cNvPr id="13" name="Retângulo 12">
+            <a:extLst>
+              <a:ext uri="{FF2B5EF4-FFF2-40B4-BE49-F238E27FC236}">
+                <a16:creationId xmlns:a16="http://schemas.microsoft.com/office/drawing/2014/main" id="{F14ABDAC-6A60-4E2C-9C6C-D953F5F8E282}"/>
+              </a:ext>
+            </a:extLst>
+          </p:cNvPr>
+          <p:cNvSpPr/>
+          <p:nvPr/>
+        </p:nvSpPr>
+        <p:spPr>
+          <a:xfrm>
+            <a:off x="1690255" y="3276601"/>
+            <a:ext cx="9116290" cy="1614054"/>
+          </a:xfrm>
+          <a:prstGeom prst="rect">
+            <a:avLst/>
+          </a:prstGeom>
+          <a:solidFill>
+            <a:srgbClr val="050A06"/>
+          </a:solidFill>
+          <a:ln>
+            <a:noFill/>
+          </a:ln>
+        </p:spPr>
+        <p:style>
+          <a:lnRef idx="2">
+            <a:schemeClr val="accent1">
+              <a:shade val="50000"/>
+            </a:schemeClr>
+          </a:lnRef>
+          <a:fillRef idx="1">
+            <a:schemeClr val="accent1"/>
+          </a:fillRef>
+          <a:effectRef idx="0">
+            <a:schemeClr val="accent1"/>
+          </a:effectRef>
+          <a:fontRef idx="minor">
+            <a:schemeClr val="lt1"/>
+          </a:fontRef>
+        </p:style>
+        <p:txBody>
+          <a:bodyPr rtlCol="0" anchor="ctr"/>
+          <a:lstStyle/>
+          <a:p>
+            <a:pPr algn="ctr"/>
+            <a:endParaRPr lang="pt-BR"/>
+          </a:p>
+        </p:txBody>
+      </p:sp>
+      <p:sp>
+        <p:nvSpPr>
+          <p:cNvPr id="11" name="CaixaDeTexto 10">
+            <a:extLst>
+              <a:ext uri="{FF2B5EF4-FFF2-40B4-BE49-F238E27FC236}">
+                <a16:creationId xmlns:a16="http://schemas.microsoft.com/office/drawing/2014/main" id="{CEE40587-9DD0-4E38-BA7E-5062283D6D54}"/>
+              </a:ext>
+            </a:extLst>
+          </p:cNvPr>
+          <p:cNvSpPr txBox="1"/>
+          <p:nvPr/>
+        </p:nvSpPr>
+        <p:spPr>
+          <a:xfrm>
+            <a:off x="0" y="204934"/>
+            <a:ext cx="12191999" cy="707886"/>
+          </a:xfrm>
+          <a:prstGeom prst="rect">
+            <a:avLst/>
+          </a:prstGeom>
+          <a:noFill/>
+        </p:spPr>
+        <p:txBody>
+          <a:bodyPr wrap="square">
+            <a:spAutoFit/>
+          </a:bodyPr>
+          <a:lstStyle/>
+          <a:p>
+            <a:pPr algn="ctr"/>
+            <a:r>
+              <a:rPr lang="pt-BR" sz="4000" b="1" i="0" dirty="0" err="1">
+                <a:solidFill>
+                  <a:schemeClr val="bg1">
+                    <a:lumMod val="95000"/>
+                  </a:schemeClr>
+                </a:solidFill>
+                <a:effectLst>
+                  <a:outerShdw blurRad="38100" dist="38100" dir="2700000" algn="tl">
+                    <a:srgbClr val="000000">
+                      <a:alpha val="43137"/>
+                    </a:srgbClr>
+                  </a:outerShdw>
+                </a:effectLst>
+                <a:latin typeface="DINPro"/>
+              </a:rPr>
+              <a:t>MLOps</a:t>
+            </a:r>
+            <a:r>
+              <a:rPr lang="pt-BR" sz="4000" b="1" i="0" dirty="0">
+                <a:solidFill>
+                  <a:schemeClr val="bg1">
+                    <a:lumMod val="95000"/>
+                  </a:schemeClr>
+                </a:solidFill>
+                <a:effectLst>
+                  <a:outerShdw blurRad="38100" dist="38100" dir="2700000" algn="tl">
+                    <a:srgbClr val="000000">
+                      <a:alpha val="43137"/>
+                    </a:srgbClr>
+                  </a:outerShdw>
+                </a:effectLst>
+                <a:latin typeface="DINPro"/>
+              </a:rPr>
+              <a:t> (</a:t>
+            </a:r>
+            <a:r>
+              <a:rPr lang="pt-BR" sz="4000" b="1" i="0" dirty="0" err="1">
+                <a:solidFill>
+                  <a:schemeClr val="bg1">
+                    <a:lumMod val="95000"/>
+                  </a:schemeClr>
+                </a:solidFill>
+                <a:effectLst>
+                  <a:outerShdw blurRad="38100" dist="38100" dir="2700000" algn="tl">
+                    <a:srgbClr val="000000">
+                      <a:alpha val="43137"/>
+                    </a:srgbClr>
+                  </a:outerShdw>
+                </a:effectLst>
+                <a:latin typeface="DINPro"/>
+              </a:rPr>
+              <a:t>Machine</a:t>
+            </a:r>
+            <a:r>
+              <a:rPr lang="pt-BR" sz="4000" b="1" i="0" dirty="0">
+                <a:solidFill>
+                  <a:schemeClr val="bg1">
+                    <a:lumMod val="95000"/>
+                  </a:schemeClr>
+                </a:solidFill>
+                <a:effectLst>
+                  <a:outerShdw blurRad="38100" dist="38100" dir="2700000" algn="tl">
+                    <a:srgbClr val="000000">
+                      <a:alpha val="43137"/>
+                    </a:srgbClr>
+                  </a:outerShdw>
+                </a:effectLst>
+                <a:latin typeface="DINPro"/>
+              </a:rPr>
+              <a:t> Learning </a:t>
+            </a:r>
+            <a:r>
+              <a:rPr lang="pt-BR" sz="4000" b="1" i="0" dirty="0" err="1">
+                <a:solidFill>
+                  <a:schemeClr val="bg1">
+                    <a:lumMod val="95000"/>
+                  </a:schemeClr>
+                </a:solidFill>
+                <a:effectLst>
+                  <a:outerShdw blurRad="38100" dist="38100" dir="2700000" algn="tl">
+                    <a:srgbClr val="000000">
+                      <a:alpha val="43137"/>
+                    </a:srgbClr>
+                  </a:outerShdw>
+                </a:effectLst>
+                <a:latin typeface="DINPro"/>
+              </a:rPr>
+              <a:t>Operations</a:t>
+            </a:r>
+            <a:r>
+              <a:rPr lang="pt-BR" sz="4000" b="1" i="0" dirty="0">
+                <a:solidFill>
+                  <a:schemeClr val="bg1">
+                    <a:lumMod val="95000"/>
+                  </a:schemeClr>
+                </a:solidFill>
+                <a:effectLst>
+                  <a:outerShdw blurRad="38100" dist="38100" dir="2700000" algn="tl">
+                    <a:srgbClr val="000000">
+                      <a:alpha val="43137"/>
+                    </a:srgbClr>
+                  </a:outerShdw>
+                </a:effectLst>
+                <a:latin typeface="DINPro"/>
+              </a:rPr>
+              <a:t>)</a:t>
+            </a:r>
+            <a:endParaRPr lang="pt-BR" sz="4000" b="1" dirty="0">
+              <a:solidFill>
+                <a:schemeClr val="bg1">
+                  <a:lumMod val="95000"/>
+                </a:schemeClr>
+              </a:solidFill>
+              <a:effectLst>
+                <a:outerShdw blurRad="38100" dist="38100" dir="2700000" algn="tl">
+                  <a:srgbClr val="000000">
+                    <a:alpha val="43137"/>
+                  </a:srgbClr>
+                </a:outerShdw>
+              </a:effectLst>
+            </a:endParaRPr>
+          </a:p>
+        </p:txBody>
+      </p:sp>
+    </p:spTree>
+    <p:extLst>
+      <p:ext uri="{BB962C8B-B14F-4D97-AF65-F5344CB8AC3E}">
+        <p14:creationId xmlns:p14="http://schemas.microsoft.com/office/powerpoint/2010/main" val="280906793"/>
+      </p:ext>
+    </p:extLst>
+  </p:cSld>
+  <p:clrMapOvr>
+    <a:masterClrMapping/>
+  </p:clrMapOvr>
+</p:sld>
+</file>
+
 <file path=ppt/theme/theme1.xml><?xml version="1.0" encoding="utf-8"?>
 <a:theme xmlns:a="http://schemas.openxmlformats.org/drawingml/2006/main" name="Tema do Office">
   <a:themeElements>

</xml_diff>

<commit_message>
Update Data-Engineering Blog - 5
</commit_message>
<xml_diff>
--- a/#Data-Engineering/DataEngineering.pptx
+++ b/#Data-Engineering/DataEngineering.pptx
@@ -16,6 +16,8 @@
     <p:sldId id="265" r:id="rId10"/>
     <p:sldId id="266" r:id="rId11"/>
     <p:sldId id="267" r:id="rId12"/>
+    <p:sldId id="268" r:id="rId13"/>
+    <p:sldId id="269" r:id="rId14"/>
   </p:sldIdLst>
   <p:sldSz cx="12192000" cy="6858000"/>
   <p:notesSz cx="6858000" cy="9144000"/>
@@ -9542,6 +9544,3433 @@
 </p:sld>
 </file>
 
+<file path=ppt/slides/slide12.xml><?xml version="1.0" encoding="utf-8"?>
+<p:sld xmlns:a="http://schemas.openxmlformats.org/drawingml/2006/main" xmlns:r="http://schemas.openxmlformats.org/officeDocument/2006/relationships" xmlns:p="http://schemas.openxmlformats.org/presentationml/2006/main">
+  <p:cSld>
+    <p:spTree>
+      <p:nvGrpSpPr>
+        <p:cNvPr id="1" name=""/>
+        <p:cNvGrpSpPr/>
+        <p:nvPr/>
+      </p:nvGrpSpPr>
+      <p:grpSpPr>
+        <a:xfrm>
+          <a:off x="0" y="0"/>
+          <a:ext cx="0" cy="0"/>
+          <a:chOff x="0" y="0"/>
+          <a:chExt cx="0" cy="0"/>
+        </a:xfrm>
+      </p:grpSpPr>
+      <p:pic>
+        <p:nvPicPr>
+          <p:cNvPr id="9" name="Imagem 8">
+            <a:extLst>
+              <a:ext uri="{FF2B5EF4-FFF2-40B4-BE49-F238E27FC236}">
+                <a16:creationId xmlns:a16="http://schemas.microsoft.com/office/drawing/2014/main" id="{AC124EA9-E973-4D6C-9CBF-A31A61E90394}"/>
+              </a:ext>
+            </a:extLst>
+          </p:cNvPr>
+          <p:cNvPicPr>
+            <a:picLocks noChangeAspect="1"/>
+          </p:cNvPicPr>
+          <p:nvPr/>
+        </p:nvPicPr>
+        <p:blipFill>
+          <a:blip r:embed="rId2"/>
+          <a:stretch>
+            <a:fillRect/>
+          </a:stretch>
+        </p:blipFill>
+        <p:spPr>
+          <a:xfrm>
+            <a:off x="0" y="0"/>
+            <a:ext cx="12192001" cy="6858001"/>
+          </a:xfrm>
+          <a:prstGeom prst="rect">
+            <a:avLst/>
+          </a:prstGeom>
+        </p:spPr>
+      </p:pic>
+      <p:sp>
+        <p:nvSpPr>
+          <p:cNvPr id="12" name="Retângulo 11">
+            <a:extLst>
+              <a:ext uri="{FF2B5EF4-FFF2-40B4-BE49-F238E27FC236}">
+                <a16:creationId xmlns:a16="http://schemas.microsoft.com/office/drawing/2014/main" id="{FF470781-876F-4106-AEC7-264985113BB3}"/>
+              </a:ext>
+            </a:extLst>
+          </p:cNvPr>
+          <p:cNvSpPr/>
+          <p:nvPr/>
+        </p:nvSpPr>
+        <p:spPr>
+          <a:xfrm>
+            <a:off x="1537855" y="166255"/>
+            <a:ext cx="9116290" cy="623454"/>
+          </a:xfrm>
+          <a:prstGeom prst="rect">
+            <a:avLst/>
+          </a:prstGeom>
+          <a:solidFill>
+            <a:srgbClr val="050A06"/>
+          </a:solidFill>
+          <a:ln>
+            <a:noFill/>
+          </a:ln>
+        </p:spPr>
+        <p:style>
+          <a:lnRef idx="2">
+            <a:schemeClr val="accent1">
+              <a:shade val="50000"/>
+            </a:schemeClr>
+          </a:lnRef>
+          <a:fillRef idx="1">
+            <a:schemeClr val="accent1"/>
+          </a:fillRef>
+          <a:effectRef idx="0">
+            <a:schemeClr val="accent1"/>
+          </a:effectRef>
+          <a:fontRef idx="minor">
+            <a:schemeClr val="lt1"/>
+          </a:fontRef>
+        </p:style>
+        <p:txBody>
+          <a:bodyPr rtlCol="0" anchor="ctr"/>
+          <a:lstStyle/>
+          <a:p>
+            <a:pPr algn="ctr"/>
+            <a:endParaRPr lang="pt-BR"/>
+          </a:p>
+        </p:txBody>
+      </p:sp>
+      <p:sp>
+        <p:nvSpPr>
+          <p:cNvPr id="13" name="Retângulo 12">
+            <a:extLst>
+              <a:ext uri="{FF2B5EF4-FFF2-40B4-BE49-F238E27FC236}">
+                <a16:creationId xmlns:a16="http://schemas.microsoft.com/office/drawing/2014/main" id="{F14ABDAC-6A60-4E2C-9C6C-D953F5F8E282}"/>
+              </a:ext>
+            </a:extLst>
+          </p:cNvPr>
+          <p:cNvSpPr/>
+          <p:nvPr/>
+        </p:nvSpPr>
+        <p:spPr>
+          <a:xfrm>
+            <a:off x="1690255" y="3276601"/>
+            <a:ext cx="9116290" cy="1614054"/>
+          </a:xfrm>
+          <a:prstGeom prst="rect">
+            <a:avLst/>
+          </a:prstGeom>
+          <a:solidFill>
+            <a:srgbClr val="050A06"/>
+          </a:solidFill>
+          <a:ln>
+            <a:noFill/>
+          </a:ln>
+        </p:spPr>
+        <p:style>
+          <a:lnRef idx="2">
+            <a:schemeClr val="accent1">
+              <a:shade val="50000"/>
+            </a:schemeClr>
+          </a:lnRef>
+          <a:fillRef idx="1">
+            <a:schemeClr val="accent1"/>
+          </a:fillRef>
+          <a:effectRef idx="0">
+            <a:schemeClr val="accent1"/>
+          </a:effectRef>
+          <a:fontRef idx="minor">
+            <a:schemeClr val="lt1"/>
+          </a:fontRef>
+        </p:style>
+        <p:txBody>
+          <a:bodyPr rtlCol="0" anchor="ctr"/>
+          <a:lstStyle/>
+          <a:p>
+            <a:pPr algn="ctr"/>
+            <a:endParaRPr lang="pt-BR" dirty="0"/>
+          </a:p>
+        </p:txBody>
+      </p:sp>
+      <p:sp>
+        <p:nvSpPr>
+          <p:cNvPr id="11" name="CaixaDeTexto 10">
+            <a:extLst>
+              <a:ext uri="{FF2B5EF4-FFF2-40B4-BE49-F238E27FC236}">
+                <a16:creationId xmlns:a16="http://schemas.microsoft.com/office/drawing/2014/main" id="{CEE40587-9DD0-4E38-BA7E-5062283D6D54}"/>
+              </a:ext>
+            </a:extLst>
+          </p:cNvPr>
+          <p:cNvSpPr txBox="1"/>
+          <p:nvPr/>
+        </p:nvSpPr>
+        <p:spPr>
+          <a:xfrm>
+            <a:off x="-8021" y="76557"/>
+            <a:ext cx="12191999" cy="707886"/>
+          </a:xfrm>
+          <a:prstGeom prst="rect">
+            <a:avLst/>
+          </a:prstGeom>
+          <a:noFill/>
+        </p:spPr>
+        <p:txBody>
+          <a:bodyPr wrap="square">
+            <a:spAutoFit/>
+          </a:bodyPr>
+          <a:lstStyle/>
+          <a:p>
+            <a:pPr algn="ctr"/>
+            <a:r>
+              <a:rPr lang="pt-BR" sz="4000" b="1" i="0" dirty="0" err="1">
+                <a:solidFill>
+                  <a:schemeClr val="bg1">
+                    <a:lumMod val="95000"/>
+                  </a:schemeClr>
+                </a:solidFill>
+                <a:effectLst>
+                  <a:outerShdw blurRad="38100" dist="38100" dir="2700000" algn="tl">
+                    <a:srgbClr val="000000">
+                      <a:alpha val="43137"/>
+                    </a:srgbClr>
+                  </a:outerShdw>
+                </a:effectLst>
+                <a:latin typeface="DINPro"/>
+              </a:rPr>
+              <a:t>MLOps</a:t>
+            </a:r>
+            <a:r>
+              <a:rPr lang="pt-BR" sz="4000" b="1" i="0" dirty="0">
+                <a:solidFill>
+                  <a:schemeClr val="bg1">
+                    <a:lumMod val="95000"/>
+                  </a:schemeClr>
+                </a:solidFill>
+                <a:effectLst>
+                  <a:outerShdw blurRad="38100" dist="38100" dir="2700000" algn="tl">
+                    <a:srgbClr val="000000">
+                      <a:alpha val="43137"/>
+                    </a:srgbClr>
+                  </a:outerShdw>
+                </a:effectLst>
+                <a:latin typeface="DINPro"/>
+              </a:rPr>
+              <a:t> (</a:t>
+            </a:r>
+            <a:r>
+              <a:rPr lang="pt-BR" sz="4000" b="1" i="0" dirty="0" err="1">
+                <a:solidFill>
+                  <a:schemeClr val="bg1">
+                    <a:lumMod val="95000"/>
+                  </a:schemeClr>
+                </a:solidFill>
+                <a:effectLst>
+                  <a:outerShdw blurRad="38100" dist="38100" dir="2700000" algn="tl">
+                    <a:srgbClr val="000000">
+                      <a:alpha val="43137"/>
+                    </a:srgbClr>
+                  </a:outerShdw>
+                </a:effectLst>
+                <a:latin typeface="DINPro"/>
+              </a:rPr>
+              <a:t>Machine</a:t>
+            </a:r>
+            <a:r>
+              <a:rPr lang="pt-BR" sz="4000" b="1" i="0" dirty="0">
+                <a:solidFill>
+                  <a:schemeClr val="bg1">
+                    <a:lumMod val="95000"/>
+                  </a:schemeClr>
+                </a:solidFill>
+                <a:effectLst>
+                  <a:outerShdw blurRad="38100" dist="38100" dir="2700000" algn="tl">
+                    <a:srgbClr val="000000">
+                      <a:alpha val="43137"/>
+                    </a:srgbClr>
+                  </a:outerShdw>
+                </a:effectLst>
+                <a:latin typeface="DINPro"/>
+              </a:rPr>
+              <a:t> Learning </a:t>
+            </a:r>
+            <a:r>
+              <a:rPr lang="pt-BR" sz="4000" b="1" i="0" dirty="0" err="1">
+                <a:solidFill>
+                  <a:schemeClr val="bg1">
+                    <a:lumMod val="95000"/>
+                  </a:schemeClr>
+                </a:solidFill>
+                <a:effectLst>
+                  <a:outerShdw blurRad="38100" dist="38100" dir="2700000" algn="tl">
+                    <a:srgbClr val="000000">
+                      <a:alpha val="43137"/>
+                    </a:srgbClr>
+                  </a:outerShdw>
+                </a:effectLst>
+                <a:latin typeface="DINPro"/>
+              </a:rPr>
+              <a:t>Operations</a:t>
+            </a:r>
+            <a:r>
+              <a:rPr lang="pt-BR" sz="4000" b="1" i="0" dirty="0">
+                <a:solidFill>
+                  <a:schemeClr val="bg1">
+                    <a:lumMod val="95000"/>
+                  </a:schemeClr>
+                </a:solidFill>
+                <a:effectLst>
+                  <a:outerShdw blurRad="38100" dist="38100" dir="2700000" algn="tl">
+                    <a:srgbClr val="000000">
+                      <a:alpha val="43137"/>
+                    </a:srgbClr>
+                  </a:outerShdw>
+                </a:effectLst>
+                <a:latin typeface="DINPro"/>
+              </a:rPr>
+              <a:t>)</a:t>
+            </a:r>
+            <a:endParaRPr lang="pt-BR" sz="4000" b="1" dirty="0">
+              <a:solidFill>
+                <a:schemeClr val="bg1">
+                  <a:lumMod val="95000"/>
+                </a:schemeClr>
+              </a:solidFill>
+              <a:effectLst>
+                <a:outerShdw blurRad="38100" dist="38100" dir="2700000" algn="tl">
+                  <a:srgbClr val="000000">
+                    <a:alpha val="43137"/>
+                  </a:srgbClr>
+                </a:outerShdw>
+              </a:effectLst>
+            </a:endParaRPr>
+          </a:p>
+        </p:txBody>
+      </p:sp>
+      <p:sp>
+        <p:nvSpPr>
+          <p:cNvPr id="2" name="Retângulo 1">
+            <a:extLst>
+              <a:ext uri="{FF2B5EF4-FFF2-40B4-BE49-F238E27FC236}">
+                <a16:creationId xmlns:a16="http://schemas.microsoft.com/office/drawing/2014/main" id="{A58A7D06-32DF-42F2-A57E-0FD275631085}"/>
+              </a:ext>
+            </a:extLst>
+          </p:cNvPr>
+          <p:cNvSpPr/>
+          <p:nvPr/>
+        </p:nvSpPr>
+        <p:spPr>
+          <a:xfrm>
+            <a:off x="496478" y="1652833"/>
+            <a:ext cx="1238055" cy="1134359"/>
+          </a:xfrm>
+          <a:prstGeom prst="rect">
+            <a:avLst/>
+          </a:prstGeom>
+          <a:solidFill>
+            <a:srgbClr val="7030A0"/>
+          </a:solidFill>
+          <a:ln>
+            <a:solidFill>
+              <a:schemeClr val="bg1"/>
+            </a:solidFill>
+          </a:ln>
+        </p:spPr>
+        <p:style>
+          <a:lnRef idx="2">
+            <a:schemeClr val="accent1">
+              <a:shade val="50000"/>
+            </a:schemeClr>
+          </a:lnRef>
+          <a:fillRef idx="1">
+            <a:schemeClr val="accent1"/>
+          </a:fillRef>
+          <a:effectRef idx="0">
+            <a:schemeClr val="accent1"/>
+          </a:effectRef>
+          <a:fontRef idx="minor">
+            <a:schemeClr val="lt1"/>
+          </a:fontRef>
+        </p:style>
+        <p:txBody>
+          <a:bodyPr rtlCol="0" anchor="ctr"/>
+          <a:lstStyle/>
+          <a:p>
+            <a:pPr algn="ctr"/>
+            <a:endParaRPr lang="pt-BR" dirty="0"/>
+          </a:p>
+        </p:txBody>
+      </p:sp>
+      <p:sp>
+        <p:nvSpPr>
+          <p:cNvPr id="3" name="CaixaDeTexto 2">
+            <a:extLst>
+              <a:ext uri="{FF2B5EF4-FFF2-40B4-BE49-F238E27FC236}">
+                <a16:creationId xmlns:a16="http://schemas.microsoft.com/office/drawing/2014/main" id="{243E2675-0305-4404-A36D-E03FF07CC656}"/>
+              </a:ext>
+            </a:extLst>
+          </p:cNvPr>
+          <p:cNvSpPr txBox="1"/>
+          <p:nvPr/>
+        </p:nvSpPr>
+        <p:spPr>
+          <a:xfrm>
+            <a:off x="554293" y="1896846"/>
+            <a:ext cx="1122423" cy="646331"/>
+          </a:xfrm>
+          <a:prstGeom prst="rect">
+            <a:avLst/>
+          </a:prstGeom>
+          <a:noFill/>
+        </p:spPr>
+        <p:txBody>
+          <a:bodyPr wrap="none" rtlCol="0">
+            <a:spAutoFit/>
+          </a:bodyPr>
+          <a:lstStyle/>
+          <a:p>
+            <a:pPr algn="ctr"/>
+            <a:r>
+              <a:rPr lang="pt-BR" dirty="0">
+                <a:solidFill>
+                  <a:schemeClr val="bg1">
+                    <a:lumMod val="95000"/>
+                  </a:schemeClr>
+                </a:solidFill>
+              </a:rPr>
+              <a:t>Data </a:t>
+            </a:r>
+          </a:p>
+          <a:p>
+            <a:pPr algn="ctr"/>
+            <a:r>
+              <a:rPr lang="pt-BR" dirty="0" err="1">
+                <a:solidFill>
+                  <a:schemeClr val="bg1">
+                    <a:lumMod val="95000"/>
+                  </a:schemeClr>
+                </a:solidFill>
+              </a:rPr>
+              <a:t>Collection</a:t>
+            </a:r>
+            <a:endParaRPr lang="pt-BR" dirty="0">
+              <a:solidFill>
+                <a:schemeClr val="bg1">
+                  <a:lumMod val="95000"/>
+                </a:schemeClr>
+              </a:solidFill>
+            </a:endParaRPr>
+          </a:p>
+        </p:txBody>
+      </p:sp>
+      <p:sp>
+        <p:nvSpPr>
+          <p:cNvPr id="8" name="Retângulo 7">
+            <a:extLst>
+              <a:ext uri="{FF2B5EF4-FFF2-40B4-BE49-F238E27FC236}">
+                <a16:creationId xmlns:a16="http://schemas.microsoft.com/office/drawing/2014/main" id="{B848930A-5F39-499B-A5F8-A031DAE3A283}"/>
+              </a:ext>
+            </a:extLst>
+          </p:cNvPr>
+          <p:cNvSpPr/>
+          <p:nvPr/>
+        </p:nvSpPr>
+        <p:spPr>
+          <a:xfrm>
+            <a:off x="2393457" y="1674370"/>
+            <a:ext cx="1238055" cy="1134359"/>
+          </a:xfrm>
+          <a:prstGeom prst="rect">
+            <a:avLst/>
+          </a:prstGeom>
+          <a:solidFill>
+            <a:srgbClr val="7030A0"/>
+          </a:solidFill>
+          <a:ln>
+            <a:solidFill>
+              <a:schemeClr val="bg1"/>
+            </a:solidFill>
+          </a:ln>
+        </p:spPr>
+        <p:style>
+          <a:lnRef idx="2">
+            <a:schemeClr val="accent1">
+              <a:shade val="50000"/>
+            </a:schemeClr>
+          </a:lnRef>
+          <a:fillRef idx="1">
+            <a:schemeClr val="accent1"/>
+          </a:fillRef>
+          <a:effectRef idx="0">
+            <a:schemeClr val="accent1"/>
+          </a:effectRef>
+          <a:fontRef idx="minor">
+            <a:schemeClr val="lt1"/>
+          </a:fontRef>
+        </p:style>
+        <p:txBody>
+          <a:bodyPr rtlCol="0" anchor="ctr"/>
+          <a:lstStyle/>
+          <a:p>
+            <a:pPr algn="ctr"/>
+            <a:endParaRPr lang="pt-BR" dirty="0"/>
+          </a:p>
+        </p:txBody>
+      </p:sp>
+      <p:sp>
+        <p:nvSpPr>
+          <p:cNvPr id="10" name="CaixaDeTexto 9">
+            <a:extLst>
+              <a:ext uri="{FF2B5EF4-FFF2-40B4-BE49-F238E27FC236}">
+                <a16:creationId xmlns:a16="http://schemas.microsoft.com/office/drawing/2014/main" id="{9A7B8C5B-A2F0-4365-87FC-03FD2EC8DF15}"/>
+              </a:ext>
+            </a:extLst>
+          </p:cNvPr>
+          <p:cNvSpPr txBox="1"/>
+          <p:nvPr/>
+        </p:nvSpPr>
+        <p:spPr>
+          <a:xfrm>
+            <a:off x="2488783" y="1896846"/>
+            <a:ext cx="1047403" cy="646331"/>
+          </a:xfrm>
+          <a:prstGeom prst="rect">
+            <a:avLst/>
+          </a:prstGeom>
+          <a:noFill/>
+        </p:spPr>
+        <p:txBody>
+          <a:bodyPr wrap="none" rtlCol="0">
+            <a:spAutoFit/>
+          </a:bodyPr>
+          <a:lstStyle/>
+          <a:p>
+            <a:pPr algn="ctr"/>
+            <a:r>
+              <a:rPr lang="pt-BR" dirty="0">
+                <a:solidFill>
+                  <a:schemeClr val="bg1">
+                    <a:lumMod val="95000"/>
+                  </a:schemeClr>
+                </a:solidFill>
+              </a:rPr>
+              <a:t>Data </a:t>
+            </a:r>
+          </a:p>
+          <a:p>
+            <a:pPr algn="ctr"/>
+            <a:r>
+              <a:rPr lang="pt-BR" dirty="0" err="1">
+                <a:solidFill>
+                  <a:schemeClr val="bg1">
+                    <a:lumMod val="95000"/>
+                  </a:schemeClr>
+                </a:solidFill>
+              </a:rPr>
+              <a:t>Ingestion</a:t>
+            </a:r>
+            <a:endParaRPr lang="pt-BR" dirty="0">
+              <a:solidFill>
+                <a:schemeClr val="bg1">
+                  <a:lumMod val="95000"/>
+                </a:schemeClr>
+              </a:solidFill>
+            </a:endParaRPr>
+          </a:p>
+        </p:txBody>
+      </p:sp>
+      <p:sp>
+        <p:nvSpPr>
+          <p:cNvPr id="14" name="Retângulo 13">
+            <a:extLst>
+              <a:ext uri="{FF2B5EF4-FFF2-40B4-BE49-F238E27FC236}">
+                <a16:creationId xmlns:a16="http://schemas.microsoft.com/office/drawing/2014/main" id="{F1028471-F5C5-499C-9CBB-953DAABBC78B}"/>
+              </a:ext>
+            </a:extLst>
+          </p:cNvPr>
+          <p:cNvSpPr/>
+          <p:nvPr/>
+        </p:nvSpPr>
+        <p:spPr>
+          <a:xfrm>
+            <a:off x="4290436" y="1674370"/>
+            <a:ext cx="1328311" cy="1134359"/>
+          </a:xfrm>
+          <a:prstGeom prst="rect">
+            <a:avLst/>
+          </a:prstGeom>
+          <a:solidFill>
+            <a:srgbClr val="7030A0"/>
+          </a:solidFill>
+          <a:ln>
+            <a:solidFill>
+              <a:schemeClr val="bg1"/>
+            </a:solidFill>
+          </a:ln>
+        </p:spPr>
+        <p:style>
+          <a:lnRef idx="2">
+            <a:schemeClr val="accent1">
+              <a:shade val="50000"/>
+            </a:schemeClr>
+          </a:lnRef>
+          <a:fillRef idx="1">
+            <a:schemeClr val="accent1"/>
+          </a:fillRef>
+          <a:effectRef idx="0">
+            <a:schemeClr val="accent1"/>
+          </a:effectRef>
+          <a:fontRef idx="minor">
+            <a:schemeClr val="lt1"/>
+          </a:fontRef>
+        </p:style>
+        <p:txBody>
+          <a:bodyPr rtlCol="0" anchor="ctr"/>
+          <a:lstStyle/>
+          <a:p>
+            <a:pPr algn="ctr"/>
+            <a:endParaRPr lang="pt-BR" dirty="0"/>
+          </a:p>
+        </p:txBody>
+      </p:sp>
+      <p:sp>
+        <p:nvSpPr>
+          <p:cNvPr id="15" name="CaixaDeTexto 14">
+            <a:extLst>
+              <a:ext uri="{FF2B5EF4-FFF2-40B4-BE49-F238E27FC236}">
+                <a16:creationId xmlns:a16="http://schemas.microsoft.com/office/drawing/2014/main" id="{54877985-4309-4642-9D43-42BB63052F1E}"/>
+              </a:ext>
+            </a:extLst>
+          </p:cNvPr>
+          <p:cNvSpPr txBox="1"/>
+          <p:nvPr/>
+        </p:nvSpPr>
+        <p:spPr>
+          <a:xfrm>
+            <a:off x="4485809" y="1896845"/>
+            <a:ext cx="937564" cy="646331"/>
+          </a:xfrm>
+          <a:prstGeom prst="rect">
+            <a:avLst/>
+          </a:prstGeom>
+          <a:noFill/>
+        </p:spPr>
+        <p:txBody>
+          <a:bodyPr wrap="none" rtlCol="0">
+            <a:spAutoFit/>
+          </a:bodyPr>
+          <a:lstStyle/>
+          <a:p>
+            <a:pPr algn="ctr"/>
+            <a:r>
+              <a:rPr lang="pt-BR" dirty="0">
+                <a:solidFill>
+                  <a:schemeClr val="bg1">
+                    <a:lumMod val="95000"/>
+                  </a:schemeClr>
+                </a:solidFill>
+              </a:rPr>
+              <a:t>Data </a:t>
+            </a:r>
+          </a:p>
+          <a:p>
+            <a:pPr algn="ctr"/>
+            <a:r>
+              <a:rPr lang="pt-BR" dirty="0" err="1">
+                <a:solidFill>
+                  <a:schemeClr val="bg1">
+                    <a:lumMod val="95000"/>
+                  </a:schemeClr>
+                </a:solidFill>
+              </a:rPr>
+              <a:t>Analysis</a:t>
+            </a:r>
+            <a:endParaRPr lang="pt-BR" dirty="0">
+              <a:solidFill>
+                <a:schemeClr val="bg1">
+                  <a:lumMod val="95000"/>
+                </a:schemeClr>
+              </a:solidFill>
+            </a:endParaRPr>
+          </a:p>
+        </p:txBody>
+      </p:sp>
+      <p:sp>
+        <p:nvSpPr>
+          <p:cNvPr id="16" name="Retângulo 15">
+            <a:extLst>
+              <a:ext uri="{FF2B5EF4-FFF2-40B4-BE49-F238E27FC236}">
+                <a16:creationId xmlns:a16="http://schemas.microsoft.com/office/drawing/2014/main" id="{C065171F-4BE6-43B6-AC32-600DFFC39C72}"/>
+              </a:ext>
+            </a:extLst>
+          </p:cNvPr>
+          <p:cNvSpPr/>
+          <p:nvPr/>
+        </p:nvSpPr>
+        <p:spPr>
+          <a:xfrm>
+            <a:off x="6277671" y="1674370"/>
+            <a:ext cx="1328311" cy="1134359"/>
+          </a:xfrm>
+          <a:prstGeom prst="rect">
+            <a:avLst/>
+          </a:prstGeom>
+          <a:solidFill>
+            <a:srgbClr val="7030A0"/>
+          </a:solidFill>
+          <a:ln>
+            <a:solidFill>
+              <a:schemeClr val="bg1"/>
+            </a:solidFill>
+          </a:ln>
+        </p:spPr>
+        <p:style>
+          <a:lnRef idx="2">
+            <a:schemeClr val="accent1">
+              <a:shade val="50000"/>
+            </a:schemeClr>
+          </a:lnRef>
+          <a:fillRef idx="1">
+            <a:schemeClr val="accent1"/>
+          </a:fillRef>
+          <a:effectRef idx="0">
+            <a:schemeClr val="accent1"/>
+          </a:effectRef>
+          <a:fontRef idx="minor">
+            <a:schemeClr val="lt1"/>
+          </a:fontRef>
+        </p:style>
+        <p:txBody>
+          <a:bodyPr rtlCol="0" anchor="ctr"/>
+          <a:lstStyle/>
+          <a:p>
+            <a:pPr algn="ctr"/>
+            <a:endParaRPr lang="pt-BR" dirty="0"/>
+          </a:p>
+        </p:txBody>
+      </p:sp>
+      <p:sp>
+        <p:nvSpPr>
+          <p:cNvPr id="17" name="Retângulo 16">
+            <a:extLst>
+              <a:ext uri="{FF2B5EF4-FFF2-40B4-BE49-F238E27FC236}">
+                <a16:creationId xmlns:a16="http://schemas.microsoft.com/office/drawing/2014/main" id="{5D8099A2-4BA6-4255-9033-AAD381E9F92D}"/>
+              </a:ext>
+            </a:extLst>
+          </p:cNvPr>
+          <p:cNvSpPr/>
+          <p:nvPr/>
+        </p:nvSpPr>
+        <p:spPr>
+          <a:xfrm>
+            <a:off x="8264906" y="1652830"/>
+            <a:ext cx="1328311" cy="1134359"/>
+          </a:xfrm>
+          <a:prstGeom prst="rect">
+            <a:avLst/>
+          </a:prstGeom>
+          <a:solidFill>
+            <a:srgbClr val="7030A0"/>
+          </a:solidFill>
+          <a:ln>
+            <a:solidFill>
+              <a:schemeClr val="bg1"/>
+            </a:solidFill>
+          </a:ln>
+        </p:spPr>
+        <p:style>
+          <a:lnRef idx="2">
+            <a:schemeClr val="accent1">
+              <a:shade val="50000"/>
+            </a:schemeClr>
+          </a:lnRef>
+          <a:fillRef idx="1">
+            <a:schemeClr val="accent1"/>
+          </a:fillRef>
+          <a:effectRef idx="0">
+            <a:schemeClr val="accent1"/>
+          </a:effectRef>
+          <a:fontRef idx="minor">
+            <a:schemeClr val="lt1"/>
+          </a:fontRef>
+        </p:style>
+        <p:txBody>
+          <a:bodyPr rtlCol="0" anchor="ctr"/>
+          <a:lstStyle/>
+          <a:p>
+            <a:pPr algn="ctr"/>
+            <a:endParaRPr lang="pt-BR" dirty="0"/>
+          </a:p>
+        </p:txBody>
+      </p:sp>
+      <p:sp>
+        <p:nvSpPr>
+          <p:cNvPr id="19" name="CaixaDeTexto 18">
+            <a:extLst>
+              <a:ext uri="{FF2B5EF4-FFF2-40B4-BE49-F238E27FC236}">
+                <a16:creationId xmlns:a16="http://schemas.microsoft.com/office/drawing/2014/main" id="{3FCAE34E-2FC5-408A-A51F-DE147E3CD316}"/>
+              </a:ext>
+            </a:extLst>
+          </p:cNvPr>
+          <p:cNvSpPr txBox="1"/>
+          <p:nvPr/>
+        </p:nvSpPr>
+        <p:spPr>
+          <a:xfrm>
+            <a:off x="6458386" y="1918384"/>
+            <a:ext cx="966932" cy="646331"/>
+          </a:xfrm>
+          <a:prstGeom prst="rect">
+            <a:avLst/>
+          </a:prstGeom>
+          <a:noFill/>
+        </p:spPr>
+        <p:txBody>
+          <a:bodyPr wrap="none" rtlCol="0">
+            <a:spAutoFit/>
+          </a:bodyPr>
+          <a:lstStyle/>
+          <a:p>
+            <a:pPr algn="ctr"/>
+            <a:r>
+              <a:rPr lang="pt-BR" dirty="0">
+                <a:solidFill>
+                  <a:schemeClr val="bg1">
+                    <a:lumMod val="95000"/>
+                  </a:schemeClr>
+                </a:solidFill>
+              </a:rPr>
+              <a:t>Data </a:t>
+            </a:r>
+          </a:p>
+          <a:p>
+            <a:pPr algn="ctr"/>
+            <a:r>
+              <a:rPr lang="pt-BR" dirty="0" err="1">
+                <a:solidFill>
+                  <a:schemeClr val="bg1">
+                    <a:lumMod val="95000"/>
+                  </a:schemeClr>
+                </a:solidFill>
+              </a:rPr>
+              <a:t>Labeling</a:t>
+            </a:r>
+            <a:endParaRPr lang="pt-BR" dirty="0">
+              <a:solidFill>
+                <a:schemeClr val="bg1">
+                  <a:lumMod val="95000"/>
+                </a:schemeClr>
+              </a:solidFill>
+            </a:endParaRPr>
+          </a:p>
+        </p:txBody>
+      </p:sp>
+      <p:sp>
+        <p:nvSpPr>
+          <p:cNvPr id="20" name="CaixaDeTexto 19">
+            <a:extLst>
+              <a:ext uri="{FF2B5EF4-FFF2-40B4-BE49-F238E27FC236}">
+                <a16:creationId xmlns:a16="http://schemas.microsoft.com/office/drawing/2014/main" id="{D653D5C6-7B1B-4BE6-A7E8-6DF236CDB9E6}"/>
+              </a:ext>
+            </a:extLst>
+          </p:cNvPr>
+          <p:cNvSpPr txBox="1"/>
+          <p:nvPr/>
+        </p:nvSpPr>
+        <p:spPr>
+          <a:xfrm>
+            <a:off x="8351646" y="1918384"/>
+            <a:ext cx="1123514" cy="646331"/>
+          </a:xfrm>
+          <a:prstGeom prst="rect">
+            <a:avLst/>
+          </a:prstGeom>
+          <a:noFill/>
+        </p:spPr>
+        <p:txBody>
+          <a:bodyPr wrap="none" rtlCol="0">
+            <a:spAutoFit/>
+          </a:bodyPr>
+          <a:lstStyle/>
+          <a:p>
+            <a:pPr algn="ctr"/>
+            <a:r>
+              <a:rPr lang="pt-BR" dirty="0">
+                <a:solidFill>
+                  <a:schemeClr val="bg1">
+                    <a:lumMod val="95000"/>
+                  </a:schemeClr>
+                </a:solidFill>
+              </a:rPr>
+              <a:t>Data </a:t>
+            </a:r>
+          </a:p>
+          <a:p>
+            <a:pPr algn="ctr"/>
+            <a:r>
+              <a:rPr lang="pt-BR" dirty="0" err="1">
+                <a:solidFill>
+                  <a:schemeClr val="bg1">
+                    <a:lumMod val="95000"/>
+                  </a:schemeClr>
+                </a:solidFill>
+              </a:rPr>
+              <a:t>Validation</a:t>
+            </a:r>
+            <a:endParaRPr lang="pt-BR" dirty="0">
+              <a:solidFill>
+                <a:schemeClr val="bg1">
+                  <a:lumMod val="95000"/>
+                </a:schemeClr>
+              </a:solidFill>
+            </a:endParaRPr>
+          </a:p>
+        </p:txBody>
+      </p:sp>
+      <p:grpSp>
+        <p:nvGrpSpPr>
+          <p:cNvPr id="4" name="Agrupar 3">
+            <a:extLst>
+              <a:ext uri="{FF2B5EF4-FFF2-40B4-BE49-F238E27FC236}">
+                <a16:creationId xmlns:a16="http://schemas.microsoft.com/office/drawing/2014/main" id="{E4D5D3D0-BAEA-4F37-87E9-64A94C629217}"/>
+              </a:ext>
+            </a:extLst>
+          </p:cNvPr>
+          <p:cNvGrpSpPr/>
+          <p:nvPr/>
+        </p:nvGrpSpPr>
+        <p:grpSpPr>
+          <a:xfrm>
+            <a:off x="10367211" y="1674370"/>
+            <a:ext cx="1328311" cy="1134359"/>
+            <a:chOff x="10367211" y="1674370"/>
+            <a:chExt cx="1328311" cy="1134359"/>
+          </a:xfrm>
+        </p:grpSpPr>
+        <p:sp>
+          <p:nvSpPr>
+            <p:cNvPr id="18" name="Retângulo 17">
+              <a:extLst>
+                <a:ext uri="{FF2B5EF4-FFF2-40B4-BE49-F238E27FC236}">
+                  <a16:creationId xmlns:a16="http://schemas.microsoft.com/office/drawing/2014/main" id="{FB4979C4-0CC7-43ED-A895-97B5ECF71CEE}"/>
+                </a:ext>
+              </a:extLst>
+            </p:cNvPr>
+            <p:cNvSpPr/>
+            <p:nvPr/>
+          </p:nvSpPr>
+          <p:spPr>
+            <a:xfrm>
+              <a:off x="10367211" y="1674370"/>
+              <a:ext cx="1328311" cy="1134359"/>
+            </a:xfrm>
+            <a:prstGeom prst="rect">
+              <a:avLst/>
+            </a:prstGeom>
+            <a:solidFill>
+              <a:srgbClr val="7030A0"/>
+            </a:solidFill>
+            <a:ln>
+              <a:solidFill>
+                <a:schemeClr val="bg1"/>
+              </a:solidFill>
+            </a:ln>
+          </p:spPr>
+          <p:style>
+            <a:lnRef idx="2">
+              <a:schemeClr val="accent1">
+                <a:shade val="50000"/>
+              </a:schemeClr>
+            </a:lnRef>
+            <a:fillRef idx="1">
+              <a:schemeClr val="accent1"/>
+            </a:fillRef>
+            <a:effectRef idx="0">
+              <a:schemeClr val="accent1"/>
+            </a:effectRef>
+            <a:fontRef idx="minor">
+              <a:schemeClr val="lt1"/>
+            </a:fontRef>
+          </p:style>
+          <p:txBody>
+            <a:bodyPr rtlCol="0" anchor="ctr"/>
+            <a:lstStyle/>
+            <a:p>
+              <a:pPr algn="ctr"/>
+              <a:endParaRPr lang="pt-BR" dirty="0"/>
+            </a:p>
+          </p:txBody>
+        </p:sp>
+        <p:sp>
+          <p:nvSpPr>
+            <p:cNvPr id="21" name="CaixaDeTexto 20">
+              <a:extLst>
+                <a:ext uri="{FF2B5EF4-FFF2-40B4-BE49-F238E27FC236}">
+                  <a16:creationId xmlns:a16="http://schemas.microsoft.com/office/drawing/2014/main" id="{1DC46774-F53A-46DC-8F7C-2A329881D4E2}"/>
+                </a:ext>
+              </a:extLst>
+            </p:cNvPr>
+            <p:cNvSpPr txBox="1"/>
+            <p:nvPr/>
+          </p:nvSpPr>
+          <p:spPr>
+            <a:xfrm>
+              <a:off x="10388531" y="1918384"/>
+              <a:ext cx="1285673" cy="646331"/>
+            </a:xfrm>
+            <a:prstGeom prst="rect">
+              <a:avLst/>
+            </a:prstGeom>
+            <a:noFill/>
+          </p:spPr>
+          <p:txBody>
+            <a:bodyPr wrap="none" rtlCol="0">
+              <a:spAutoFit/>
+            </a:bodyPr>
+            <a:lstStyle/>
+            <a:p>
+              <a:pPr algn="ctr"/>
+              <a:r>
+                <a:rPr lang="pt-BR" dirty="0">
+                  <a:solidFill>
+                    <a:schemeClr val="bg1">
+                      <a:lumMod val="95000"/>
+                    </a:schemeClr>
+                  </a:solidFill>
+                </a:rPr>
+                <a:t>Data </a:t>
+              </a:r>
+            </a:p>
+            <a:p>
+              <a:pPr algn="ctr"/>
+              <a:r>
+                <a:rPr lang="pt-BR" dirty="0" err="1">
+                  <a:solidFill>
+                    <a:schemeClr val="bg1">
+                      <a:lumMod val="95000"/>
+                    </a:schemeClr>
+                  </a:solidFill>
+                </a:rPr>
+                <a:t>Preparation</a:t>
+              </a:r>
+              <a:endParaRPr lang="pt-BR" dirty="0">
+                <a:solidFill>
+                  <a:schemeClr val="bg1">
+                    <a:lumMod val="95000"/>
+                  </a:schemeClr>
+                </a:solidFill>
+              </a:endParaRPr>
+            </a:p>
+          </p:txBody>
+        </p:sp>
+      </p:grpSp>
+      <p:grpSp>
+        <p:nvGrpSpPr>
+          <p:cNvPr id="22" name="Agrupar 21">
+            <a:extLst>
+              <a:ext uri="{FF2B5EF4-FFF2-40B4-BE49-F238E27FC236}">
+                <a16:creationId xmlns:a16="http://schemas.microsoft.com/office/drawing/2014/main" id="{F0C0EB2B-D70D-4C17-A806-160457DE3E47}"/>
+              </a:ext>
+            </a:extLst>
+          </p:cNvPr>
+          <p:cNvGrpSpPr/>
+          <p:nvPr/>
+        </p:nvGrpSpPr>
+        <p:grpSpPr>
+          <a:xfrm>
+            <a:off x="8249247" y="5358527"/>
+            <a:ext cx="1328311" cy="1134359"/>
+            <a:chOff x="10409523" y="1656970"/>
+            <a:chExt cx="1328311" cy="1134359"/>
+          </a:xfrm>
+        </p:grpSpPr>
+        <p:sp>
+          <p:nvSpPr>
+            <p:cNvPr id="23" name="Retângulo 22">
+              <a:extLst>
+                <a:ext uri="{FF2B5EF4-FFF2-40B4-BE49-F238E27FC236}">
+                  <a16:creationId xmlns:a16="http://schemas.microsoft.com/office/drawing/2014/main" id="{5D679702-35A2-4EED-B328-E287E5BD5002}"/>
+                </a:ext>
+              </a:extLst>
+            </p:cNvPr>
+            <p:cNvSpPr/>
+            <p:nvPr/>
+          </p:nvSpPr>
+          <p:spPr>
+            <a:xfrm>
+              <a:off x="10409523" y="1656970"/>
+              <a:ext cx="1328311" cy="1134359"/>
+            </a:xfrm>
+            <a:prstGeom prst="rect">
+              <a:avLst/>
+            </a:prstGeom>
+            <a:solidFill>
+              <a:srgbClr val="7030A0"/>
+            </a:solidFill>
+            <a:ln>
+              <a:solidFill>
+                <a:schemeClr val="bg1"/>
+              </a:solidFill>
+            </a:ln>
+          </p:spPr>
+          <p:style>
+            <a:lnRef idx="2">
+              <a:schemeClr val="accent1">
+                <a:shade val="50000"/>
+              </a:schemeClr>
+            </a:lnRef>
+            <a:fillRef idx="1">
+              <a:schemeClr val="accent1"/>
+            </a:fillRef>
+            <a:effectRef idx="0">
+              <a:schemeClr val="accent1"/>
+            </a:effectRef>
+            <a:fontRef idx="minor">
+              <a:schemeClr val="lt1"/>
+            </a:fontRef>
+          </p:style>
+          <p:txBody>
+            <a:bodyPr rtlCol="0" anchor="ctr"/>
+            <a:lstStyle/>
+            <a:p>
+              <a:pPr algn="ctr"/>
+              <a:endParaRPr lang="pt-BR" dirty="0"/>
+            </a:p>
+          </p:txBody>
+        </p:sp>
+        <p:sp>
+          <p:nvSpPr>
+            <p:cNvPr id="24" name="CaixaDeTexto 23">
+              <a:extLst>
+                <a:ext uri="{FF2B5EF4-FFF2-40B4-BE49-F238E27FC236}">
+                  <a16:creationId xmlns:a16="http://schemas.microsoft.com/office/drawing/2014/main" id="{1A61CBFB-13ED-4185-889C-38C2C3BFF9C0}"/>
+                </a:ext>
+              </a:extLst>
+            </p:cNvPr>
+            <p:cNvSpPr txBox="1"/>
+            <p:nvPr/>
+          </p:nvSpPr>
+          <p:spPr>
+            <a:xfrm>
+              <a:off x="10625811" y="1849605"/>
+              <a:ext cx="927050" cy="646331"/>
+            </a:xfrm>
+            <a:prstGeom prst="rect">
+              <a:avLst/>
+            </a:prstGeom>
+            <a:noFill/>
+          </p:spPr>
+          <p:txBody>
+            <a:bodyPr wrap="none" rtlCol="0">
+              <a:spAutoFit/>
+            </a:bodyPr>
+            <a:lstStyle/>
+            <a:p>
+              <a:pPr algn="ctr"/>
+              <a:r>
+                <a:rPr lang="pt-BR" dirty="0">
+                  <a:solidFill>
+                    <a:schemeClr val="bg1">
+                      <a:lumMod val="95000"/>
+                    </a:schemeClr>
+                  </a:solidFill>
+                </a:rPr>
+                <a:t>Model</a:t>
+              </a:r>
+            </a:p>
+            <a:p>
+              <a:pPr algn="ctr"/>
+              <a:r>
+                <a:rPr lang="pt-BR" dirty="0">
+                  <a:solidFill>
+                    <a:schemeClr val="bg1">
+                      <a:lumMod val="95000"/>
+                    </a:schemeClr>
+                  </a:solidFill>
+                </a:rPr>
+                <a:t>Training</a:t>
+              </a:r>
+            </a:p>
+          </p:txBody>
+        </p:sp>
+      </p:grpSp>
+      <p:grpSp>
+        <p:nvGrpSpPr>
+          <p:cNvPr id="25" name="Agrupar 24">
+            <a:extLst>
+              <a:ext uri="{FF2B5EF4-FFF2-40B4-BE49-F238E27FC236}">
+                <a16:creationId xmlns:a16="http://schemas.microsoft.com/office/drawing/2014/main" id="{9D58B6AC-B467-4586-8A1A-6DBEEF70D08B}"/>
+              </a:ext>
+            </a:extLst>
+          </p:cNvPr>
+          <p:cNvGrpSpPr/>
+          <p:nvPr/>
+        </p:nvGrpSpPr>
+        <p:grpSpPr>
+          <a:xfrm>
+            <a:off x="6248400" y="5358527"/>
+            <a:ext cx="1328311" cy="1134359"/>
+            <a:chOff x="10409523" y="1656970"/>
+            <a:chExt cx="1328311" cy="1134359"/>
+          </a:xfrm>
+        </p:grpSpPr>
+        <p:sp>
+          <p:nvSpPr>
+            <p:cNvPr id="26" name="Retângulo 25">
+              <a:extLst>
+                <a:ext uri="{FF2B5EF4-FFF2-40B4-BE49-F238E27FC236}">
+                  <a16:creationId xmlns:a16="http://schemas.microsoft.com/office/drawing/2014/main" id="{218BBC82-617C-40EB-8F85-C371B5E282F9}"/>
+                </a:ext>
+              </a:extLst>
+            </p:cNvPr>
+            <p:cNvSpPr/>
+            <p:nvPr/>
+          </p:nvSpPr>
+          <p:spPr>
+            <a:xfrm>
+              <a:off x="10409523" y="1656970"/>
+              <a:ext cx="1328311" cy="1134359"/>
+            </a:xfrm>
+            <a:prstGeom prst="rect">
+              <a:avLst/>
+            </a:prstGeom>
+            <a:solidFill>
+              <a:srgbClr val="7030A0"/>
+            </a:solidFill>
+            <a:ln>
+              <a:solidFill>
+                <a:schemeClr val="bg1"/>
+              </a:solidFill>
+            </a:ln>
+          </p:spPr>
+          <p:style>
+            <a:lnRef idx="2">
+              <a:schemeClr val="accent1">
+                <a:shade val="50000"/>
+              </a:schemeClr>
+            </a:lnRef>
+            <a:fillRef idx="1">
+              <a:schemeClr val="accent1"/>
+            </a:fillRef>
+            <a:effectRef idx="0">
+              <a:schemeClr val="accent1"/>
+            </a:effectRef>
+            <a:fontRef idx="minor">
+              <a:schemeClr val="lt1"/>
+            </a:fontRef>
+          </p:style>
+          <p:txBody>
+            <a:bodyPr rtlCol="0" anchor="ctr"/>
+            <a:lstStyle/>
+            <a:p>
+              <a:pPr algn="ctr"/>
+              <a:endParaRPr lang="pt-BR" dirty="0"/>
+            </a:p>
+          </p:txBody>
+        </p:sp>
+        <p:sp>
+          <p:nvSpPr>
+            <p:cNvPr id="27" name="CaixaDeTexto 26">
+              <a:extLst>
+                <a:ext uri="{FF2B5EF4-FFF2-40B4-BE49-F238E27FC236}">
+                  <a16:creationId xmlns:a16="http://schemas.microsoft.com/office/drawing/2014/main" id="{F0F7AB24-A3B5-41EA-A26B-6F75A990BD90}"/>
+                </a:ext>
+              </a:extLst>
+            </p:cNvPr>
+            <p:cNvSpPr txBox="1"/>
+            <p:nvPr/>
+          </p:nvSpPr>
+          <p:spPr>
+            <a:xfrm>
+              <a:off x="10554029" y="1849605"/>
+              <a:ext cx="1070614" cy="646331"/>
+            </a:xfrm>
+            <a:prstGeom prst="rect">
+              <a:avLst/>
+            </a:prstGeom>
+            <a:noFill/>
+          </p:spPr>
+          <p:txBody>
+            <a:bodyPr wrap="none" rtlCol="0">
+              <a:spAutoFit/>
+            </a:bodyPr>
+            <a:lstStyle/>
+            <a:p>
+              <a:pPr algn="ctr"/>
+              <a:r>
+                <a:rPr lang="pt-BR" dirty="0">
+                  <a:solidFill>
+                    <a:schemeClr val="bg1">
+                      <a:lumMod val="95000"/>
+                    </a:schemeClr>
+                  </a:solidFill>
+                </a:rPr>
+                <a:t>Model</a:t>
+              </a:r>
+            </a:p>
+            <a:p>
+              <a:pPr algn="ctr"/>
+              <a:r>
+                <a:rPr lang="pt-BR" dirty="0" err="1">
+                  <a:solidFill>
+                    <a:schemeClr val="bg1">
+                      <a:lumMod val="95000"/>
+                    </a:schemeClr>
+                  </a:solidFill>
+                </a:rPr>
+                <a:t>Valuation</a:t>
+              </a:r>
+              <a:endParaRPr lang="pt-BR" dirty="0">
+                <a:solidFill>
+                  <a:schemeClr val="bg1">
+                    <a:lumMod val="95000"/>
+                  </a:schemeClr>
+                </a:solidFill>
+              </a:endParaRPr>
+            </a:p>
+          </p:txBody>
+        </p:sp>
+      </p:grpSp>
+      <p:grpSp>
+        <p:nvGrpSpPr>
+          <p:cNvPr id="28" name="Agrupar 27">
+            <a:extLst>
+              <a:ext uri="{FF2B5EF4-FFF2-40B4-BE49-F238E27FC236}">
+                <a16:creationId xmlns:a16="http://schemas.microsoft.com/office/drawing/2014/main" id="{F45911D2-F2A2-479A-AE6A-965E23A37615}"/>
+              </a:ext>
+            </a:extLst>
+          </p:cNvPr>
+          <p:cNvGrpSpPr/>
+          <p:nvPr/>
+        </p:nvGrpSpPr>
+        <p:grpSpPr>
+          <a:xfrm>
+            <a:off x="4247553" y="5358526"/>
+            <a:ext cx="1328311" cy="1134359"/>
+            <a:chOff x="10409523" y="1656970"/>
+            <a:chExt cx="1328311" cy="1134359"/>
+          </a:xfrm>
+        </p:grpSpPr>
+        <p:sp>
+          <p:nvSpPr>
+            <p:cNvPr id="29" name="Retângulo 28">
+              <a:extLst>
+                <a:ext uri="{FF2B5EF4-FFF2-40B4-BE49-F238E27FC236}">
+                  <a16:creationId xmlns:a16="http://schemas.microsoft.com/office/drawing/2014/main" id="{F264B556-92D9-44CF-988B-9695F19A854B}"/>
+                </a:ext>
+              </a:extLst>
+            </p:cNvPr>
+            <p:cNvSpPr/>
+            <p:nvPr/>
+          </p:nvSpPr>
+          <p:spPr>
+            <a:xfrm>
+              <a:off x="10409523" y="1656970"/>
+              <a:ext cx="1328311" cy="1134359"/>
+            </a:xfrm>
+            <a:prstGeom prst="rect">
+              <a:avLst/>
+            </a:prstGeom>
+            <a:solidFill>
+              <a:srgbClr val="7030A0"/>
+            </a:solidFill>
+            <a:ln>
+              <a:solidFill>
+                <a:schemeClr val="bg1"/>
+              </a:solidFill>
+            </a:ln>
+          </p:spPr>
+          <p:style>
+            <a:lnRef idx="2">
+              <a:schemeClr val="accent1">
+                <a:shade val="50000"/>
+              </a:schemeClr>
+            </a:lnRef>
+            <a:fillRef idx="1">
+              <a:schemeClr val="accent1"/>
+            </a:fillRef>
+            <a:effectRef idx="0">
+              <a:schemeClr val="accent1"/>
+            </a:effectRef>
+            <a:fontRef idx="minor">
+              <a:schemeClr val="lt1"/>
+            </a:fontRef>
+          </p:style>
+          <p:txBody>
+            <a:bodyPr rtlCol="0" anchor="ctr"/>
+            <a:lstStyle/>
+            <a:p>
+              <a:pPr algn="ctr"/>
+              <a:endParaRPr lang="pt-BR" dirty="0"/>
+            </a:p>
+          </p:txBody>
+        </p:sp>
+        <p:sp>
+          <p:nvSpPr>
+            <p:cNvPr id="30" name="CaixaDeTexto 29">
+              <a:extLst>
+                <a:ext uri="{FF2B5EF4-FFF2-40B4-BE49-F238E27FC236}">
+                  <a16:creationId xmlns:a16="http://schemas.microsoft.com/office/drawing/2014/main" id="{4785CB0E-E3DE-459B-B9E7-FB754E7A6548}"/>
+                </a:ext>
+              </a:extLst>
+            </p:cNvPr>
+            <p:cNvSpPr txBox="1"/>
+            <p:nvPr/>
+          </p:nvSpPr>
+          <p:spPr>
+            <a:xfrm>
+              <a:off x="10511921" y="1762484"/>
+              <a:ext cx="1123513" cy="923330"/>
+            </a:xfrm>
+            <a:prstGeom prst="rect">
+              <a:avLst/>
+            </a:prstGeom>
+            <a:noFill/>
+          </p:spPr>
+          <p:txBody>
+            <a:bodyPr wrap="none" rtlCol="0">
+              <a:spAutoFit/>
+            </a:bodyPr>
+            <a:lstStyle/>
+            <a:p>
+              <a:pPr algn="ctr"/>
+              <a:r>
+                <a:rPr lang="pt-BR" dirty="0" err="1">
+                  <a:solidFill>
+                    <a:schemeClr val="bg1">
+                      <a:lumMod val="95000"/>
+                    </a:schemeClr>
+                  </a:solidFill>
+                </a:rPr>
+                <a:t>Machine</a:t>
+              </a:r>
+              <a:endParaRPr lang="pt-BR" dirty="0">
+                <a:solidFill>
+                  <a:schemeClr val="bg1">
+                    <a:lumMod val="95000"/>
+                  </a:schemeClr>
+                </a:solidFill>
+              </a:endParaRPr>
+            </a:p>
+            <a:p>
+              <a:pPr algn="ctr"/>
+              <a:r>
+                <a:rPr lang="pt-BR" dirty="0">
+                  <a:solidFill>
+                    <a:schemeClr val="bg1">
+                      <a:lumMod val="95000"/>
+                    </a:schemeClr>
+                  </a:solidFill>
+                </a:rPr>
+                <a:t>Learning</a:t>
+              </a:r>
+            </a:p>
+            <a:p>
+              <a:pPr algn="ctr"/>
+              <a:r>
+                <a:rPr lang="pt-BR" dirty="0" err="1">
+                  <a:solidFill>
+                    <a:schemeClr val="bg1">
+                      <a:lumMod val="95000"/>
+                    </a:schemeClr>
+                  </a:solidFill>
+                </a:rPr>
+                <a:t>Validation</a:t>
+              </a:r>
+              <a:endParaRPr lang="pt-BR" dirty="0">
+                <a:solidFill>
+                  <a:schemeClr val="bg1">
+                    <a:lumMod val="95000"/>
+                  </a:schemeClr>
+                </a:solidFill>
+              </a:endParaRPr>
+            </a:p>
+          </p:txBody>
+        </p:sp>
+      </p:grpSp>
+      <p:grpSp>
+        <p:nvGrpSpPr>
+          <p:cNvPr id="31" name="Agrupar 30">
+            <a:extLst>
+              <a:ext uri="{FF2B5EF4-FFF2-40B4-BE49-F238E27FC236}">
+                <a16:creationId xmlns:a16="http://schemas.microsoft.com/office/drawing/2014/main" id="{10E8A448-0F18-43B1-B158-1D1CDF203AFB}"/>
+              </a:ext>
+            </a:extLst>
+          </p:cNvPr>
+          <p:cNvGrpSpPr/>
+          <p:nvPr/>
+        </p:nvGrpSpPr>
+        <p:grpSpPr>
+          <a:xfrm>
+            <a:off x="2343133" y="5358526"/>
+            <a:ext cx="1338701" cy="1134359"/>
+            <a:chOff x="10404328" y="1656970"/>
+            <a:chExt cx="1338701" cy="1134359"/>
+          </a:xfrm>
+        </p:grpSpPr>
+        <p:sp>
+          <p:nvSpPr>
+            <p:cNvPr id="32" name="Retângulo 31">
+              <a:extLst>
+                <a:ext uri="{FF2B5EF4-FFF2-40B4-BE49-F238E27FC236}">
+                  <a16:creationId xmlns:a16="http://schemas.microsoft.com/office/drawing/2014/main" id="{8CC3E3CD-8C0E-44A3-B346-42B858BBD7E7}"/>
+                </a:ext>
+              </a:extLst>
+            </p:cNvPr>
+            <p:cNvSpPr/>
+            <p:nvPr/>
+          </p:nvSpPr>
+          <p:spPr>
+            <a:xfrm>
+              <a:off x="10409523" y="1656970"/>
+              <a:ext cx="1328311" cy="1134359"/>
+            </a:xfrm>
+            <a:prstGeom prst="rect">
+              <a:avLst/>
+            </a:prstGeom>
+            <a:solidFill>
+              <a:srgbClr val="7030A0"/>
+            </a:solidFill>
+            <a:ln>
+              <a:solidFill>
+                <a:schemeClr val="bg1"/>
+              </a:solidFill>
+            </a:ln>
+          </p:spPr>
+          <p:style>
+            <a:lnRef idx="2">
+              <a:schemeClr val="accent1">
+                <a:shade val="50000"/>
+              </a:schemeClr>
+            </a:lnRef>
+            <a:fillRef idx="1">
+              <a:schemeClr val="accent1"/>
+            </a:fillRef>
+            <a:effectRef idx="0">
+              <a:schemeClr val="accent1"/>
+            </a:effectRef>
+            <a:fontRef idx="minor">
+              <a:schemeClr val="lt1"/>
+            </a:fontRef>
+          </p:style>
+          <p:txBody>
+            <a:bodyPr rtlCol="0" anchor="ctr"/>
+            <a:lstStyle/>
+            <a:p>
+              <a:pPr algn="ctr"/>
+              <a:endParaRPr lang="pt-BR" dirty="0"/>
+            </a:p>
+          </p:txBody>
+        </p:sp>
+        <p:sp>
+          <p:nvSpPr>
+            <p:cNvPr id="33" name="CaixaDeTexto 32">
+              <a:extLst>
+                <a:ext uri="{FF2B5EF4-FFF2-40B4-BE49-F238E27FC236}">
+                  <a16:creationId xmlns:a16="http://schemas.microsoft.com/office/drawing/2014/main" id="{079F053A-6CED-4E2B-AB87-B9C7C79FB793}"/>
+                </a:ext>
+              </a:extLst>
+            </p:cNvPr>
+            <p:cNvSpPr txBox="1"/>
+            <p:nvPr/>
+          </p:nvSpPr>
+          <p:spPr>
+            <a:xfrm>
+              <a:off x="10404328" y="1762484"/>
+              <a:ext cx="1338701" cy="923330"/>
+            </a:xfrm>
+            <a:prstGeom prst="rect">
+              <a:avLst/>
+            </a:prstGeom>
+            <a:noFill/>
+          </p:spPr>
+          <p:txBody>
+            <a:bodyPr wrap="none" rtlCol="0">
+              <a:spAutoFit/>
+            </a:bodyPr>
+            <a:lstStyle/>
+            <a:p>
+              <a:pPr algn="ctr"/>
+              <a:r>
+                <a:rPr lang="pt-BR" dirty="0" err="1">
+                  <a:solidFill>
+                    <a:schemeClr val="bg1">
+                      <a:lumMod val="95000"/>
+                    </a:schemeClr>
+                  </a:solidFill>
+                </a:rPr>
+                <a:t>Machine</a:t>
+              </a:r>
+              <a:endParaRPr lang="pt-BR" dirty="0">
+                <a:solidFill>
+                  <a:schemeClr val="bg1">
+                    <a:lumMod val="95000"/>
+                  </a:schemeClr>
+                </a:solidFill>
+              </a:endParaRPr>
+            </a:p>
+            <a:p>
+              <a:pPr algn="ctr"/>
+              <a:r>
+                <a:rPr lang="pt-BR" dirty="0">
+                  <a:solidFill>
+                    <a:schemeClr val="bg1">
+                      <a:lumMod val="95000"/>
+                    </a:schemeClr>
+                  </a:solidFill>
+                </a:rPr>
+                <a:t>Learning</a:t>
+              </a:r>
+            </a:p>
+            <a:p>
+              <a:pPr algn="ctr"/>
+              <a:r>
+                <a:rPr lang="pt-BR" dirty="0">
+                  <a:solidFill>
+                    <a:schemeClr val="bg1">
+                      <a:lumMod val="95000"/>
+                    </a:schemeClr>
+                  </a:solidFill>
+                </a:rPr>
+                <a:t>Deployment</a:t>
+              </a:r>
+            </a:p>
+          </p:txBody>
+        </p:sp>
+      </p:grpSp>
+      <p:pic>
+        <p:nvPicPr>
+          <p:cNvPr id="6" name="Imagem 5" descr="Empresário sorrindo e segurando um cartaz">
+            <a:extLst>
+              <a:ext uri="{FF2B5EF4-FFF2-40B4-BE49-F238E27FC236}">
+                <a16:creationId xmlns:a16="http://schemas.microsoft.com/office/drawing/2014/main" id="{DF780CCE-3225-4504-8F20-FD64FE9EAE82}"/>
+              </a:ext>
+            </a:extLst>
+          </p:cNvPr>
+          <p:cNvPicPr>
+            <a:picLocks noChangeAspect="1"/>
+          </p:cNvPicPr>
+          <p:nvPr/>
+        </p:nvPicPr>
+        <p:blipFill>
+          <a:blip r:embed="rId3">
+            <a:extLst>
+              <a:ext uri="{28A0092B-C50C-407E-A947-70E740481C1C}">
+                <a14:useLocalDpi xmlns:a14="http://schemas.microsoft.com/office/drawing/2010/main" val="0"/>
+              </a:ext>
+            </a:extLst>
+          </a:blip>
+          <a:stretch>
+            <a:fillRect/>
+          </a:stretch>
+        </p:blipFill>
+        <p:spPr>
+          <a:xfrm>
+            <a:off x="1138455" y="3325712"/>
+            <a:ext cx="1075927" cy="2395897"/>
+          </a:xfrm>
+          <a:prstGeom prst="rect">
+            <a:avLst/>
+          </a:prstGeom>
+        </p:spPr>
+      </p:pic>
+      <p:cxnSp>
+        <p:nvCxnSpPr>
+          <p:cNvPr id="35" name="Conector de Seta Reta 34">
+            <a:extLst>
+              <a:ext uri="{FF2B5EF4-FFF2-40B4-BE49-F238E27FC236}">
+                <a16:creationId xmlns:a16="http://schemas.microsoft.com/office/drawing/2014/main" id="{8ED4BE48-5B68-41A7-B736-7CCBC23CFE91}"/>
+              </a:ext>
+            </a:extLst>
+          </p:cNvPr>
+          <p:cNvCxnSpPr>
+            <a:cxnSpLocks/>
+          </p:cNvCxnSpPr>
+          <p:nvPr/>
+        </p:nvCxnSpPr>
+        <p:spPr>
+          <a:xfrm flipV="1">
+            <a:off x="2967725" y="4156594"/>
+            <a:ext cx="0" cy="1201933"/>
+          </a:xfrm>
+          <a:prstGeom prst="straightConnector1">
+            <a:avLst/>
+          </a:prstGeom>
+          <a:ln w="22225">
+            <a:solidFill>
+              <a:schemeClr val="bg1">
+                <a:lumMod val="65000"/>
+              </a:schemeClr>
+            </a:solidFill>
+            <a:tailEnd type="none"/>
+          </a:ln>
+        </p:spPr>
+        <p:style>
+          <a:lnRef idx="1">
+            <a:schemeClr val="accent1"/>
+          </a:lnRef>
+          <a:fillRef idx="0">
+            <a:schemeClr val="accent1"/>
+          </a:fillRef>
+          <a:effectRef idx="0">
+            <a:schemeClr val="accent1"/>
+          </a:effectRef>
+          <a:fontRef idx="minor">
+            <a:schemeClr val="tx1"/>
+          </a:fontRef>
+        </p:style>
+      </p:cxnSp>
+      <p:sp>
+        <p:nvSpPr>
+          <p:cNvPr id="40" name="CaixaDeTexto 39">
+            <a:extLst>
+              <a:ext uri="{FF2B5EF4-FFF2-40B4-BE49-F238E27FC236}">
+                <a16:creationId xmlns:a16="http://schemas.microsoft.com/office/drawing/2014/main" id="{26AE7565-15DA-4468-BCC5-A30C0BE8D74B}"/>
+              </a:ext>
+            </a:extLst>
+          </p:cNvPr>
+          <p:cNvSpPr txBox="1"/>
+          <p:nvPr/>
+        </p:nvSpPr>
+        <p:spPr>
+          <a:xfrm>
+            <a:off x="2402258" y="3909610"/>
+            <a:ext cx="449161" cy="261610"/>
+          </a:xfrm>
+          <a:prstGeom prst="rect">
+            <a:avLst/>
+          </a:prstGeom>
+          <a:noFill/>
+        </p:spPr>
+        <p:txBody>
+          <a:bodyPr wrap="none" rtlCol="0">
+            <a:spAutoFit/>
+          </a:bodyPr>
+          <a:lstStyle/>
+          <a:p>
+            <a:pPr algn="ctr"/>
+            <a:r>
+              <a:rPr lang="pt-BR" sz="1050" dirty="0" err="1">
+                <a:solidFill>
+                  <a:schemeClr val="bg1">
+                    <a:lumMod val="95000"/>
+                  </a:schemeClr>
+                </a:solidFill>
+              </a:rPr>
+              <a:t>User</a:t>
+            </a:r>
+            <a:endParaRPr lang="pt-BR" sz="1050" dirty="0">
+              <a:solidFill>
+                <a:schemeClr val="bg1">
+                  <a:lumMod val="95000"/>
+                </a:schemeClr>
+              </a:solidFill>
+            </a:endParaRPr>
+          </a:p>
+        </p:txBody>
+      </p:sp>
+      <p:sp>
+        <p:nvSpPr>
+          <p:cNvPr id="41" name="CaixaDeTexto 40">
+            <a:extLst>
+              <a:ext uri="{FF2B5EF4-FFF2-40B4-BE49-F238E27FC236}">
+                <a16:creationId xmlns:a16="http://schemas.microsoft.com/office/drawing/2014/main" id="{A4B13058-7F65-464F-8058-021CCA4DF30C}"/>
+              </a:ext>
+            </a:extLst>
+          </p:cNvPr>
+          <p:cNvSpPr txBox="1"/>
+          <p:nvPr/>
+        </p:nvSpPr>
+        <p:spPr>
+          <a:xfrm>
+            <a:off x="1187626" y="3728376"/>
+            <a:ext cx="979199" cy="261610"/>
+          </a:xfrm>
+          <a:prstGeom prst="rect">
+            <a:avLst/>
+          </a:prstGeom>
+          <a:noFill/>
+        </p:spPr>
+        <p:txBody>
+          <a:bodyPr wrap="square" rtlCol="0">
+            <a:spAutoFit/>
+          </a:bodyPr>
+          <a:lstStyle/>
+          <a:p>
+            <a:pPr algn="ctr"/>
+            <a:r>
+              <a:rPr lang="pt-BR" sz="1100" b="1" dirty="0">
+                <a:solidFill>
+                  <a:schemeClr val="tx1">
+                    <a:lumMod val="75000"/>
+                    <a:lumOff val="25000"/>
+                  </a:schemeClr>
+                </a:solidFill>
+              </a:rPr>
+              <a:t>Forecast</a:t>
+            </a:r>
+          </a:p>
+        </p:txBody>
+      </p:sp>
+      <p:sp>
+        <p:nvSpPr>
+          <p:cNvPr id="5" name="Retângulo 4">
+            <a:extLst>
+              <a:ext uri="{FF2B5EF4-FFF2-40B4-BE49-F238E27FC236}">
+                <a16:creationId xmlns:a16="http://schemas.microsoft.com/office/drawing/2014/main" id="{3F8CF78D-A7DA-4D35-A59E-4F7B7C595D07}"/>
+              </a:ext>
+            </a:extLst>
+          </p:cNvPr>
+          <p:cNvSpPr/>
+          <p:nvPr/>
+        </p:nvSpPr>
+        <p:spPr>
+          <a:xfrm>
+            <a:off x="108284" y="784443"/>
+            <a:ext cx="11959390" cy="2196766"/>
+          </a:xfrm>
+          <a:custGeom>
+            <a:avLst/>
+            <a:gdLst>
+              <a:gd name="connsiteX0" fmla="*/ 0 w 11959390"/>
+              <a:gd name="connsiteY0" fmla="*/ 0 h 2196766"/>
+              <a:gd name="connsiteX1" fmla="*/ 478376 w 11959390"/>
+              <a:gd name="connsiteY1" fmla="*/ 0 h 2196766"/>
+              <a:gd name="connsiteX2" fmla="*/ 717563 w 11959390"/>
+              <a:gd name="connsiteY2" fmla="*/ 0 h 2196766"/>
+              <a:gd name="connsiteX3" fmla="*/ 1554721 w 11959390"/>
+              <a:gd name="connsiteY3" fmla="*/ 0 h 2196766"/>
+              <a:gd name="connsiteX4" fmla="*/ 2033096 w 11959390"/>
+              <a:gd name="connsiteY4" fmla="*/ 0 h 2196766"/>
+              <a:gd name="connsiteX5" fmla="*/ 2511472 w 11959390"/>
+              <a:gd name="connsiteY5" fmla="*/ 0 h 2196766"/>
+              <a:gd name="connsiteX6" fmla="*/ 3348629 w 11959390"/>
+              <a:gd name="connsiteY6" fmla="*/ 0 h 2196766"/>
+              <a:gd name="connsiteX7" fmla="*/ 3707411 w 11959390"/>
+              <a:gd name="connsiteY7" fmla="*/ 0 h 2196766"/>
+              <a:gd name="connsiteX8" fmla="*/ 4544568 w 11959390"/>
+              <a:gd name="connsiteY8" fmla="*/ 0 h 2196766"/>
+              <a:gd name="connsiteX9" fmla="*/ 5381726 w 11959390"/>
+              <a:gd name="connsiteY9" fmla="*/ 0 h 2196766"/>
+              <a:gd name="connsiteX10" fmla="*/ 5979695 w 11959390"/>
+              <a:gd name="connsiteY10" fmla="*/ 0 h 2196766"/>
+              <a:gd name="connsiteX11" fmla="*/ 6816852 w 11959390"/>
+              <a:gd name="connsiteY11" fmla="*/ 0 h 2196766"/>
+              <a:gd name="connsiteX12" fmla="*/ 7295228 w 11959390"/>
+              <a:gd name="connsiteY12" fmla="*/ 0 h 2196766"/>
+              <a:gd name="connsiteX13" fmla="*/ 7773604 w 11959390"/>
+              <a:gd name="connsiteY13" fmla="*/ 0 h 2196766"/>
+              <a:gd name="connsiteX14" fmla="*/ 8491167 w 11959390"/>
+              <a:gd name="connsiteY14" fmla="*/ 0 h 2196766"/>
+              <a:gd name="connsiteX15" fmla="*/ 8969543 w 11959390"/>
+              <a:gd name="connsiteY15" fmla="*/ 0 h 2196766"/>
+              <a:gd name="connsiteX16" fmla="*/ 9806700 w 11959390"/>
+              <a:gd name="connsiteY16" fmla="*/ 0 h 2196766"/>
+              <a:gd name="connsiteX17" fmla="*/ 10643857 w 11959390"/>
+              <a:gd name="connsiteY17" fmla="*/ 0 h 2196766"/>
+              <a:gd name="connsiteX18" fmla="*/ 11241827 w 11959390"/>
+              <a:gd name="connsiteY18" fmla="*/ 0 h 2196766"/>
+              <a:gd name="connsiteX19" fmla="*/ 11959390 w 11959390"/>
+              <a:gd name="connsiteY19" fmla="*/ 0 h 2196766"/>
+              <a:gd name="connsiteX20" fmla="*/ 11959390 w 11959390"/>
+              <a:gd name="connsiteY20" fmla="*/ 483289 h 2196766"/>
+              <a:gd name="connsiteX21" fmla="*/ 11959390 w 11959390"/>
+              <a:gd name="connsiteY21" fmla="*/ 988545 h 2196766"/>
+              <a:gd name="connsiteX22" fmla="*/ 11959390 w 11959390"/>
+              <a:gd name="connsiteY22" fmla="*/ 1559704 h 2196766"/>
+              <a:gd name="connsiteX23" fmla="*/ 11959390 w 11959390"/>
+              <a:gd name="connsiteY23" fmla="*/ 2196766 h 2196766"/>
+              <a:gd name="connsiteX24" fmla="*/ 11600608 w 11959390"/>
+              <a:gd name="connsiteY24" fmla="*/ 2196766 h 2196766"/>
+              <a:gd name="connsiteX25" fmla="*/ 11361421 w 11959390"/>
+              <a:gd name="connsiteY25" fmla="*/ 2196766 h 2196766"/>
+              <a:gd name="connsiteX26" fmla="*/ 11122233 w 11959390"/>
+              <a:gd name="connsiteY26" fmla="*/ 2196766 h 2196766"/>
+              <a:gd name="connsiteX27" fmla="*/ 10524263 w 11959390"/>
+              <a:gd name="connsiteY27" fmla="*/ 2196766 h 2196766"/>
+              <a:gd name="connsiteX28" fmla="*/ 10165482 w 11959390"/>
+              <a:gd name="connsiteY28" fmla="*/ 2196766 h 2196766"/>
+              <a:gd name="connsiteX29" fmla="*/ 9447918 w 11959390"/>
+              <a:gd name="connsiteY29" fmla="*/ 2196766 h 2196766"/>
+              <a:gd name="connsiteX30" fmla="*/ 9089136 w 11959390"/>
+              <a:gd name="connsiteY30" fmla="*/ 2196766 h 2196766"/>
+              <a:gd name="connsiteX31" fmla="*/ 8371573 w 11959390"/>
+              <a:gd name="connsiteY31" fmla="*/ 2196766 h 2196766"/>
+              <a:gd name="connsiteX32" fmla="*/ 8132385 w 11959390"/>
+              <a:gd name="connsiteY32" fmla="*/ 2196766 h 2196766"/>
+              <a:gd name="connsiteX33" fmla="*/ 7414822 w 11959390"/>
+              <a:gd name="connsiteY33" fmla="*/ 2196766 h 2196766"/>
+              <a:gd name="connsiteX34" fmla="*/ 7056040 w 11959390"/>
+              <a:gd name="connsiteY34" fmla="*/ 2196766 h 2196766"/>
+              <a:gd name="connsiteX35" fmla="*/ 6816852 w 11959390"/>
+              <a:gd name="connsiteY35" fmla="*/ 2196766 h 2196766"/>
+              <a:gd name="connsiteX36" fmla="*/ 6458071 w 11959390"/>
+              <a:gd name="connsiteY36" fmla="*/ 2196766 h 2196766"/>
+              <a:gd name="connsiteX37" fmla="*/ 5740507 w 11959390"/>
+              <a:gd name="connsiteY37" fmla="*/ 2196766 h 2196766"/>
+              <a:gd name="connsiteX38" fmla="*/ 5381725 w 11959390"/>
+              <a:gd name="connsiteY38" fmla="*/ 2196766 h 2196766"/>
+              <a:gd name="connsiteX39" fmla="*/ 5142538 w 11959390"/>
+              <a:gd name="connsiteY39" fmla="*/ 2196766 h 2196766"/>
+              <a:gd name="connsiteX40" fmla="*/ 4783756 w 11959390"/>
+              <a:gd name="connsiteY40" fmla="*/ 2196766 h 2196766"/>
+              <a:gd name="connsiteX41" fmla="*/ 4305380 w 11959390"/>
+              <a:gd name="connsiteY41" fmla="*/ 2196766 h 2196766"/>
+              <a:gd name="connsiteX42" fmla="*/ 3707411 w 11959390"/>
+              <a:gd name="connsiteY42" fmla="*/ 2196766 h 2196766"/>
+              <a:gd name="connsiteX43" fmla="*/ 3348629 w 11959390"/>
+              <a:gd name="connsiteY43" fmla="*/ 2196766 h 2196766"/>
+              <a:gd name="connsiteX44" fmla="*/ 2511472 w 11959390"/>
+              <a:gd name="connsiteY44" fmla="*/ 2196766 h 2196766"/>
+              <a:gd name="connsiteX45" fmla="*/ 1913502 w 11959390"/>
+              <a:gd name="connsiteY45" fmla="*/ 2196766 h 2196766"/>
+              <a:gd name="connsiteX46" fmla="*/ 1076345 w 11959390"/>
+              <a:gd name="connsiteY46" fmla="*/ 2196766 h 2196766"/>
+              <a:gd name="connsiteX47" fmla="*/ 0 w 11959390"/>
+              <a:gd name="connsiteY47" fmla="*/ 2196766 h 2196766"/>
+              <a:gd name="connsiteX48" fmla="*/ 0 w 11959390"/>
+              <a:gd name="connsiteY48" fmla="*/ 1669542 h 2196766"/>
+              <a:gd name="connsiteX49" fmla="*/ 0 w 11959390"/>
+              <a:gd name="connsiteY49" fmla="*/ 1142318 h 2196766"/>
+              <a:gd name="connsiteX50" fmla="*/ 0 w 11959390"/>
+              <a:gd name="connsiteY50" fmla="*/ 571159 h 2196766"/>
+              <a:gd name="connsiteX51" fmla="*/ 0 w 11959390"/>
+              <a:gd name="connsiteY51" fmla="*/ 0 h 2196766"/>
+            </a:gdLst>
+            <a:ahLst/>
+            <a:cxnLst>
+              <a:cxn ang="0">
+                <a:pos x="connsiteX0" y="connsiteY0"/>
+              </a:cxn>
+              <a:cxn ang="0">
+                <a:pos x="connsiteX1" y="connsiteY1"/>
+              </a:cxn>
+              <a:cxn ang="0">
+                <a:pos x="connsiteX2" y="connsiteY2"/>
+              </a:cxn>
+              <a:cxn ang="0">
+                <a:pos x="connsiteX3" y="connsiteY3"/>
+              </a:cxn>
+              <a:cxn ang="0">
+                <a:pos x="connsiteX4" y="connsiteY4"/>
+              </a:cxn>
+              <a:cxn ang="0">
+                <a:pos x="connsiteX5" y="connsiteY5"/>
+              </a:cxn>
+              <a:cxn ang="0">
+                <a:pos x="connsiteX6" y="connsiteY6"/>
+              </a:cxn>
+              <a:cxn ang="0">
+                <a:pos x="connsiteX7" y="connsiteY7"/>
+              </a:cxn>
+              <a:cxn ang="0">
+                <a:pos x="connsiteX8" y="connsiteY8"/>
+              </a:cxn>
+              <a:cxn ang="0">
+                <a:pos x="connsiteX9" y="connsiteY9"/>
+              </a:cxn>
+              <a:cxn ang="0">
+                <a:pos x="connsiteX10" y="connsiteY10"/>
+              </a:cxn>
+              <a:cxn ang="0">
+                <a:pos x="connsiteX11" y="connsiteY11"/>
+              </a:cxn>
+              <a:cxn ang="0">
+                <a:pos x="connsiteX12" y="connsiteY12"/>
+              </a:cxn>
+              <a:cxn ang="0">
+                <a:pos x="connsiteX13" y="connsiteY13"/>
+              </a:cxn>
+              <a:cxn ang="0">
+                <a:pos x="connsiteX14" y="connsiteY14"/>
+              </a:cxn>
+              <a:cxn ang="0">
+                <a:pos x="connsiteX15" y="connsiteY15"/>
+              </a:cxn>
+              <a:cxn ang="0">
+                <a:pos x="connsiteX16" y="connsiteY16"/>
+              </a:cxn>
+              <a:cxn ang="0">
+                <a:pos x="connsiteX17" y="connsiteY17"/>
+              </a:cxn>
+              <a:cxn ang="0">
+                <a:pos x="connsiteX18" y="connsiteY18"/>
+              </a:cxn>
+              <a:cxn ang="0">
+                <a:pos x="connsiteX19" y="connsiteY19"/>
+              </a:cxn>
+              <a:cxn ang="0">
+                <a:pos x="connsiteX20" y="connsiteY20"/>
+              </a:cxn>
+              <a:cxn ang="0">
+                <a:pos x="connsiteX21" y="connsiteY21"/>
+              </a:cxn>
+              <a:cxn ang="0">
+                <a:pos x="connsiteX22" y="connsiteY22"/>
+              </a:cxn>
+              <a:cxn ang="0">
+                <a:pos x="connsiteX23" y="connsiteY23"/>
+              </a:cxn>
+              <a:cxn ang="0">
+                <a:pos x="connsiteX24" y="connsiteY24"/>
+              </a:cxn>
+              <a:cxn ang="0">
+                <a:pos x="connsiteX25" y="connsiteY25"/>
+              </a:cxn>
+              <a:cxn ang="0">
+                <a:pos x="connsiteX26" y="connsiteY26"/>
+              </a:cxn>
+              <a:cxn ang="0">
+                <a:pos x="connsiteX27" y="connsiteY27"/>
+              </a:cxn>
+              <a:cxn ang="0">
+                <a:pos x="connsiteX28" y="connsiteY28"/>
+              </a:cxn>
+              <a:cxn ang="0">
+                <a:pos x="connsiteX29" y="connsiteY29"/>
+              </a:cxn>
+              <a:cxn ang="0">
+                <a:pos x="connsiteX30" y="connsiteY30"/>
+              </a:cxn>
+              <a:cxn ang="0">
+                <a:pos x="connsiteX31" y="connsiteY31"/>
+              </a:cxn>
+              <a:cxn ang="0">
+                <a:pos x="connsiteX32" y="connsiteY32"/>
+              </a:cxn>
+              <a:cxn ang="0">
+                <a:pos x="connsiteX33" y="connsiteY33"/>
+              </a:cxn>
+              <a:cxn ang="0">
+                <a:pos x="connsiteX34" y="connsiteY34"/>
+              </a:cxn>
+              <a:cxn ang="0">
+                <a:pos x="connsiteX35" y="connsiteY35"/>
+              </a:cxn>
+              <a:cxn ang="0">
+                <a:pos x="connsiteX36" y="connsiteY36"/>
+              </a:cxn>
+              <a:cxn ang="0">
+                <a:pos x="connsiteX37" y="connsiteY37"/>
+              </a:cxn>
+              <a:cxn ang="0">
+                <a:pos x="connsiteX38" y="connsiteY38"/>
+              </a:cxn>
+              <a:cxn ang="0">
+                <a:pos x="connsiteX39" y="connsiteY39"/>
+              </a:cxn>
+              <a:cxn ang="0">
+                <a:pos x="connsiteX40" y="connsiteY40"/>
+              </a:cxn>
+              <a:cxn ang="0">
+                <a:pos x="connsiteX41" y="connsiteY41"/>
+              </a:cxn>
+              <a:cxn ang="0">
+                <a:pos x="connsiteX42" y="connsiteY42"/>
+              </a:cxn>
+              <a:cxn ang="0">
+                <a:pos x="connsiteX43" y="connsiteY43"/>
+              </a:cxn>
+              <a:cxn ang="0">
+                <a:pos x="connsiteX44" y="connsiteY44"/>
+              </a:cxn>
+              <a:cxn ang="0">
+                <a:pos x="connsiteX45" y="connsiteY45"/>
+              </a:cxn>
+              <a:cxn ang="0">
+                <a:pos x="connsiteX46" y="connsiteY46"/>
+              </a:cxn>
+              <a:cxn ang="0">
+                <a:pos x="connsiteX47" y="connsiteY47"/>
+              </a:cxn>
+              <a:cxn ang="0">
+                <a:pos x="connsiteX48" y="connsiteY48"/>
+              </a:cxn>
+              <a:cxn ang="0">
+                <a:pos x="connsiteX49" y="connsiteY49"/>
+              </a:cxn>
+              <a:cxn ang="0">
+                <a:pos x="connsiteX50" y="connsiteY50"/>
+              </a:cxn>
+              <a:cxn ang="0">
+                <a:pos x="connsiteX51" y="connsiteY51"/>
+              </a:cxn>
+            </a:cxnLst>
+            <a:rect l="l" t="t" r="r" b="b"/>
+            <a:pathLst>
+              <a:path w="11959390" h="2196766" extrusionOk="0">
+                <a:moveTo>
+                  <a:pt x="0" y="0"/>
+                </a:moveTo>
+                <a:cubicBezTo>
+                  <a:pt x="135343" y="-1514"/>
+                  <a:pt x="323591" y="3847"/>
+                  <a:pt x="478376" y="0"/>
+                </a:cubicBezTo>
+                <a:cubicBezTo>
+                  <a:pt x="633161" y="-3847"/>
+                  <a:pt x="664310" y="404"/>
+                  <a:pt x="717563" y="0"/>
+                </a:cubicBezTo>
+                <a:cubicBezTo>
+                  <a:pt x="770816" y="-404"/>
+                  <a:pt x="1353192" y="50327"/>
+                  <a:pt x="1554721" y="0"/>
+                </a:cubicBezTo>
+                <a:cubicBezTo>
+                  <a:pt x="1756250" y="-50327"/>
+                  <a:pt x="1911369" y="12483"/>
+                  <a:pt x="2033096" y="0"/>
+                </a:cubicBezTo>
+                <a:cubicBezTo>
+                  <a:pt x="2154823" y="-12483"/>
+                  <a:pt x="2405603" y="52223"/>
+                  <a:pt x="2511472" y="0"/>
+                </a:cubicBezTo>
+                <a:cubicBezTo>
+                  <a:pt x="2617341" y="-52223"/>
+                  <a:pt x="3135884" y="84135"/>
+                  <a:pt x="3348629" y="0"/>
+                </a:cubicBezTo>
+                <a:cubicBezTo>
+                  <a:pt x="3561374" y="-84135"/>
+                  <a:pt x="3530747" y="31335"/>
+                  <a:pt x="3707411" y="0"/>
+                </a:cubicBezTo>
+                <a:cubicBezTo>
+                  <a:pt x="3884075" y="-31335"/>
+                  <a:pt x="4295250" y="8001"/>
+                  <a:pt x="4544568" y="0"/>
+                </a:cubicBezTo>
+                <a:cubicBezTo>
+                  <a:pt x="4793886" y="-8001"/>
+                  <a:pt x="4993373" y="57036"/>
+                  <a:pt x="5381726" y="0"/>
+                </a:cubicBezTo>
+                <a:cubicBezTo>
+                  <a:pt x="5770079" y="-57036"/>
+                  <a:pt x="5708786" y="19146"/>
+                  <a:pt x="5979695" y="0"/>
+                </a:cubicBezTo>
+                <a:cubicBezTo>
+                  <a:pt x="6250604" y="-19146"/>
+                  <a:pt x="6525606" y="34935"/>
+                  <a:pt x="6816852" y="0"/>
+                </a:cubicBezTo>
+                <a:cubicBezTo>
+                  <a:pt x="7108098" y="-34935"/>
+                  <a:pt x="7112919" y="20081"/>
+                  <a:pt x="7295228" y="0"/>
+                </a:cubicBezTo>
+                <a:cubicBezTo>
+                  <a:pt x="7477537" y="-20081"/>
+                  <a:pt x="7542384" y="28356"/>
+                  <a:pt x="7773604" y="0"/>
+                </a:cubicBezTo>
+                <a:cubicBezTo>
+                  <a:pt x="8004824" y="-28356"/>
+                  <a:pt x="8149764" y="39461"/>
+                  <a:pt x="8491167" y="0"/>
+                </a:cubicBezTo>
+                <a:cubicBezTo>
+                  <a:pt x="8832570" y="-39461"/>
+                  <a:pt x="8745568" y="24235"/>
+                  <a:pt x="8969543" y="0"/>
+                </a:cubicBezTo>
+                <a:cubicBezTo>
+                  <a:pt x="9193518" y="-24235"/>
+                  <a:pt x="9455059" y="54935"/>
+                  <a:pt x="9806700" y="0"/>
+                </a:cubicBezTo>
+                <a:cubicBezTo>
+                  <a:pt x="10158341" y="-54935"/>
+                  <a:pt x="10470924" y="78141"/>
+                  <a:pt x="10643857" y="0"/>
+                </a:cubicBezTo>
+                <a:cubicBezTo>
+                  <a:pt x="10816790" y="-78141"/>
+                  <a:pt x="11065475" y="29187"/>
+                  <a:pt x="11241827" y="0"/>
+                </a:cubicBezTo>
+                <a:cubicBezTo>
+                  <a:pt x="11418179" y="-29187"/>
+                  <a:pt x="11742903" y="11800"/>
+                  <a:pt x="11959390" y="0"/>
+                </a:cubicBezTo>
+                <a:cubicBezTo>
+                  <a:pt x="12001882" y="165785"/>
+                  <a:pt x="11916513" y="281724"/>
+                  <a:pt x="11959390" y="483289"/>
+                </a:cubicBezTo>
+                <a:cubicBezTo>
+                  <a:pt x="12002267" y="684854"/>
+                  <a:pt x="11958647" y="756239"/>
+                  <a:pt x="11959390" y="988545"/>
+                </a:cubicBezTo>
+                <a:cubicBezTo>
+                  <a:pt x="11960133" y="1220851"/>
+                  <a:pt x="11903785" y="1376860"/>
+                  <a:pt x="11959390" y="1559704"/>
+                </a:cubicBezTo>
+                <a:cubicBezTo>
+                  <a:pt x="12014995" y="1742548"/>
+                  <a:pt x="11925982" y="1918090"/>
+                  <a:pt x="11959390" y="2196766"/>
+                </a:cubicBezTo>
+                <a:cubicBezTo>
+                  <a:pt x="11825218" y="2235465"/>
+                  <a:pt x="11673020" y="2179492"/>
+                  <a:pt x="11600608" y="2196766"/>
+                </a:cubicBezTo>
+                <a:cubicBezTo>
+                  <a:pt x="11528196" y="2214040"/>
+                  <a:pt x="11415571" y="2175423"/>
+                  <a:pt x="11361421" y="2196766"/>
+                </a:cubicBezTo>
+                <a:cubicBezTo>
+                  <a:pt x="11307271" y="2218109"/>
+                  <a:pt x="11186501" y="2180913"/>
+                  <a:pt x="11122233" y="2196766"/>
+                </a:cubicBezTo>
+                <a:cubicBezTo>
+                  <a:pt x="11057965" y="2212619"/>
+                  <a:pt x="10707817" y="2126476"/>
+                  <a:pt x="10524263" y="2196766"/>
+                </a:cubicBezTo>
+                <a:cubicBezTo>
+                  <a:pt x="10340709" y="2267056"/>
+                  <a:pt x="10301675" y="2195003"/>
+                  <a:pt x="10165482" y="2196766"/>
+                </a:cubicBezTo>
+                <a:cubicBezTo>
+                  <a:pt x="10029289" y="2198529"/>
+                  <a:pt x="9692163" y="2164527"/>
+                  <a:pt x="9447918" y="2196766"/>
+                </a:cubicBezTo>
+                <a:cubicBezTo>
+                  <a:pt x="9203673" y="2229005"/>
+                  <a:pt x="9192107" y="2169234"/>
+                  <a:pt x="9089136" y="2196766"/>
+                </a:cubicBezTo>
+                <a:cubicBezTo>
+                  <a:pt x="8986165" y="2224298"/>
+                  <a:pt x="8527716" y="2166506"/>
+                  <a:pt x="8371573" y="2196766"/>
+                </a:cubicBezTo>
+                <a:cubicBezTo>
+                  <a:pt x="8215430" y="2227026"/>
+                  <a:pt x="8241313" y="2186131"/>
+                  <a:pt x="8132385" y="2196766"/>
+                </a:cubicBezTo>
+                <a:cubicBezTo>
+                  <a:pt x="8023457" y="2207401"/>
+                  <a:pt x="7640588" y="2132422"/>
+                  <a:pt x="7414822" y="2196766"/>
+                </a:cubicBezTo>
+                <a:cubicBezTo>
+                  <a:pt x="7189056" y="2261110"/>
+                  <a:pt x="7176112" y="2195945"/>
+                  <a:pt x="7056040" y="2196766"/>
+                </a:cubicBezTo>
+                <a:cubicBezTo>
+                  <a:pt x="6935968" y="2197587"/>
+                  <a:pt x="6912748" y="2170222"/>
+                  <a:pt x="6816852" y="2196766"/>
+                </a:cubicBezTo>
+                <a:cubicBezTo>
+                  <a:pt x="6720956" y="2223310"/>
+                  <a:pt x="6564927" y="2161009"/>
+                  <a:pt x="6458071" y="2196766"/>
+                </a:cubicBezTo>
+                <a:cubicBezTo>
+                  <a:pt x="6351215" y="2232523"/>
+                  <a:pt x="5916981" y="2184052"/>
+                  <a:pt x="5740507" y="2196766"/>
+                </a:cubicBezTo>
+                <a:cubicBezTo>
+                  <a:pt x="5564033" y="2209480"/>
+                  <a:pt x="5537717" y="2178204"/>
+                  <a:pt x="5381725" y="2196766"/>
+                </a:cubicBezTo>
+                <a:cubicBezTo>
+                  <a:pt x="5225733" y="2215328"/>
+                  <a:pt x="5232365" y="2190719"/>
+                  <a:pt x="5142538" y="2196766"/>
+                </a:cubicBezTo>
+                <a:cubicBezTo>
+                  <a:pt x="5052711" y="2202813"/>
+                  <a:pt x="4856416" y="2158283"/>
+                  <a:pt x="4783756" y="2196766"/>
+                </a:cubicBezTo>
+                <a:cubicBezTo>
+                  <a:pt x="4711096" y="2235249"/>
+                  <a:pt x="4425589" y="2171672"/>
+                  <a:pt x="4305380" y="2196766"/>
+                </a:cubicBezTo>
+                <a:cubicBezTo>
+                  <a:pt x="4185171" y="2221860"/>
+                  <a:pt x="3950498" y="2147960"/>
+                  <a:pt x="3707411" y="2196766"/>
+                </a:cubicBezTo>
+                <a:cubicBezTo>
+                  <a:pt x="3464324" y="2245572"/>
+                  <a:pt x="3515905" y="2190588"/>
+                  <a:pt x="3348629" y="2196766"/>
+                </a:cubicBezTo>
+                <a:cubicBezTo>
+                  <a:pt x="3181353" y="2202944"/>
+                  <a:pt x="2831745" y="2103287"/>
+                  <a:pt x="2511472" y="2196766"/>
+                </a:cubicBezTo>
+                <a:cubicBezTo>
+                  <a:pt x="2191199" y="2290245"/>
+                  <a:pt x="2039266" y="2183894"/>
+                  <a:pt x="1913502" y="2196766"/>
+                </a:cubicBezTo>
+                <a:cubicBezTo>
+                  <a:pt x="1787738" y="2209638"/>
+                  <a:pt x="1485191" y="2130881"/>
+                  <a:pt x="1076345" y="2196766"/>
+                </a:cubicBezTo>
+                <a:cubicBezTo>
+                  <a:pt x="667499" y="2262651"/>
+                  <a:pt x="356434" y="2151542"/>
+                  <a:pt x="0" y="2196766"/>
+                </a:cubicBezTo>
+                <a:cubicBezTo>
+                  <a:pt x="-27522" y="2050472"/>
+                  <a:pt x="41352" y="1885939"/>
+                  <a:pt x="0" y="1669542"/>
+                </a:cubicBezTo>
+                <a:cubicBezTo>
+                  <a:pt x="-41352" y="1453145"/>
+                  <a:pt x="62065" y="1343013"/>
+                  <a:pt x="0" y="1142318"/>
+                </a:cubicBezTo>
+                <a:cubicBezTo>
+                  <a:pt x="-62065" y="941623"/>
+                  <a:pt x="33602" y="795252"/>
+                  <a:pt x="0" y="571159"/>
+                </a:cubicBezTo>
+                <a:cubicBezTo>
+                  <a:pt x="-33602" y="347066"/>
+                  <a:pt x="15641" y="168854"/>
+                  <a:pt x="0" y="0"/>
+                </a:cubicBezTo>
+                <a:close/>
+              </a:path>
+            </a:pathLst>
+          </a:custGeom>
+          <a:noFill/>
+          <a:ln>
+            <a:solidFill>
+              <a:srgbClr val="77B900"/>
+            </a:solidFill>
+            <a:extLst>
+              <a:ext uri="{C807C97D-BFC1-408E-A445-0C87EB9F89A2}">
+                <ask:lineSketchStyleProps xmlns:ask="http://schemas.microsoft.com/office/drawing/2018/sketchyshapes" sd="1219033472">
+                  <a:prstGeom prst="rect">
+                    <a:avLst/>
+                  </a:prstGeom>
+                  <ask:type>
+                    <ask:lineSketchScribble/>
+                  </ask:type>
+                </ask:lineSketchStyleProps>
+              </a:ext>
+            </a:extLst>
+          </a:ln>
+        </p:spPr>
+        <p:style>
+          <a:lnRef idx="2">
+            <a:schemeClr val="accent1">
+              <a:shade val="50000"/>
+            </a:schemeClr>
+          </a:lnRef>
+          <a:fillRef idx="1">
+            <a:schemeClr val="accent1"/>
+          </a:fillRef>
+          <a:effectRef idx="0">
+            <a:schemeClr val="accent1"/>
+          </a:effectRef>
+          <a:fontRef idx="minor">
+            <a:schemeClr val="lt1"/>
+          </a:fontRef>
+        </p:style>
+        <p:txBody>
+          <a:bodyPr rtlCol="0" anchor="ctr"/>
+          <a:lstStyle/>
+          <a:p>
+            <a:pPr algn="ctr"/>
+            <a:endParaRPr lang="pt-BR"/>
+          </a:p>
+        </p:txBody>
+      </p:sp>
+      <p:sp>
+        <p:nvSpPr>
+          <p:cNvPr id="37" name="Retângulo 36">
+            <a:extLst>
+              <a:ext uri="{FF2B5EF4-FFF2-40B4-BE49-F238E27FC236}">
+                <a16:creationId xmlns:a16="http://schemas.microsoft.com/office/drawing/2014/main" id="{B0588219-98E3-45BA-8FC7-9916B12911AB}"/>
+              </a:ext>
+            </a:extLst>
+          </p:cNvPr>
+          <p:cNvSpPr/>
+          <p:nvPr/>
+        </p:nvSpPr>
+        <p:spPr>
+          <a:xfrm>
+            <a:off x="116305" y="3058139"/>
+            <a:ext cx="11959390" cy="3633605"/>
+          </a:xfrm>
+          <a:custGeom>
+            <a:avLst/>
+            <a:gdLst>
+              <a:gd name="connsiteX0" fmla="*/ 0 w 11959390"/>
+              <a:gd name="connsiteY0" fmla="*/ 0 h 3633605"/>
+              <a:gd name="connsiteX1" fmla="*/ 478376 w 11959390"/>
+              <a:gd name="connsiteY1" fmla="*/ 0 h 3633605"/>
+              <a:gd name="connsiteX2" fmla="*/ 717563 w 11959390"/>
+              <a:gd name="connsiteY2" fmla="*/ 0 h 3633605"/>
+              <a:gd name="connsiteX3" fmla="*/ 1554721 w 11959390"/>
+              <a:gd name="connsiteY3" fmla="*/ 0 h 3633605"/>
+              <a:gd name="connsiteX4" fmla="*/ 2033096 w 11959390"/>
+              <a:gd name="connsiteY4" fmla="*/ 0 h 3633605"/>
+              <a:gd name="connsiteX5" fmla="*/ 2511472 w 11959390"/>
+              <a:gd name="connsiteY5" fmla="*/ 0 h 3633605"/>
+              <a:gd name="connsiteX6" fmla="*/ 3348629 w 11959390"/>
+              <a:gd name="connsiteY6" fmla="*/ 0 h 3633605"/>
+              <a:gd name="connsiteX7" fmla="*/ 3707411 w 11959390"/>
+              <a:gd name="connsiteY7" fmla="*/ 0 h 3633605"/>
+              <a:gd name="connsiteX8" fmla="*/ 4544568 w 11959390"/>
+              <a:gd name="connsiteY8" fmla="*/ 0 h 3633605"/>
+              <a:gd name="connsiteX9" fmla="*/ 5381726 w 11959390"/>
+              <a:gd name="connsiteY9" fmla="*/ 0 h 3633605"/>
+              <a:gd name="connsiteX10" fmla="*/ 5979695 w 11959390"/>
+              <a:gd name="connsiteY10" fmla="*/ 0 h 3633605"/>
+              <a:gd name="connsiteX11" fmla="*/ 6816852 w 11959390"/>
+              <a:gd name="connsiteY11" fmla="*/ 0 h 3633605"/>
+              <a:gd name="connsiteX12" fmla="*/ 7295228 w 11959390"/>
+              <a:gd name="connsiteY12" fmla="*/ 0 h 3633605"/>
+              <a:gd name="connsiteX13" fmla="*/ 7773604 w 11959390"/>
+              <a:gd name="connsiteY13" fmla="*/ 0 h 3633605"/>
+              <a:gd name="connsiteX14" fmla="*/ 8491167 w 11959390"/>
+              <a:gd name="connsiteY14" fmla="*/ 0 h 3633605"/>
+              <a:gd name="connsiteX15" fmla="*/ 8969543 w 11959390"/>
+              <a:gd name="connsiteY15" fmla="*/ 0 h 3633605"/>
+              <a:gd name="connsiteX16" fmla="*/ 9806700 w 11959390"/>
+              <a:gd name="connsiteY16" fmla="*/ 0 h 3633605"/>
+              <a:gd name="connsiteX17" fmla="*/ 10643857 w 11959390"/>
+              <a:gd name="connsiteY17" fmla="*/ 0 h 3633605"/>
+              <a:gd name="connsiteX18" fmla="*/ 11241827 w 11959390"/>
+              <a:gd name="connsiteY18" fmla="*/ 0 h 3633605"/>
+              <a:gd name="connsiteX19" fmla="*/ 11959390 w 11959390"/>
+              <a:gd name="connsiteY19" fmla="*/ 0 h 3633605"/>
+              <a:gd name="connsiteX20" fmla="*/ 11959390 w 11959390"/>
+              <a:gd name="connsiteY20" fmla="*/ 410078 h 3633605"/>
+              <a:gd name="connsiteX21" fmla="*/ 11959390 w 11959390"/>
+              <a:gd name="connsiteY21" fmla="*/ 856493 h 3633605"/>
+              <a:gd name="connsiteX22" fmla="*/ 11959390 w 11959390"/>
+              <a:gd name="connsiteY22" fmla="*/ 1411915 h 3633605"/>
+              <a:gd name="connsiteX23" fmla="*/ 11959390 w 11959390"/>
+              <a:gd name="connsiteY23" fmla="*/ 1894665 h 3633605"/>
+              <a:gd name="connsiteX24" fmla="*/ 11959390 w 11959390"/>
+              <a:gd name="connsiteY24" fmla="*/ 2341080 h 3633605"/>
+              <a:gd name="connsiteX25" fmla="*/ 11959390 w 11959390"/>
+              <a:gd name="connsiteY25" fmla="*/ 2896502 h 3633605"/>
+              <a:gd name="connsiteX26" fmla="*/ 11959390 w 11959390"/>
+              <a:gd name="connsiteY26" fmla="*/ 3633605 h 3633605"/>
+              <a:gd name="connsiteX27" fmla="*/ 11361421 w 11959390"/>
+              <a:gd name="connsiteY27" fmla="*/ 3633605 h 3633605"/>
+              <a:gd name="connsiteX28" fmla="*/ 11002639 w 11959390"/>
+              <a:gd name="connsiteY28" fmla="*/ 3633605 h 3633605"/>
+              <a:gd name="connsiteX29" fmla="*/ 10285075 w 11959390"/>
+              <a:gd name="connsiteY29" fmla="*/ 3633605 h 3633605"/>
+              <a:gd name="connsiteX30" fmla="*/ 9926294 w 11959390"/>
+              <a:gd name="connsiteY30" fmla="*/ 3633605 h 3633605"/>
+              <a:gd name="connsiteX31" fmla="*/ 9208730 w 11959390"/>
+              <a:gd name="connsiteY31" fmla="*/ 3633605 h 3633605"/>
+              <a:gd name="connsiteX32" fmla="*/ 8969543 w 11959390"/>
+              <a:gd name="connsiteY32" fmla="*/ 3633605 h 3633605"/>
+              <a:gd name="connsiteX33" fmla="*/ 8251979 w 11959390"/>
+              <a:gd name="connsiteY33" fmla="*/ 3633605 h 3633605"/>
+              <a:gd name="connsiteX34" fmla="*/ 7893197 w 11959390"/>
+              <a:gd name="connsiteY34" fmla="*/ 3633605 h 3633605"/>
+              <a:gd name="connsiteX35" fmla="*/ 7654010 w 11959390"/>
+              <a:gd name="connsiteY35" fmla="*/ 3633605 h 3633605"/>
+              <a:gd name="connsiteX36" fmla="*/ 7295228 w 11959390"/>
+              <a:gd name="connsiteY36" fmla="*/ 3633605 h 3633605"/>
+              <a:gd name="connsiteX37" fmla="*/ 6577664 w 11959390"/>
+              <a:gd name="connsiteY37" fmla="*/ 3633605 h 3633605"/>
+              <a:gd name="connsiteX38" fmla="*/ 6218883 w 11959390"/>
+              <a:gd name="connsiteY38" fmla="*/ 3633605 h 3633605"/>
+              <a:gd name="connsiteX39" fmla="*/ 5979695 w 11959390"/>
+              <a:gd name="connsiteY39" fmla="*/ 3633605 h 3633605"/>
+              <a:gd name="connsiteX40" fmla="*/ 5620913 w 11959390"/>
+              <a:gd name="connsiteY40" fmla="*/ 3633605 h 3633605"/>
+              <a:gd name="connsiteX41" fmla="*/ 5142538 w 11959390"/>
+              <a:gd name="connsiteY41" fmla="*/ 3633605 h 3633605"/>
+              <a:gd name="connsiteX42" fmla="*/ 4544568 w 11959390"/>
+              <a:gd name="connsiteY42" fmla="*/ 3633605 h 3633605"/>
+              <a:gd name="connsiteX43" fmla="*/ 4185786 w 11959390"/>
+              <a:gd name="connsiteY43" fmla="*/ 3633605 h 3633605"/>
+              <a:gd name="connsiteX44" fmla="*/ 3348629 w 11959390"/>
+              <a:gd name="connsiteY44" fmla="*/ 3633605 h 3633605"/>
+              <a:gd name="connsiteX45" fmla="*/ 2750660 w 11959390"/>
+              <a:gd name="connsiteY45" fmla="*/ 3633605 h 3633605"/>
+              <a:gd name="connsiteX46" fmla="*/ 1913502 w 11959390"/>
+              <a:gd name="connsiteY46" fmla="*/ 3633605 h 3633605"/>
+              <a:gd name="connsiteX47" fmla="*/ 1195939 w 11959390"/>
+              <a:gd name="connsiteY47" fmla="*/ 3633605 h 3633605"/>
+              <a:gd name="connsiteX48" fmla="*/ 717563 w 11959390"/>
+              <a:gd name="connsiteY48" fmla="*/ 3633605 h 3633605"/>
+              <a:gd name="connsiteX49" fmla="*/ 0 w 11959390"/>
+              <a:gd name="connsiteY49" fmla="*/ 3633605 h 3633605"/>
+              <a:gd name="connsiteX50" fmla="*/ 0 w 11959390"/>
+              <a:gd name="connsiteY50" fmla="*/ 3187191 h 3633605"/>
+              <a:gd name="connsiteX51" fmla="*/ 0 w 11959390"/>
+              <a:gd name="connsiteY51" fmla="*/ 2668104 h 3633605"/>
+              <a:gd name="connsiteX52" fmla="*/ 0 w 11959390"/>
+              <a:gd name="connsiteY52" fmla="*/ 2076346 h 3633605"/>
+              <a:gd name="connsiteX53" fmla="*/ 0 w 11959390"/>
+              <a:gd name="connsiteY53" fmla="*/ 1484587 h 3633605"/>
+              <a:gd name="connsiteX54" fmla="*/ 0 w 11959390"/>
+              <a:gd name="connsiteY54" fmla="*/ 929165 h 3633605"/>
+              <a:gd name="connsiteX55" fmla="*/ 0 w 11959390"/>
+              <a:gd name="connsiteY55" fmla="*/ 0 h 3633605"/>
+            </a:gdLst>
+            <a:ahLst/>
+            <a:cxnLst>
+              <a:cxn ang="0">
+                <a:pos x="connsiteX0" y="connsiteY0"/>
+              </a:cxn>
+              <a:cxn ang="0">
+                <a:pos x="connsiteX1" y="connsiteY1"/>
+              </a:cxn>
+              <a:cxn ang="0">
+                <a:pos x="connsiteX2" y="connsiteY2"/>
+              </a:cxn>
+              <a:cxn ang="0">
+                <a:pos x="connsiteX3" y="connsiteY3"/>
+              </a:cxn>
+              <a:cxn ang="0">
+                <a:pos x="connsiteX4" y="connsiteY4"/>
+              </a:cxn>
+              <a:cxn ang="0">
+                <a:pos x="connsiteX5" y="connsiteY5"/>
+              </a:cxn>
+              <a:cxn ang="0">
+                <a:pos x="connsiteX6" y="connsiteY6"/>
+              </a:cxn>
+              <a:cxn ang="0">
+                <a:pos x="connsiteX7" y="connsiteY7"/>
+              </a:cxn>
+              <a:cxn ang="0">
+                <a:pos x="connsiteX8" y="connsiteY8"/>
+              </a:cxn>
+              <a:cxn ang="0">
+                <a:pos x="connsiteX9" y="connsiteY9"/>
+              </a:cxn>
+              <a:cxn ang="0">
+                <a:pos x="connsiteX10" y="connsiteY10"/>
+              </a:cxn>
+              <a:cxn ang="0">
+                <a:pos x="connsiteX11" y="connsiteY11"/>
+              </a:cxn>
+              <a:cxn ang="0">
+                <a:pos x="connsiteX12" y="connsiteY12"/>
+              </a:cxn>
+              <a:cxn ang="0">
+                <a:pos x="connsiteX13" y="connsiteY13"/>
+              </a:cxn>
+              <a:cxn ang="0">
+                <a:pos x="connsiteX14" y="connsiteY14"/>
+              </a:cxn>
+              <a:cxn ang="0">
+                <a:pos x="connsiteX15" y="connsiteY15"/>
+              </a:cxn>
+              <a:cxn ang="0">
+                <a:pos x="connsiteX16" y="connsiteY16"/>
+              </a:cxn>
+              <a:cxn ang="0">
+                <a:pos x="connsiteX17" y="connsiteY17"/>
+              </a:cxn>
+              <a:cxn ang="0">
+                <a:pos x="connsiteX18" y="connsiteY18"/>
+              </a:cxn>
+              <a:cxn ang="0">
+                <a:pos x="connsiteX19" y="connsiteY19"/>
+              </a:cxn>
+              <a:cxn ang="0">
+                <a:pos x="connsiteX20" y="connsiteY20"/>
+              </a:cxn>
+              <a:cxn ang="0">
+                <a:pos x="connsiteX21" y="connsiteY21"/>
+              </a:cxn>
+              <a:cxn ang="0">
+                <a:pos x="connsiteX22" y="connsiteY22"/>
+              </a:cxn>
+              <a:cxn ang="0">
+                <a:pos x="connsiteX23" y="connsiteY23"/>
+              </a:cxn>
+              <a:cxn ang="0">
+                <a:pos x="connsiteX24" y="connsiteY24"/>
+              </a:cxn>
+              <a:cxn ang="0">
+                <a:pos x="connsiteX25" y="connsiteY25"/>
+              </a:cxn>
+              <a:cxn ang="0">
+                <a:pos x="connsiteX26" y="connsiteY26"/>
+              </a:cxn>
+              <a:cxn ang="0">
+                <a:pos x="connsiteX27" y="connsiteY27"/>
+              </a:cxn>
+              <a:cxn ang="0">
+                <a:pos x="connsiteX28" y="connsiteY28"/>
+              </a:cxn>
+              <a:cxn ang="0">
+                <a:pos x="connsiteX29" y="connsiteY29"/>
+              </a:cxn>
+              <a:cxn ang="0">
+                <a:pos x="connsiteX30" y="connsiteY30"/>
+              </a:cxn>
+              <a:cxn ang="0">
+                <a:pos x="connsiteX31" y="connsiteY31"/>
+              </a:cxn>
+              <a:cxn ang="0">
+                <a:pos x="connsiteX32" y="connsiteY32"/>
+              </a:cxn>
+              <a:cxn ang="0">
+                <a:pos x="connsiteX33" y="connsiteY33"/>
+              </a:cxn>
+              <a:cxn ang="0">
+                <a:pos x="connsiteX34" y="connsiteY34"/>
+              </a:cxn>
+              <a:cxn ang="0">
+                <a:pos x="connsiteX35" y="connsiteY35"/>
+              </a:cxn>
+              <a:cxn ang="0">
+                <a:pos x="connsiteX36" y="connsiteY36"/>
+              </a:cxn>
+              <a:cxn ang="0">
+                <a:pos x="connsiteX37" y="connsiteY37"/>
+              </a:cxn>
+              <a:cxn ang="0">
+                <a:pos x="connsiteX38" y="connsiteY38"/>
+              </a:cxn>
+              <a:cxn ang="0">
+                <a:pos x="connsiteX39" y="connsiteY39"/>
+              </a:cxn>
+              <a:cxn ang="0">
+                <a:pos x="connsiteX40" y="connsiteY40"/>
+              </a:cxn>
+              <a:cxn ang="0">
+                <a:pos x="connsiteX41" y="connsiteY41"/>
+              </a:cxn>
+              <a:cxn ang="0">
+                <a:pos x="connsiteX42" y="connsiteY42"/>
+              </a:cxn>
+              <a:cxn ang="0">
+                <a:pos x="connsiteX43" y="connsiteY43"/>
+              </a:cxn>
+              <a:cxn ang="0">
+                <a:pos x="connsiteX44" y="connsiteY44"/>
+              </a:cxn>
+              <a:cxn ang="0">
+                <a:pos x="connsiteX45" y="connsiteY45"/>
+              </a:cxn>
+              <a:cxn ang="0">
+                <a:pos x="connsiteX46" y="connsiteY46"/>
+              </a:cxn>
+              <a:cxn ang="0">
+                <a:pos x="connsiteX47" y="connsiteY47"/>
+              </a:cxn>
+              <a:cxn ang="0">
+                <a:pos x="connsiteX48" y="connsiteY48"/>
+              </a:cxn>
+              <a:cxn ang="0">
+                <a:pos x="connsiteX49" y="connsiteY49"/>
+              </a:cxn>
+              <a:cxn ang="0">
+                <a:pos x="connsiteX50" y="connsiteY50"/>
+              </a:cxn>
+              <a:cxn ang="0">
+                <a:pos x="connsiteX51" y="connsiteY51"/>
+              </a:cxn>
+              <a:cxn ang="0">
+                <a:pos x="connsiteX52" y="connsiteY52"/>
+              </a:cxn>
+              <a:cxn ang="0">
+                <a:pos x="connsiteX53" y="connsiteY53"/>
+              </a:cxn>
+              <a:cxn ang="0">
+                <a:pos x="connsiteX54" y="connsiteY54"/>
+              </a:cxn>
+              <a:cxn ang="0">
+                <a:pos x="connsiteX55" y="connsiteY55"/>
+              </a:cxn>
+            </a:cxnLst>
+            <a:rect l="l" t="t" r="r" b="b"/>
+            <a:pathLst>
+              <a:path w="11959390" h="3633605" extrusionOk="0">
+                <a:moveTo>
+                  <a:pt x="0" y="0"/>
+                </a:moveTo>
+                <a:cubicBezTo>
+                  <a:pt x="135343" y="-1514"/>
+                  <a:pt x="323591" y="3847"/>
+                  <a:pt x="478376" y="0"/>
+                </a:cubicBezTo>
+                <a:cubicBezTo>
+                  <a:pt x="633161" y="-3847"/>
+                  <a:pt x="664310" y="404"/>
+                  <a:pt x="717563" y="0"/>
+                </a:cubicBezTo>
+                <a:cubicBezTo>
+                  <a:pt x="770816" y="-404"/>
+                  <a:pt x="1353192" y="50327"/>
+                  <a:pt x="1554721" y="0"/>
+                </a:cubicBezTo>
+                <a:cubicBezTo>
+                  <a:pt x="1756250" y="-50327"/>
+                  <a:pt x="1911369" y="12483"/>
+                  <a:pt x="2033096" y="0"/>
+                </a:cubicBezTo>
+                <a:cubicBezTo>
+                  <a:pt x="2154823" y="-12483"/>
+                  <a:pt x="2405603" y="52223"/>
+                  <a:pt x="2511472" y="0"/>
+                </a:cubicBezTo>
+                <a:cubicBezTo>
+                  <a:pt x="2617341" y="-52223"/>
+                  <a:pt x="3135884" y="84135"/>
+                  <a:pt x="3348629" y="0"/>
+                </a:cubicBezTo>
+                <a:cubicBezTo>
+                  <a:pt x="3561374" y="-84135"/>
+                  <a:pt x="3530747" y="31335"/>
+                  <a:pt x="3707411" y="0"/>
+                </a:cubicBezTo>
+                <a:cubicBezTo>
+                  <a:pt x="3884075" y="-31335"/>
+                  <a:pt x="4295250" y="8001"/>
+                  <a:pt x="4544568" y="0"/>
+                </a:cubicBezTo>
+                <a:cubicBezTo>
+                  <a:pt x="4793886" y="-8001"/>
+                  <a:pt x="4993373" y="57036"/>
+                  <a:pt x="5381726" y="0"/>
+                </a:cubicBezTo>
+                <a:cubicBezTo>
+                  <a:pt x="5770079" y="-57036"/>
+                  <a:pt x="5708786" y="19146"/>
+                  <a:pt x="5979695" y="0"/>
+                </a:cubicBezTo>
+                <a:cubicBezTo>
+                  <a:pt x="6250604" y="-19146"/>
+                  <a:pt x="6525606" y="34935"/>
+                  <a:pt x="6816852" y="0"/>
+                </a:cubicBezTo>
+                <a:cubicBezTo>
+                  <a:pt x="7108098" y="-34935"/>
+                  <a:pt x="7112919" y="20081"/>
+                  <a:pt x="7295228" y="0"/>
+                </a:cubicBezTo>
+                <a:cubicBezTo>
+                  <a:pt x="7477537" y="-20081"/>
+                  <a:pt x="7542384" y="28356"/>
+                  <a:pt x="7773604" y="0"/>
+                </a:cubicBezTo>
+                <a:cubicBezTo>
+                  <a:pt x="8004824" y="-28356"/>
+                  <a:pt x="8149764" y="39461"/>
+                  <a:pt x="8491167" y="0"/>
+                </a:cubicBezTo>
+                <a:cubicBezTo>
+                  <a:pt x="8832570" y="-39461"/>
+                  <a:pt x="8745568" y="24235"/>
+                  <a:pt x="8969543" y="0"/>
+                </a:cubicBezTo>
+                <a:cubicBezTo>
+                  <a:pt x="9193518" y="-24235"/>
+                  <a:pt x="9455059" y="54935"/>
+                  <a:pt x="9806700" y="0"/>
+                </a:cubicBezTo>
+                <a:cubicBezTo>
+                  <a:pt x="10158341" y="-54935"/>
+                  <a:pt x="10470924" y="78141"/>
+                  <a:pt x="10643857" y="0"/>
+                </a:cubicBezTo>
+                <a:cubicBezTo>
+                  <a:pt x="10816790" y="-78141"/>
+                  <a:pt x="11065475" y="29187"/>
+                  <a:pt x="11241827" y="0"/>
+                </a:cubicBezTo>
+                <a:cubicBezTo>
+                  <a:pt x="11418179" y="-29187"/>
+                  <a:pt x="11742903" y="11800"/>
+                  <a:pt x="11959390" y="0"/>
+                </a:cubicBezTo>
+                <a:cubicBezTo>
+                  <a:pt x="11970539" y="112762"/>
+                  <a:pt x="11953440" y="255742"/>
+                  <a:pt x="11959390" y="410078"/>
+                </a:cubicBezTo>
+                <a:cubicBezTo>
+                  <a:pt x="11965340" y="564414"/>
+                  <a:pt x="11939405" y="651118"/>
+                  <a:pt x="11959390" y="856493"/>
+                </a:cubicBezTo>
+                <a:cubicBezTo>
+                  <a:pt x="11979375" y="1061869"/>
+                  <a:pt x="11946471" y="1265257"/>
+                  <a:pt x="11959390" y="1411915"/>
+                </a:cubicBezTo>
+                <a:cubicBezTo>
+                  <a:pt x="11972309" y="1558573"/>
+                  <a:pt x="11957853" y="1739545"/>
+                  <a:pt x="11959390" y="1894665"/>
+                </a:cubicBezTo>
+                <a:cubicBezTo>
+                  <a:pt x="11960927" y="2049785"/>
+                  <a:pt x="11956958" y="2219795"/>
+                  <a:pt x="11959390" y="2341080"/>
+                </a:cubicBezTo>
+                <a:cubicBezTo>
+                  <a:pt x="11961822" y="2462366"/>
+                  <a:pt x="11923688" y="2694920"/>
+                  <a:pt x="11959390" y="2896502"/>
+                </a:cubicBezTo>
+                <a:cubicBezTo>
+                  <a:pt x="11995092" y="3098084"/>
+                  <a:pt x="11877391" y="3478035"/>
+                  <a:pt x="11959390" y="3633605"/>
+                </a:cubicBezTo>
+                <a:cubicBezTo>
+                  <a:pt x="11815742" y="3688194"/>
+                  <a:pt x="11543222" y="3632295"/>
+                  <a:pt x="11361421" y="3633605"/>
+                </a:cubicBezTo>
+                <a:cubicBezTo>
+                  <a:pt x="11179620" y="3634915"/>
+                  <a:pt x="11144914" y="3633058"/>
+                  <a:pt x="11002639" y="3633605"/>
+                </a:cubicBezTo>
+                <a:cubicBezTo>
+                  <a:pt x="10860364" y="3634152"/>
+                  <a:pt x="10529320" y="3601366"/>
+                  <a:pt x="10285075" y="3633605"/>
+                </a:cubicBezTo>
+                <a:cubicBezTo>
+                  <a:pt x="10040830" y="3665844"/>
+                  <a:pt x="10023209" y="3598972"/>
+                  <a:pt x="9926294" y="3633605"/>
+                </a:cubicBezTo>
+                <a:cubicBezTo>
+                  <a:pt x="9829379" y="3668238"/>
+                  <a:pt x="9365339" y="3606751"/>
+                  <a:pt x="9208730" y="3633605"/>
+                </a:cubicBezTo>
+                <a:cubicBezTo>
+                  <a:pt x="9052121" y="3660459"/>
+                  <a:pt x="9063590" y="3608694"/>
+                  <a:pt x="8969543" y="3633605"/>
+                </a:cubicBezTo>
+                <a:cubicBezTo>
+                  <a:pt x="8875496" y="3658516"/>
+                  <a:pt x="8478763" y="3572940"/>
+                  <a:pt x="8251979" y="3633605"/>
+                </a:cubicBezTo>
+                <a:cubicBezTo>
+                  <a:pt x="8025195" y="3694270"/>
+                  <a:pt x="8013269" y="3632784"/>
+                  <a:pt x="7893197" y="3633605"/>
+                </a:cubicBezTo>
+                <a:cubicBezTo>
+                  <a:pt x="7773125" y="3634426"/>
+                  <a:pt x="7735479" y="3619287"/>
+                  <a:pt x="7654010" y="3633605"/>
+                </a:cubicBezTo>
+                <a:cubicBezTo>
+                  <a:pt x="7572541" y="3647923"/>
+                  <a:pt x="7413204" y="3605261"/>
+                  <a:pt x="7295228" y="3633605"/>
+                </a:cubicBezTo>
+                <a:cubicBezTo>
+                  <a:pt x="7177252" y="3661949"/>
+                  <a:pt x="6754138" y="3620891"/>
+                  <a:pt x="6577664" y="3633605"/>
+                </a:cubicBezTo>
+                <a:cubicBezTo>
+                  <a:pt x="6401190" y="3646319"/>
+                  <a:pt x="6368969" y="3612582"/>
+                  <a:pt x="6218883" y="3633605"/>
+                </a:cubicBezTo>
+                <a:cubicBezTo>
+                  <a:pt x="6068797" y="3654628"/>
+                  <a:pt x="6074870" y="3605552"/>
+                  <a:pt x="5979695" y="3633605"/>
+                </a:cubicBezTo>
+                <a:cubicBezTo>
+                  <a:pt x="5884520" y="3661658"/>
+                  <a:pt x="5693573" y="3595122"/>
+                  <a:pt x="5620913" y="3633605"/>
+                </a:cubicBezTo>
+                <a:cubicBezTo>
+                  <a:pt x="5548253" y="3672088"/>
+                  <a:pt x="5257940" y="3602182"/>
+                  <a:pt x="5142538" y="3633605"/>
+                </a:cubicBezTo>
+                <a:cubicBezTo>
+                  <a:pt x="5027136" y="3665028"/>
+                  <a:pt x="4787917" y="3588395"/>
+                  <a:pt x="4544568" y="3633605"/>
+                </a:cubicBezTo>
+                <a:cubicBezTo>
+                  <a:pt x="4301219" y="3678815"/>
+                  <a:pt x="4353062" y="3627427"/>
+                  <a:pt x="4185786" y="3633605"/>
+                </a:cubicBezTo>
+                <a:cubicBezTo>
+                  <a:pt x="4018510" y="3639783"/>
+                  <a:pt x="3668902" y="3540126"/>
+                  <a:pt x="3348629" y="3633605"/>
+                </a:cubicBezTo>
+                <a:cubicBezTo>
+                  <a:pt x="3028356" y="3727084"/>
+                  <a:pt x="2872658" y="3618216"/>
+                  <a:pt x="2750660" y="3633605"/>
+                </a:cubicBezTo>
+                <a:cubicBezTo>
+                  <a:pt x="2628662" y="3648994"/>
+                  <a:pt x="2322924" y="3571718"/>
+                  <a:pt x="1913502" y="3633605"/>
+                </a:cubicBezTo>
+                <a:cubicBezTo>
+                  <a:pt x="1504080" y="3695492"/>
+                  <a:pt x="1373873" y="3630150"/>
+                  <a:pt x="1195939" y="3633605"/>
+                </a:cubicBezTo>
+                <a:cubicBezTo>
+                  <a:pt x="1018005" y="3637060"/>
+                  <a:pt x="877467" y="3592415"/>
+                  <a:pt x="717563" y="3633605"/>
+                </a:cubicBezTo>
+                <a:cubicBezTo>
+                  <a:pt x="557659" y="3674795"/>
+                  <a:pt x="210106" y="3558819"/>
+                  <a:pt x="0" y="3633605"/>
+                </a:cubicBezTo>
+                <a:cubicBezTo>
+                  <a:pt x="-14144" y="3467542"/>
+                  <a:pt x="52056" y="3329871"/>
+                  <a:pt x="0" y="3187191"/>
+                </a:cubicBezTo>
+                <a:cubicBezTo>
+                  <a:pt x="-52056" y="3044511"/>
+                  <a:pt x="21818" y="2773440"/>
+                  <a:pt x="0" y="2668104"/>
+                </a:cubicBezTo>
+                <a:cubicBezTo>
+                  <a:pt x="-21818" y="2562768"/>
+                  <a:pt x="17221" y="2225498"/>
+                  <a:pt x="0" y="2076346"/>
+                </a:cubicBezTo>
+                <a:cubicBezTo>
+                  <a:pt x="-17221" y="1927194"/>
+                  <a:pt x="6711" y="1668141"/>
+                  <a:pt x="0" y="1484587"/>
+                </a:cubicBezTo>
+                <a:cubicBezTo>
+                  <a:pt x="-6711" y="1301033"/>
+                  <a:pt x="4258" y="1147035"/>
+                  <a:pt x="0" y="929165"/>
+                </a:cubicBezTo>
+                <a:cubicBezTo>
+                  <a:pt x="-4258" y="711295"/>
+                  <a:pt x="75054" y="402789"/>
+                  <a:pt x="0" y="0"/>
+                </a:cubicBezTo>
+                <a:close/>
+              </a:path>
+            </a:pathLst>
+          </a:custGeom>
+          <a:noFill/>
+          <a:ln>
+            <a:solidFill>
+              <a:srgbClr val="77B900"/>
+            </a:solidFill>
+            <a:extLst>
+              <a:ext uri="{C807C97D-BFC1-408E-A445-0C87EB9F89A2}">
+                <ask:lineSketchStyleProps xmlns:ask="http://schemas.microsoft.com/office/drawing/2018/sketchyshapes" sd="1219033472">
+                  <a:prstGeom prst="rect">
+                    <a:avLst/>
+                  </a:prstGeom>
+                  <ask:type>
+                    <ask:lineSketchScribble/>
+                  </ask:type>
+                </ask:lineSketchStyleProps>
+              </a:ext>
+            </a:extLst>
+          </a:ln>
+        </p:spPr>
+        <p:style>
+          <a:lnRef idx="2">
+            <a:schemeClr val="accent1">
+              <a:shade val="50000"/>
+            </a:schemeClr>
+          </a:lnRef>
+          <a:fillRef idx="1">
+            <a:schemeClr val="accent1"/>
+          </a:fillRef>
+          <a:effectRef idx="0">
+            <a:schemeClr val="accent1"/>
+          </a:effectRef>
+          <a:fontRef idx="minor">
+            <a:schemeClr val="lt1"/>
+          </a:fontRef>
+        </p:style>
+        <p:txBody>
+          <a:bodyPr rtlCol="0" anchor="ctr"/>
+          <a:lstStyle/>
+          <a:p>
+            <a:pPr algn="ctr"/>
+            <a:endParaRPr lang="pt-BR"/>
+          </a:p>
+        </p:txBody>
+      </p:sp>
+      <p:sp>
+        <p:nvSpPr>
+          <p:cNvPr id="38" name="CaixaDeTexto 37">
+            <a:extLst>
+              <a:ext uri="{FF2B5EF4-FFF2-40B4-BE49-F238E27FC236}">
+                <a16:creationId xmlns:a16="http://schemas.microsoft.com/office/drawing/2014/main" id="{048DA6BA-1BFE-43E3-A8B9-3FF54ECF719A}"/>
+              </a:ext>
+            </a:extLst>
+          </p:cNvPr>
+          <p:cNvSpPr txBox="1"/>
+          <p:nvPr/>
+        </p:nvSpPr>
+        <p:spPr>
+          <a:xfrm>
+            <a:off x="22103" y="679352"/>
+            <a:ext cx="12131752" cy="400110"/>
+          </a:xfrm>
+          <a:prstGeom prst="rect">
+            <a:avLst/>
+          </a:prstGeom>
+          <a:solidFill>
+            <a:srgbClr val="77B900"/>
+          </a:solidFill>
+          <a:effectLst>
+            <a:softEdge rad="50800"/>
+          </a:effectLst>
+        </p:spPr>
+        <p:txBody>
+          <a:bodyPr wrap="square">
+            <a:spAutoFit/>
+          </a:bodyPr>
+          <a:lstStyle/>
+          <a:p>
+            <a:pPr algn="ctr"/>
+            <a:r>
+              <a:rPr lang="pt-BR" sz="2000" b="1" i="0" dirty="0" err="1">
+                <a:solidFill>
+                  <a:schemeClr val="tx1">
+                    <a:lumMod val="75000"/>
+                    <a:lumOff val="25000"/>
+                  </a:schemeClr>
+                </a:solidFill>
+                <a:effectLst>
+                  <a:outerShdw blurRad="38100" dist="38100" dir="2700000" algn="tl">
+                    <a:srgbClr val="000000">
+                      <a:alpha val="43137"/>
+                    </a:srgbClr>
+                  </a:outerShdw>
+                </a:effectLst>
+                <a:latin typeface="DINPro"/>
+              </a:rPr>
+              <a:t>Layer</a:t>
+            </a:r>
+            <a:r>
+              <a:rPr lang="pt-BR" sz="2000" b="1" i="0" dirty="0">
+                <a:solidFill>
+                  <a:schemeClr val="tx1">
+                    <a:lumMod val="75000"/>
+                    <a:lumOff val="25000"/>
+                  </a:schemeClr>
+                </a:solidFill>
+                <a:effectLst>
+                  <a:outerShdw blurRad="38100" dist="38100" dir="2700000" algn="tl">
+                    <a:srgbClr val="000000">
+                      <a:alpha val="43137"/>
+                    </a:srgbClr>
+                  </a:outerShdw>
+                </a:effectLst>
+                <a:latin typeface="DINPro"/>
+              </a:rPr>
+              <a:t> 1 - Data</a:t>
+            </a:r>
+            <a:endParaRPr lang="pt-BR" sz="2000" b="1" dirty="0">
+              <a:solidFill>
+                <a:schemeClr val="tx1">
+                  <a:lumMod val="75000"/>
+                  <a:lumOff val="25000"/>
+                </a:schemeClr>
+              </a:solidFill>
+              <a:effectLst>
+                <a:outerShdw blurRad="38100" dist="38100" dir="2700000" algn="tl">
+                  <a:srgbClr val="000000">
+                    <a:alpha val="43137"/>
+                  </a:srgbClr>
+                </a:outerShdw>
+              </a:effectLst>
+            </a:endParaRPr>
+          </a:p>
+        </p:txBody>
+      </p:sp>
+      <p:sp>
+        <p:nvSpPr>
+          <p:cNvPr id="39" name="CaixaDeTexto 38">
+            <a:extLst>
+              <a:ext uri="{FF2B5EF4-FFF2-40B4-BE49-F238E27FC236}">
+                <a16:creationId xmlns:a16="http://schemas.microsoft.com/office/drawing/2014/main" id="{0028289A-B437-4D54-8BDF-9737802579F2}"/>
+              </a:ext>
+            </a:extLst>
+          </p:cNvPr>
+          <p:cNvSpPr txBox="1"/>
+          <p:nvPr/>
+        </p:nvSpPr>
+        <p:spPr>
+          <a:xfrm>
+            <a:off x="22103" y="2838026"/>
+            <a:ext cx="12191998" cy="400110"/>
+          </a:xfrm>
+          <a:prstGeom prst="rect">
+            <a:avLst/>
+          </a:prstGeom>
+          <a:solidFill>
+            <a:srgbClr val="77B900"/>
+          </a:solidFill>
+          <a:effectLst>
+            <a:softEdge rad="50800"/>
+          </a:effectLst>
+        </p:spPr>
+        <p:txBody>
+          <a:bodyPr wrap="square">
+            <a:spAutoFit/>
+          </a:bodyPr>
+          <a:lstStyle/>
+          <a:p>
+            <a:pPr algn="ctr"/>
+            <a:r>
+              <a:rPr lang="pt-BR" sz="2000" b="1" i="0" dirty="0" err="1">
+                <a:solidFill>
+                  <a:schemeClr val="tx1">
+                    <a:lumMod val="75000"/>
+                    <a:lumOff val="25000"/>
+                  </a:schemeClr>
+                </a:solidFill>
+                <a:effectLst>
+                  <a:outerShdw blurRad="38100" dist="38100" dir="2700000" algn="tl">
+                    <a:srgbClr val="000000">
+                      <a:alpha val="43137"/>
+                    </a:srgbClr>
+                  </a:outerShdw>
+                </a:effectLst>
+                <a:latin typeface="DINPro"/>
+              </a:rPr>
+              <a:t>Layer</a:t>
+            </a:r>
+            <a:r>
+              <a:rPr lang="pt-BR" sz="2000" b="1" i="0" dirty="0">
+                <a:solidFill>
+                  <a:schemeClr val="tx1">
+                    <a:lumMod val="75000"/>
+                    <a:lumOff val="25000"/>
+                  </a:schemeClr>
+                </a:solidFill>
+                <a:effectLst>
+                  <a:outerShdw blurRad="38100" dist="38100" dir="2700000" algn="tl">
+                    <a:srgbClr val="000000">
+                      <a:alpha val="43137"/>
+                    </a:srgbClr>
+                  </a:outerShdw>
+                </a:effectLst>
+                <a:latin typeface="DINPro"/>
+              </a:rPr>
+              <a:t> 2 – </a:t>
+            </a:r>
+            <a:r>
+              <a:rPr lang="pt-BR" sz="2000" b="1" i="0" dirty="0" err="1">
+                <a:solidFill>
+                  <a:schemeClr val="tx1">
+                    <a:lumMod val="75000"/>
+                    <a:lumOff val="25000"/>
+                  </a:schemeClr>
+                </a:solidFill>
+                <a:effectLst>
+                  <a:outerShdw blurRad="38100" dist="38100" dir="2700000" algn="tl">
+                    <a:srgbClr val="000000">
+                      <a:alpha val="43137"/>
+                    </a:srgbClr>
+                  </a:outerShdw>
+                </a:effectLst>
+                <a:latin typeface="DINPro"/>
+              </a:rPr>
+              <a:t>Machine</a:t>
+            </a:r>
+            <a:r>
+              <a:rPr lang="pt-BR" sz="2000" b="1" i="0" dirty="0">
+                <a:solidFill>
+                  <a:schemeClr val="tx1">
+                    <a:lumMod val="75000"/>
+                    <a:lumOff val="25000"/>
+                  </a:schemeClr>
+                </a:solidFill>
+                <a:effectLst>
+                  <a:outerShdw blurRad="38100" dist="38100" dir="2700000" algn="tl">
+                    <a:srgbClr val="000000">
+                      <a:alpha val="43137"/>
+                    </a:srgbClr>
+                  </a:outerShdw>
+                </a:effectLst>
+                <a:latin typeface="DINPro"/>
+              </a:rPr>
+              <a:t> Learning</a:t>
+            </a:r>
+            <a:endParaRPr lang="pt-BR" sz="2000" b="1" dirty="0">
+              <a:solidFill>
+                <a:schemeClr val="tx1">
+                  <a:lumMod val="75000"/>
+                  <a:lumOff val="25000"/>
+                </a:schemeClr>
+              </a:solidFill>
+              <a:effectLst>
+                <a:outerShdw blurRad="38100" dist="38100" dir="2700000" algn="tl">
+                  <a:srgbClr val="000000">
+                    <a:alpha val="43137"/>
+                  </a:srgbClr>
+                </a:outerShdw>
+              </a:effectLst>
+            </a:endParaRPr>
+          </a:p>
+        </p:txBody>
+      </p:sp>
+      <p:cxnSp>
+        <p:nvCxnSpPr>
+          <p:cNvPr id="42" name="Conector de Seta Reta 41">
+            <a:extLst>
+              <a:ext uri="{FF2B5EF4-FFF2-40B4-BE49-F238E27FC236}">
+                <a16:creationId xmlns:a16="http://schemas.microsoft.com/office/drawing/2014/main" id="{1A590EE2-BAA5-409C-8344-E95376C8DD54}"/>
+              </a:ext>
+            </a:extLst>
+          </p:cNvPr>
+          <p:cNvCxnSpPr>
+            <a:cxnSpLocks/>
+          </p:cNvCxnSpPr>
+          <p:nvPr/>
+        </p:nvCxnSpPr>
+        <p:spPr>
+          <a:xfrm flipH="1">
+            <a:off x="2214385" y="4156595"/>
+            <a:ext cx="753340" cy="0"/>
+          </a:xfrm>
+          <a:prstGeom prst="straightConnector1">
+            <a:avLst/>
+          </a:prstGeom>
+          <a:ln w="22225">
+            <a:solidFill>
+              <a:schemeClr val="bg1">
+                <a:lumMod val="65000"/>
+              </a:schemeClr>
+            </a:solidFill>
+            <a:tailEnd type="triangle"/>
+          </a:ln>
+        </p:spPr>
+        <p:style>
+          <a:lnRef idx="1">
+            <a:schemeClr val="accent1"/>
+          </a:lnRef>
+          <a:fillRef idx="0">
+            <a:schemeClr val="accent1"/>
+          </a:fillRef>
+          <a:effectRef idx="0">
+            <a:schemeClr val="accent1"/>
+          </a:effectRef>
+          <a:fontRef idx="minor">
+            <a:schemeClr val="tx1"/>
+          </a:fontRef>
+        </p:style>
+      </p:cxnSp>
+      <p:pic>
+        <p:nvPicPr>
+          <p:cNvPr id="1026" name="Picture 2" descr="Five rainfall clusters obtained from the k-means clustering. Rows 1 and...  | Download Scientific Diagram">
+            <a:extLst>
+              <a:ext uri="{FF2B5EF4-FFF2-40B4-BE49-F238E27FC236}">
+                <a16:creationId xmlns:a16="http://schemas.microsoft.com/office/drawing/2014/main" id="{DCE3AD45-A169-460F-AED7-78C8D7E31E8B}"/>
+              </a:ext>
+            </a:extLst>
+          </p:cNvPr>
+          <p:cNvPicPr>
+            <a:picLocks noChangeAspect="1" noChangeArrowheads="1"/>
+          </p:cNvPicPr>
+          <p:nvPr/>
+        </p:nvPicPr>
+        <p:blipFill>
+          <a:blip r:embed="rId4">
+            <a:extLst>
+              <a:ext uri="{28A0092B-C50C-407E-A947-70E740481C1C}">
+                <a14:useLocalDpi xmlns:a14="http://schemas.microsoft.com/office/drawing/2010/main" val="0"/>
+              </a:ext>
+            </a:extLst>
+          </a:blip>
+          <a:srcRect/>
+          <a:stretch>
+            <a:fillRect/>
+          </a:stretch>
+        </p:blipFill>
+        <p:spPr bwMode="auto">
+          <a:xfrm>
+            <a:off x="1278763" y="3917488"/>
+            <a:ext cx="764911" cy="541705"/>
+          </a:xfrm>
+          <a:prstGeom prst="rect">
+            <a:avLst/>
+          </a:prstGeom>
+          <a:noFill/>
+          <a:extLst>
+            <a:ext uri="{909E8E84-426E-40DD-AFC4-6F175D3DCCD1}">
+              <a14:hiddenFill xmlns:a14="http://schemas.microsoft.com/office/drawing/2010/main">
+                <a:solidFill>
+                  <a:srgbClr val="FFFFFF"/>
+                </a:solidFill>
+              </a14:hiddenFill>
+            </a:ext>
+          </a:extLst>
+        </p:spPr>
+      </p:pic>
+      <p:pic>
+        <p:nvPicPr>
+          <p:cNvPr id="51" name="Imagem 50">
+            <a:extLst>
+              <a:ext uri="{FF2B5EF4-FFF2-40B4-BE49-F238E27FC236}">
+                <a16:creationId xmlns:a16="http://schemas.microsoft.com/office/drawing/2014/main" id="{40F4C7B9-90B5-4667-82C5-ED0CDD1B4569}"/>
+              </a:ext>
+            </a:extLst>
+          </p:cNvPr>
+          <p:cNvPicPr>
+            <a:picLocks noChangeAspect="1"/>
+          </p:cNvPicPr>
+          <p:nvPr/>
+        </p:nvPicPr>
+        <p:blipFill>
+          <a:blip r:embed="rId5"/>
+          <a:stretch>
+            <a:fillRect/>
+          </a:stretch>
+        </p:blipFill>
+        <p:spPr>
+          <a:xfrm>
+            <a:off x="1187626" y="4266376"/>
+            <a:ext cx="947187" cy="330384"/>
+          </a:xfrm>
+          <a:prstGeom prst="rect">
+            <a:avLst/>
+          </a:prstGeom>
+        </p:spPr>
+      </p:pic>
+    </p:spTree>
+    <p:extLst>
+      <p:ext uri="{BB962C8B-B14F-4D97-AF65-F5344CB8AC3E}">
+        <p14:creationId xmlns:p14="http://schemas.microsoft.com/office/powerpoint/2010/main" val="4128468346"/>
+      </p:ext>
+    </p:extLst>
+  </p:cSld>
+  <p:clrMapOvr>
+    <a:masterClrMapping/>
+  </p:clrMapOvr>
+</p:sld>
+</file>
+
+<file path=ppt/slides/slide13.xml><?xml version="1.0" encoding="utf-8"?>
+<p:sld xmlns:a="http://schemas.openxmlformats.org/drawingml/2006/main" xmlns:r="http://schemas.openxmlformats.org/officeDocument/2006/relationships" xmlns:p="http://schemas.openxmlformats.org/presentationml/2006/main">
+  <p:cSld>
+    <p:spTree>
+      <p:nvGrpSpPr>
+        <p:cNvPr id="1" name=""/>
+        <p:cNvGrpSpPr/>
+        <p:nvPr/>
+      </p:nvGrpSpPr>
+      <p:grpSpPr>
+        <a:xfrm>
+          <a:off x="0" y="0"/>
+          <a:ext cx="0" cy="0"/>
+          <a:chOff x="0" y="0"/>
+          <a:chExt cx="0" cy="0"/>
+        </a:xfrm>
+      </p:grpSpPr>
+      <p:pic>
+        <p:nvPicPr>
+          <p:cNvPr id="5" name="Picture 2" descr="Five rainfall clusters obtained from the k-means clustering. Rows 1 and...  | Download Scientific Diagram">
+            <a:extLst>
+              <a:ext uri="{FF2B5EF4-FFF2-40B4-BE49-F238E27FC236}">
+                <a16:creationId xmlns:a16="http://schemas.microsoft.com/office/drawing/2014/main" id="{4D51D9DA-988B-4F0D-A97C-ECD2940824F3}"/>
+              </a:ext>
+            </a:extLst>
+          </p:cNvPr>
+          <p:cNvPicPr>
+            <a:picLocks noChangeAspect="1" noChangeArrowheads="1"/>
+          </p:cNvPicPr>
+          <p:nvPr/>
+        </p:nvPicPr>
+        <p:blipFill>
+          <a:blip r:embed="rId2">
+            <a:extLst>
+              <a:ext uri="{28A0092B-C50C-407E-A947-70E740481C1C}">
+                <a14:useLocalDpi xmlns:a14="http://schemas.microsoft.com/office/drawing/2010/main" val="0"/>
+              </a:ext>
+            </a:extLst>
+          </a:blip>
+          <a:srcRect/>
+          <a:stretch>
+            <a:fillRect/>
+          </a:stretch>
+        </p:blipFill>
+        <p:spPr bwMode="auto">
+          <a:xfrm>
+            <a:off x="1074769" y="669387"/>
+            <a:ext cx="6489813" cy="4077136"/>
+          </a:xfrm>
+          <a:prstGeom prst="rect">
+            <a:avLst/>
+          </a:prstGeom>
+          <a:noFill/>
+          <a:extLst>
+            <a:ext uri="{909E8E84-426E-40DD-AFC4-6F175D3DCCD1}">
+              <a14:hiddenFill xmlns:a14="http://schemas.microsoft.com/office/drawing/2010/main">
+                <a:solidFill>
+                  <a:srgbClr val="FFFFFF"/>
+                </a:solidFill>
+              </a14:hiddenFill>
+            </a:ext>
+          </a:extLst>
+        </p:spPr>
+      </p:pic>
+    </p:spTree>
+    <p:extLst>
+      <p:ext uri="{BB962C8B-B14F-4D97-AF65-F5344CB8AC3E}">
+        <p14:creationId xmlns:p14="http://schemas.microsoft.com/office/powerpoint/2010/main" val="221626917"/>
+      </p:ext>
+    </p:extLst>
+  </p:cSld>
+  <p:clrMapOvr>
+    <a:masterClrMapping/>
+  </p:clrMapOvr>
+</p:sld>
+</file>
+
 <file path=ppt/slides/slide2.xml><?xml version="1.0" encoding="utf-8"?>
 <p:sld xmlns:a="http://schemas.openxmlformats.org/drawingml/2006/main" xmlns:r="http://schemas.openxmlformats.org/officeDocument/2006/relationships" xmlns:p="http://schemas.openxmlformats.org/presentationml/2006/main">
   <p:cSld>

</xml_diff>

<commit_message>
Update Data-Engineering Blog - 6
</commit_message>
<xml_diff>
--- a/#Data-Engineering/DataEngineering.pptx
+++ b/#Data-Engineering/DataEngineering.pptx
@@ -18,6 +18,7 @@
     <p:sldId id="267" r:id="rId12"/>
     <p:sldId id="268" r:id="rId13"/>
     <p:sldId id="269" r:id="rId14"/>
+    <p:sldId id="270" r:id="rId15"/>
   </p:sldIdLst>
   <p:sldSz cx="12192000" cy="6858000"/>
   <p:notesSz cx="6858000" cy="9144000"/>
@@ -138,6 +139,3832 @@
     </p:ext>
   </p:extLst>
 </p:presentation>
+</file>
+
+<file path=ppt/diagrams/colors1.xml><?xml version="1.0" encoding="utf-8"?>
+<dgm:colorsDef xmlns:dgm="http://schemas.openxmlformats.org/drawingml/2006/diagram" xmlns:a="http://schemas.openxmlformats.org/drawingml/2006/main" uniqueId="urn:microsoft.com/office/officeart/2005/8/colors/accent1_2">
+  <dgm:title val=""/>
+  <dgm:desc val=""/>
+  <dgm:catLst>
+    <dgm:cat type="accent1" pri="11200"/>
+  </dgm:catLst>
+  <dgm:styleLbl name="node0">
+    <dgm:fillClrLst meth="repeat">
+      <a:schemeClr val="accent1"/>
+    </dgm:fillClrLst>
+    <dgm:linClrLst meth="repeat">
+      <a:schemeClr val="lt1"/>
+    </dgm:linClrLst>
+    <dgm:effectClrLst/>
+    <dgm:txLinClrLst/>
+    <dgm:txFillClrLst/>
+    <dgm:txEffectClrLst/>
+  </dgm:styleLbl>
+  <dgm:styleLbl name="alignNode1">
+    <dgm:fillClrLst meth="repeat">
+      <a:schemeClr val="accent1"/>
+    </dgm:fillClrLst>
+    <dgm:linClrLst meth="repeat">
+      <a:schemeClr val="accent1"/>
+    </dgm:linClrLst>
+    <dgm:effectClrLst/>
+    <dgm:txLinClrLst/>
+    <dgm:txFillClrLst/>
+    <dgm:txEffectClrLst/>
+  </dgm:styleLbl>
+  <dgm:styleLbl name="node1">
+    <dgm:fillClrLst meth="repeat">
+      <a:schemeClr val="accent1"/>
+    </dgm:fillClrLst>
+    <dgm:linClrLst meth="repeat">
+      <a:schemeClr val="lt1"/>
+    </dgm:linClrLst>
+    <dgm:effectClrLst/>
+    <dgm:txLinClrLst/>
+    <dgm:txFillClrLst/>
+    <dgm:txEffectClrLst/>
+  </dgm:styleLbl>
+  <dgm:styleLbl name="lnNode1">
+    <dgm:fillClrLst meth="repeat">
+      <a:schemeClr val="accent1"/>
+    </dgm:fillClrLst>
+    <dgm:linClrLst meth="repeat">
+      <a:schemeClr val="lt1"/>
+    </dgm:linClrLst>
+    <dgm:effectClrLst/>
+    <dgm:txLinClrLst/>
+    <dgm:txFillClrLst/>
+    <dgm:txEffectClrLst/>
+  </dgm:styleLbl>
+  <dgm:styleLbl name="vennNode1">
+    <dgm:fillClrLst meth="repeat">
+      <a:schemeClr val="accent1">
+        <a:alpha val="50000"/>
+      </a:schemeClr>
+    </dgm:fillClrLst>
+    <dgm:linClrLst meth="repeat">
+      <a:schemeClr val="lt1"/>
+    </dgm:linClrLst>
+    <dgm:effectClrLst/>
+    <dgm:txLinClrLst/>
+    <dgm:txFillClrLst/>
+    <dgm:txEffectClrLst/>
+  </dgm:styleLbl>
+  <dgm:styleLbl name="node2">
+    <dgm:fillClrLst meth="repeat">
+      <a:schemeClr val="accent1"/>
+    </dgm:fillClrLst>
+    <dgm:linClrLst meth="repeat">
+      <a:schemeClr val="lt1"/>
+    </dgm:linClrLst>
+    <dgm:effectClrLst/>
+    <dgm:txLinClrLst/>
+    <dgm:txFillClrLst/>
+    <dgm:txEffectClrLst/>
+  </dgm:styleLbl>
+  <dgm:styleLbl name="node3">
+    <dgm:fillClrLst meth="repeat">
+      <a:schemeClr val="accent1"/>
+    </dgm:fillClrLst>
+    <dgm:linClrLst meth="repeat">
+      <a:schemeClr val="lt1"/>
+    </dgm:linClrLst>
+    <dgm:effectClrLst/>
+    <dgm:txLinClrLst/>
+    <dgm:txFillClrLst/>
+    <dgm:txEffectClrLst/>
+  </dgm:styleLbl>
+  <dgm:styleLbl name="node4">
+    <dgm:fillClrLst meth="repeat">
+      <a:schemeClr val="accent1"/>
+    </dgm:fillClrLst>
+    <dgm:linClrLst meth="repeat">
+      <a:schemeClr val="lt1"/>
+    </dgm:linClrLst>
+    <dgm:effectClrLst/>
+    <dgm:txLinClrLst/>
+    <dgm:txFillClrLst/>
+    <dgm:txEffectClrLst/>
+  </dgm:styleLbl>
+  <dgm:styleLbl name="fgImgPlace1">
+    <dgm:fillClrLst meth="repeat">
+      <a:schemeClr val="accent1">
+        <a:tint val="50000"/>
+      </a:schemeClr>
+    </dgm:fillClrLst>
+    <dgm:linClrLst meth="repeat">
+      <a:schemeClr val="lt1"/>
+    </dgm:linClrLst>
+    <dgm:effectClrLst/>
+    <dgm:txLinClrLst/>
+    <dgm:txFillClrLst meth="repeat">
+      <a:schemeClr val="lt1"/>
+    </dgm:txFillClrLst>
+    <dgm:txEffectClrLst/>
+  </dgm:styleLbl>
+  <dgm:styleLbl name="alignImgPlace1">
+    <dgm:fillClrLst meth="repeat">
+      <a:schemeClr val="accent1">
+        <a:tint val="50000"/>
+      </a:schemeClr>
+    </dgm:fillClrLst>
+    <dgm:linClrLst meth="repeat">
+      <a:schemeClr val="lt1"/>
+    </dgm:linClrLst>
+    <dgm:effectClrLst/>
+    <dgm:txLinClrLst/>
+    <dgm:txFillClrLst meth="repeat">
+      <a:schemeClr val="lt1"/>
+    </dgm:txFillClrLst>
+    <dgm:txEffectClrLst/>
+  </dgm:styleLbl>
+  <dgm:styleLbl name="bgImgPlace1">
+    <dgm:fillClrLst meth="repeat">
+      <a:schemeClr val="accent1">
+        <a:tint val="50000"/>
+      </a:schemeClr>
+    </dgm:fillClrLst>
+    <dgm:linClrLst meth="repeat">
+      <a:schemeClr val="lt1"/>
+    </dgm:linClrLst>
+    <dgm:effectClrLst/>
+    <dgm:txLinClrLst/>
+    <dgm:txFillClrLst meth="repeat">
+      <a:schemeClr val="lt1"/>
+    </dgm:txFillClrLst>
+    <dgm:txEffectClrLst/>
+  </dgm:styleLbl>
+  <dgm:styleLbl name="sibTrans2D1">
+    <dgm:fillClrLst meth="repeat">
+      <a:schemeClr val="accent1">
+        <a:tint val="60000"/>
+      </a:schemeClr>
+    </dgm:fillClrLst>
+    <dgm:linClrLst meth="repeat">
+      <a:schemeClr val="accent1">
+        <a:tint val="60000"/>
+      </a:schemeClr>
+    </dgm:linClrLst>
+    <dgm:effectClrLst/>
+    <dgm:txLinClrLst/>
+    <dgm:txFillClrLst/>
+    <dgm:txEffectClrLst/>
+  </dgm:styleLbl>
+  <dgm:styleLbl name="fgSibTrans2D1">
+    <dgm:fillClrLst meth="repeat">
+      <a:schemeClr val="accent1">
+        <a:tint val="60000"/>
+      </a:schemeClr>
+    </dgm:fillClrLst>
+    <dgm:linClrLst meth="repeat">
+      <a:schemeClr val="accent1">
+        <a:tint val="60000"/>
+      </a:schemeClr>
+    </dgm:linClrLst>
+    <dgm:effectClrLst/>
+    <dgm:txLinClrLst/>
+    <dgm:txFillClrLst/>
+    <dgm:txEffectClrLst/>
+  </dgm:styleLbl>
+  <dgm:styleLbl name="bgSibTrans2D1">
+    <dgm:fillClrLst meth="repeat">
+      <a:schemeClr val="accent1">
+        <a:tint val="60000"/>
+      </a:schemeClr>
+    </dgm:fillClrLst>
+    <dgm:linClrLst meth="repeat">
+      <a:schemeClr val="accent1">
+        <a:tint val="60000"/>
+      </a:schemeClr>
+    </dgm:linClrLst>
+    <dgm:effectClrLst/>
+    <dgm:txLinClrLst/>
+    <dgm:txFillClrLst/>
+    <dgm:txEffectClrLst/>
+  </dgm:styleLbl>
+  <dgm:styleLbl name="sibTrans1D1">
+    <dgm:fillClrLst meth="repeat">
+      <a:schemeClr val="accent1"/>
+    </dgm:fillClrLst>
+    <dgm:linClrLst meth="repeat">
+      <a:schemeClr val="accent1"/>
+    </dgm:linClrLst>
+    <dgm:effectClrLst/>
+    <dgm:txLinClrLst/>
+    <dgm:txFillClrLst meth="repeat">
+      <a:schemeClr val="tx1"/>
+    </dgm:txFillClrLst>
+    <dgm:txEffectClrLst/>
+  </dgm:styleLbl>
+  <dgm:styleLbl name="callout">
+    <dgm:fillClrLst meth="repeat">
+      <a:schemeClr val="accent1"/>
+    </dgm:fillClrLst>
+    <dgm:linClrLst meth="repeat">
+      <a:schemeClr val="accent1">
+        <a:tint val="50000"/>
+      </a:schemeClr>
+    </dgm:linClrLst>
+    <dgm:effectClrLst/>
+    <dgm:txLinClrLst/>
+    <dgm:txFillClrLst meth="repeat">
+      <a:schemeClr val="tx1"/>
+    </dgm:txFillClrLst>
+    <dgm:txEffectClrLst/>
+  </dgm:styleLbl>
+  <dgm:styleLbl name="asst0">
+    <dgm:fillClrLst meth="repeat">
+      <a:schemeClr val="accent1"/>
+    </dgm:fillClrLst>
+    <dgm:linClrLst meth="repeat">
+      <a:schemeClr val="lt1"/>
+    </dgm:linClrLst>
+    <dgm:effectClrLst/>
+    <dgm:txLinClrLst/>
+    <dgm:txFillClrLst/>
+    <dgm:txEffectClrLst/>
+  </dgm:styleLbl>
+  <dgm:styleLbl name="asst1">
+    <dgm:fillClrLst meth="repeat">
+      <a:schemeClr val="accent1"/>
+    </dgm:fillClrLst>
+    <dgm:linClrLst meth="repeat">
+      <a:schemeClr val="lt1"/>
+    </dgm:linClrLst>
+    <dgm:effectClrLst/>
+    <dgm:txLinClrLst/>
+    <dgm:txFillClrLst/>
+    <dgm:txEffectClrLst/>
+  </dgm:styleLbl>
+  <dgm:styleLbl name="asst2">
+    <dgm:fillClrLst meth="repeat">
+      <a:schemeClr val="accent1"/>
+    </dgm:fillClrLst>
+    <dgm:linClrLst meth="repeat">
+      <a:schemeClr val="lt1"/>
+    </dgm:linClrLst>
+    <dgm:effectClrLst/>
+    <dgm:txLinClrLst/>
+    <dgm:txFillClrLst/>
+    <dgm:txEffectClrLst/>
+  </dgm:styleLbl>
+  <dgm:styleLbl name="asst3">
+    <dgm:fillClrLst meth="repeat">
+      <a:schemeClr val="accent1"/>
+    </dgm:fillClrLst>
+    <dgm:linClrLst meth="repeat">
+      <a:schemeClr val="lt1"/>
+    </dgm:linClrLst>
+    <dgm:effectClrLst/>
+    <dgm:txLinClrLst/>
+    <dgm:txFillClrLst/>
+    <dgm:txEffectClrLst/>
+  </dgm:styleLbl>
+  <dgm:styleLbl name="asst4">
+    <dgm:fillClrLst meth="repeat">
+      <a:schemeClr val="accent1"/>
+    </dgm:fillClrLst>
+    <dgm:linClrLst meth="repeat">
+      <a:schemeClr val="lt1"/>
+    </dgm:linClrLst>
+    <dgm:effectClrLst/>
+    <dgm:txLinClrLst/>
+    <dgm:txFillClrLst/>
+    <dgm:txEffectClrLst/>
+  </dgm:styleLbl>
+  <dgm:styleLbl name="parChTrans2D1">
+    <dgm:fillClrLst meth="repeat">
+      <a:schemeClr val="accent1">
+        <a:tint val="60000"/>
+      </a:schemeClr>
+    </dgm:fillClrLst>
+    <dgm:linClrLst meth="repeat">
+      <a:schemeClr val="accent1">
+        <a:tint val="60000"/>
+      </a:schemeClr>
+    </dgm:linClrLst>
+    <dgm:effectClrLst/>
+    <dgm:txLinClrLst/>
+    <dgm:txFillClrLst meth="repeat">
+      <a:schemeClr val="lt1"/>
+    </dgm:txFillClrLst>
+    <dgm:txEffectClrLst/>
+  </dgm:styleLbl>
+  <dgm:styleLbl name="parChTrans2D2">
+    <dgm:fillClrLst meth="repeat">
+      <a:schemeClr val="accent1"/>
+    </dgm:fillClrLst>
+    <dgm:linClrLst meth="repeat">
+      <a:schemeClr val="accent1"/>
+    </dgm:linClrLst>
+    <dgm:effectClrLst/>
+    <dgm:txLinClrLst/>
+    <dgm:txFillClrLst meth="repeat">
+      <a:schemeClr val="lt1"/>
+    </dgm:txFillClrLst>
+    <dgm:txEffectClrLst/>
+  </dgm:styleLbl>
+  <dgm:styleLbl name="parChTrans2D3">
+    <dgm:fillClrLst meth="repeat">
+      <a:schemeClr val="accent1"/>
+    </dgm:fillClrLst>
+    <dgm:linClrLst meth="repeat">
+      <a:schemeClr val="accent1"/>
+    </dgm:linClrLst>
+    <dgm:effectClrLst/>
+    <dgm:txLinClrLst/>
+    <dgm:txFillClrLst meth="repeat">
+      <a:schemeClr val="lt1"/>
+    </dgm:txFillClrLst>
+    <dgm:txEffectClrLst/>
+  </dgm:styleLbl>
+  <dgm:styleLbl name="parChTrans2D4">
+    <dgm:fillClrLst meth="repeat">
+      <a:schemeClr val="accent1"/>
+    </dgm:fillClrLst>
+    <dgm:linClrLst meth="repeat">
+      <a:schemeClr val="accent1"/>
+    </dgm:linClrLst>
+    <dgm:effectClrLst/>
+    <dgm:txLinClrLst/>
+    <dgm:txFillClrLst meth="repeat">
+      <a:schemeClr val="lt1"/>
+    </dgm:txFillClrLst>
+    <dgm:txEffectClrLst/>
+  </dgm:styleLbl>
+  <dgm:styleLbl name="parChTrans1D1">
+    <dgm:fillClrLst meth="repeat">
+      <a:schemeClr val="accent1"/>
+    </dgm:fillClrLst>
+    <dgm:linClrLst meth="repeat">
+      <a:schemeClr val="accent1">
+        <a:shade val="60000"/>
+      </a:schemeClr>
+    </dgm:linClrLst>
+    <dgm:effectClrLst/>
+    <dgm:txLinClrLst/>
+    <dgm:txFillClrLst meth="repeat">
+      <a:schemeClr val="tx1"/>
+    </dgm:txFillClrLst>
+    <dgm:txEffectClrLst/>
+  </dgm:styleLbl>
+  <dgm:styleLbl name="parChTrans1D2">
+    <dgm:fillClrLst meth="repeat">
+      <a:schemeClr val="accent1"/>
+    </dgm:fillClrLst>
+    <dgm:linClrLst meth="repeat">
+      <a:schemeClr val="accent1">
+        <a:shade val="60000"/>
+      </a:schemeClr>
+    </dgm:linClrLst>
+    <dgm:effectClrLst/>
+    <dgm:txLinClrLst/>
+    <dgm:txFillClrLst meth="repeat">
+      <a:schemeClr val="tx1"/>
+    </dgm:txFillClrLst>
+    <dgm:txEffectClrLst/>
+  </dgm:styleLbl>
+  <dgm:styleLbl name="parChTrans1D3">
+    <dgm:fillClrLst meth="repeat">
+      <a:schemeClr val="accent1"/>
+    </dgm:fillClrLst>
+    <dgm:linClrLst meth="repeat">
+      <a:schemeClr val="accent1">
+        <a:shade val="80000"/>
+      </a:schemeClr>
+    </dgm:linClrLst>
+    <dgm:effectClrLst/>
+    <dgm:txLinClrLst/>
+    <dgm:txFillClrLst meth="repeat">
+      <a:schemeClr val="tx1"/>
+    </dgm:txFillClrLst>
+    <dgm:txEffectClrLst/>
+  </dgm:styleLbl>
+  <dgm:styleLbl name="parChTrans1D4">
+    <dgm:fillClrLst meth="repeat">
+      <a:schemeClr val="accent1"/>
+    </dgm:fillClrLst>
+    <dgm:linClrLst meth="repeat">
+      <a:schemeClr val="accent1">
+        <a:shade val="80000"/>
+      </a:schemeClr>
+    </dgm:linClrLst>
+    <dgm:effectClrLst/>
+    <dgm:txLinClrLst/>
+    <dgm:txFillClrLst meth="repeat">
+      <a:schemeClr val="tx1"/>
+    </dgm:txFillClrLst>
+    <dgm:txEffectClrLst/>
+  </dgm:styleLbl>
+  <dgm:styleLbl name="fgAcc1">
+    <dgm:fillClrLst meth="repeat">
+      <a:schemeClr val="lt1">
+        <a:alpha val="90000"/>
+      </a:schemeClr>
+    </dgm:fillClrLst>
+    <dgm:linClrLst meth="repeat">
+      <a:schemeClr val="accent1"/>
+    </dgm:linClrLst>
+    <dgm:effectClrLst/>
+    <dgm:txLinClrLst/>
+    <dgm:txFillClrLst meth="repeat">
+      <a:schemeClr val="dk1"/>
+    </dgm:txFillClrLst>
+    <dgm:txEffectClrLst/>
+  </dgm:styleLbl>
+  <dgm:styleLbl name="conFgAcc1">
+    <dgm:fillClrLst meth="repeat">
+      <a:schemeClr val="lt1">
+        <a:alpha val="90000"/>
+      </a:schemeClr>
+    </dgm:fillClrLst>
+    <dgm:linClrLst meth="repeat">
+      <a:schemeClr val="accent1"/>
+    </dgm:linClrLst>
+    <dgm:effectClrLst/>
+    <dgm:txLinClrLst/>
+    <dgm:txFillClrLst meth="repeat">
+      <a:schemeClr val="dk1"/>
+    </dgm:txFillClrLst>
+    <dgm:txEffectClrLst/>
+  </dgm:styleLbl>
+  <dgm:styleLbl name="alignAcc1">
+    <dgm:fillClrLst meth="repeat">
+      <a:schemeClr val="lt1">
+        <a:alpha val="90000"/>
+      </a:schemeClr>
+    </dgm:fillClrLst>
+    <dgm:linClrLst meth="repeat">
+      <a:schemeClr val="accent1"/>
+    </dgm:linClrLst>
+    <dgm:effectClrLst/>
+    <dgm:txLinClrLst/>
+    <dgm:txFillClrLst meth="repeat">
+      <a:schemeClr val="dk1"/>
+    </dgm:txFillClrLst>
+    <dgm:txEffectClrLst/>
+  </dgm:styleLbl>
+  <dgm:styleLbl name="trAlignAcc1">
+    <dgm:fillClrLst meth="repeat">
+      <a:schemeClr val="lt1">
+        <a:alpha val="40000"/>
+      </a:schemeClr>
+    </dgm:fillClrLst>
+    <dgm:linClrLst meth="repeat">
+      <a:schemeClr val="accent1"/>
+    </dgm:linClrLst>
+    <dgm:effectClrLst/>
+    <dgm:txLinClrLst/>
+    <dgm:txFillClrLst meth="repeat">
+      <a:schemeClr val="dk1"/>
+    </dgm:txFillClrLst>
+    <dgm:txEffectClrLst/>
+  </dgm:styleLbl>
+  <dgm:styleLbl name="bgAcc1">
+    <dgm:fillClrLst meth="repeat">
+      <a:schemeClr val="lt1">
+        <a:alpha val="90000"/>
+      </a:schemeClr>
+    </dgm:fillClrLst>
+    <dgm:linClrLst meth="repeat">
+      <a:schemeClr val="accent1"/>
+    </dgm:linClrLst>
+    <dgm:effectClrLst/>
+    <dgm:txLinClrLst/>
+    <dgm:txFillClrLst meth="repeat">
+      <a:schemeClr val="dk1"/>
+    </dgm:txFillClrLst>
+    <dgm:txEffectClrLst/>
+  </dgm:styleLbl>
+  <dgm:styleLbl name="solidFgAcc1">
+    <dgm:fillClrLst meth="repeat">
+      <a:schemeClr val="lt1"/>
+    </dgm:fillClrLst>
+    <dgm:linClrLst meth="repeat">
+      <a:schemeClr val="accent1"/>
+    </dgm:linClrLst>
+    <dgm:effectClrLst/>
+    <dgm:txLinClrLst/>
+    <dgm:txFillClrLst meth="repeat">
+      <a:schemeClr val="dk1"/>
+    </dgm:txFillClrLst>
+    <dgm:txEffectClrLst/>
+  </dgm:styleLbl>
+  <dgm:styleLbl name="solidAlignAcc1">
+    <dgm:fillClrLst meth="repeat">
+      <a:schemeClr val="lt1"/>
+    </dgm:fillClrLst>
+    <dgm:linClrLst meth="repeat">
+      <a:schemeClr val="accent1"/>
+    </dgm:linClrLst>
+    <dgm:effectClrLst/>
+    <dgm:txLinClrLst/>
+    <dgm:txFillClrLst meth="repeat">
+      <a:schemeClr val="dk1"/>
+    </dgm:txFillClrLst>
+    <dgm:txEffectClrLst/>
+  </dgm:styleLbl>
+  <dgm:styleLbl name="solidBgAcc1">
+    <dgm:fillClrLst meth="repeat">
+      <a:schemeClr val="lt1"/>
+    </dgm:fillClrLst>
+    <dgm:linClrLst meth="repeat">
+      <a:schemeClr val="accent1"/>
+    </dgm:linClrLst>
+    <dgm:effectClrLst/>
+    <dgm:txLinClrLst/>
+    <dgm:txFillClrLst meth="repeat">
+      <a:schemeClr val="dk1"/>
+    </dgm:txFillClrLst>
+    <dgm:txEffectClrLst/>
+  </dgm:styleLbl>
+  <dgm:styleLbl name="fgAccFollowNode1">
+    <dgm:fillClrLst meth="repeat">
+      <a:schemeClr val="accent1">
+        <a:alpha val="90000"/>
+        <a:tint val="40000"/>
+      </a:schemeClr>
+    </dgm:fillClrLst>
+    <dgm:linClrLst meth="repeat">
+      <a:schemeClr val="accent1">
+        <a:alpha val="90000"/>
+        <a:tint val="40000"/>
+      </a:schemeClr>
+    </dgm:linClrLst>
+    <dgm:effectClrLst/>
+    <dgm:txLinClrLst/>
+    <dgm:txFillClrLst meth="repeat">
+      <a:schemeClr val="dk1"/>
+    </dgm:txFillClrLst>
+    <dgm:txEffectClrLst/>
+  </dgm:styleLbl>
+  <dgm:styleLbl name="alignAccFollowNode1">
+    <dgm:fillClrLst meth="repeat">
+      <a:schemeClr val="accent1">
+        <a:alpha val="90000"/>
+        <a:tint val="40000"/>
+      </a:schemeClr>
+    </dgm:fillClrLst>
+    <dgm:linClrLst meth="repeat">
+      <a:schemeClr val="accent1">
+        <a:alpha val="90000"/>
+        <a:tint val="40000"/>
+      </a:schemeClr>
+    </dgm:linClrLst>
+    <dgm:effectClrLst/>
+    <dgm:txLinClrLst/>
+    <dgm:txFillClrLst meth="repeat">
+      <a:schemeClr val="dk1"/>
+    </dgm:txFillClrLst>
+    <dgm:txEffectClrLst/>
+  </dgm:styleLbl>
+  <dgm:styleLbl name="bgAccFollowNode1">
+    <dgm:fillClrLst meth="repeat">
+      <a:schemeClr val="accent1">
+        <a:alpha val="90000"/>
+        <a:tint val="40000"/>
+      </a:schemeClr>
+    </dgm:fillClrLst>
+    <dgm:linClrLst meth="repeat">
+      <a:schemeClr val="accent1">
+        <a:alpha val="90000"/>
+        <a:tint val="40000"/>
+      </a:schemeClr>
+    </dgm:linClrLst>
+    <dgm:effectClrLst/>
+    <dgm:txLinClrLst/>
+    <dgm:txFillClrLst meth="repeat">
+      <a:schemeClr val="dk1"/>
+    </dgm:txFillClrLst>
+    <dgm:txEffectClrLst/>
+  </dgm:styleLbl>
+  <dgm:styleLbl name="fgAcc0">
+    <dgm:fillClrLst meth="repeat">
+      <a:schemeClr val="lt1">
+        <a:alpha val="90000"/>
+      </a:schemeClr>
+    </dgm:fillClrLst>
+    <dgm:linClrLst meth="repeat">
+      <a:schemeClr val="accent1"/>
+    </dgm:linClrLst>
+    <dgm:effectClrLst/>
+    <dgm:txLinClrLst/>
+    <dgm:txFillClrLst meth="repeat">
+      <a:schemeClr val="dk1"/>
+    </dgm:txFillClrLst>
+    <dgm:txEffectClrLst/>
+  </dgm:styleLbl>
+  <dgm:styleLbl name="fgAcc2">
+    <dgm:fillClrLst meth="repeat">
+      <a:schemeClr val="lt1">
+        <a:alpha val="90000"/>
+      </a:schemeClr>
+    </dgm:fillClrLst>
+    <dgm:linClrLst meth="repeat">
+      <a:schemeClr val="accent1"/>
+    </dgm:linClrLst>
+    <dgm:effectClrLst/>
+    <dgm:txLinClrLst/>
+    <dgm:txFillClrLst meth="repeat">
+      <a:schemeClr val="dk1"/>
+    </dgm:txFillClrLst>
+    <dgm:txEffectClrLst/>
+  </dgm:styleLbl>
+  <dgm:styleLbl name="fgAcc3">
+    <dgm:fillClrLst meth="repeat">
+      <a:schemeClr val="lt1">
+        <a:alpha val="90000"/>
+      </a:schemeClr>
+    </dgm:fillClrLst>
+    <dgm:linClrLst meth="repeat">
+      <a:schemeClr val="accent1"/>
+    </dgm:linClrLst>
+    <dgm:effectClrLst/>
+    <dgm:txLinClrLst/>
+    <dgm:txFillClrLst meth="repeat">
+      <a:schemeClr val="dk1"/>
+    </dgm:txFillClrLst>
+    <dgm:txEffectClrLst/>
+  </dgm:styleLbl>
+  <dgm:styleLbl name="fgAcc4">
+    <dgm:fillClrLst meth="repeat">
+      <a:schemeClr val="lt1">
+        <a:alpha val="90000"/>
+      </a:schemeClr>
+    </dgm:fillClrLst>
+    <dgm:linClrLst meth="repeat">
+      <a:schemeClr val="accent1"/>
+    </dgm:linClrLst>
+    <dgm:effectClrLst/>
+    <dgm:txLinClrLst/>
+    <dgm:txFillClrLst meth="repeat">
+      <a:schemeClr val="dk1"/>
+    </dgm:txFillClrLst>
+    <dgm:txEffectClrLst/>
+  </dgm:styleLbl>
+  <dgm:styleLbl name="bgShp">
+    <dgm:fillClrLst meth="repeat">
+      <a:schemeClr val="accent1">
+        <a:tint val="40000"/>
+      </a:schemeClr>
+    </dgm:fillClrLst>
+    <dgm:linClrLst meth="repeat">
+      <a:schemeClr val="accent1"/>
+    </dgm:linClrLst>
+    <dgm:effectClrLst/>
+    <dgm:txLinClrLst/>
+    <dgm:txFillClrLst meth="repeat">
+      <a:schemeClr val="dk1"/>
+    </dgm:txFillClrLst>
+    <dgm:txEffectClrLst/>
+  </dgm:styleLbl>
+  <dgm:styleLbl name="dkBgShp">
+    <dgm:fillClrLst meth="repeat">
+      <a:schemeClr val="accent1">
+        <a:shade val="80000"/>
+      </a:schemeClr>
+    </dgm:fillClrLst>
+    <dgm:linClrLst meth="repeat">
+      <a:schemeClr val="accent1"/>
+    </dgm:linClrLst>
+    <dgm:effectClrLst/>
+    <dgm:txLinClrLst/>
+    <dgm:txFillClrLst meth="repeat">
+      <a:schemeClr val="lt1"/>
+    </dgm:txFillClrLst>
+    <dgm:txEffectClrLst/>
+  </dgm:styleLbl>
+  <dgm:styleLbl name="trBgShp">
+    <dgm:fillClrLst meth="repeat">
+      <a:schemeClr val="accent1">
+        <a:tint val="50000"/>
+        <a:alpha val="40000"/>
+      </a:schemeClr>
+    </dgm:fillClrLst>
+    <dgm:linClrLst meth="repeat">
+      <a:schemeClr val="accent1"/>
+    </dgm:linClrLst>
+    <dgm:effectClrLst/>
+    <dgm:txLinClrLst/>
+    <dgm:txFillClrLst meth="repeat">
+      <a:schemeClr val="lt1"/>
+    </dgm:txFillClrLst>
+    <dgm:txEffectClrLst/>
+  </dgm:styleLbl>
+  <dgm:styleLbl name="fgShp">
+    <dgm:fillClrLst meth="repeat">
+      <a:schemeClr val="accent1">
+        <a:tint val="60000"/>
+      </a:schemeClr>
+    </dgm:fillClrLst>
+    <dgm:linClrLst meth="repeat">
+      <a:schemeClr val="lt1"/>
+    </dgm:linClrLst>
+    <dgm:effectClrLst/>
+    <dgm:txLinClrLst/>
+    <dgm:txFillClrLst meth="repeat">
+      <a:schemeClr val="dk1"/>
+    </dgm:txFillClrLst>
+    <dgm:txEffectClrLst/>
+  </dgm:styleLbl>
+  <dgm:styleLbl name="revTx">
+    <dgm:fillClrLst meth="repeat">
+      <a:schemeClr val="lt1">
+        <a:alpha val="0"/>
+      </a:schemeClr>
+    </dgm:fillClrLst>
+    <dgm:linClrLst meth="repeat">
+      <a:schemeClr val="dk1">
+        <a:alpha val="0"/>
+      </a:schemeClr>
+    </dgm:linClrLst>
+    <dgm:effectClrLst/>
+    <dgm:txLinClrLst/>
+    <dgm:txFillClrLst meth="repeat">
+      <a:schemeClr val="tx1"/>
+    </dgm:txFillClrLst>
+    <dgm:txEffectClrLst/>
+  </dgm:styleLbl>
+</dgm:colorsDef>
+</file>
+
+<file path=ppt/diagrams/data1.xml><?xml version="1.0" encoding="utf-8"?>
+<dgm:dataModel xmlns:dgm="http://schemas.openxmlformats.org/drawingml/2006/diagram" xmlns:a="http://schemas.openxmlformats.org/drawingml/2006/main">
+  <dgm:ptLst>
+    <dgm:pt modelId="{26E6752C-9159-4C46-BC02-07AFE5C6E13D}" type="doc">
+      <dgm:prSet loTypeId="urn:microsoft.com/office/officeart/2005/8/layout/target2" loCatId="relationship" qsTypeId="urn:microsoft.com/office/officeart/2005/8/quickstyle/simple1" qsCatId="simple" csTypeId="urn:microsoft.com/office/officeart/2005/8/colors/accent1_2" csCatId="accent1" phldr="1"/>
+      <dgm:spPr/>
+      <dgm:t>
+        <a:bodyPr/>
+        <a:lstStyle/>
+        <a:p>
+          <a:endParaRPr lang="pt-BR"/>
+        </a:p>
+      </dgm:t>
+    </dgm:pt>
+    <dgm:pt modelId="{5C1B67AA-9080-438E-956A-36BF8FD17D54}">
+      <dgm:prSet phldrT="[Texto]"/>
+      <dgm:spPr>
+        <a:solidFill>
+          <a:srgbClr val="7030A0"/>
+        </a:solidFill>
+      </dgm:spPr>
+      <dgm:t>
+        <a:bodyPr/>
+        <a:lstStyle/>
+        <a:p>
+          <a:r>
+            <a:rPr lang="pt-BR" dirty="0"/>
+            <a:t>Software </a:t>
+          </a:r>
+          <a:r>
+            <a:rPr lang="pt-BR" dirty="0" err="1"/>
+            <a:t>Engineering</a:t>
+          </a:r>
+          <a:endParaRPr lang="pt-BR" dirty="0"/>
+        </a:p>
+      </dgm:t>
+    </dgm:pt>
+    <dgm:pt modelId="{E7B33D26-340B-4DA9-BB53-7C19CD375135}" type="parTrans" cxnId="{2784BD0C-5B8D-4096-A253-F8BB1E856B92}">
+      <dgm:prSet/>
+      <dgm:spPr/>
+      <dgm:t>
+        <a:bodyPr/>
+        <a:lstStyle/>
+        <a:p>
+          <a:endParaRPr lang="pt-BR"/>
+        </a:p>
+      </dgm:t>
+    </dgm:pt>
+    <dgm:pt modelId="{173562FA-ABFE-42AB-B7F5-D183AC91288E}" type="sibTrans" cxnId="{2784BD0C-5B8D-4096-A253-F8BB1E856B92}">
+      <dgm:prSet/>
+      <dgm:spPr/>
+      <dgm:t>
+        <a:bodyPr/>
+        <a:lstStyle/>
+        <a:p>
+          <a:endParaRPr lang="pt-BR"/>
+        </a:p>
+      </dgm:t>
+    </dgm:pt>
+    <dgm:pt modelId="{CD9D1996-26C8-47BA-BCE5-08C5F0BB0F69}">
+      <dgm:prSet phldrT="[Texto]"/>
+      <dgm:spPr/>
+      <dgm:t>
+        <a:bodyPr/>
+        <a:lstStyle/>
+        <a:p>
+          <a:r>
+            <a:rPr lang="pt-BR" dirty="0"/>
+            <a:t>Data</a:t>
+          </a:r>
+        </a:p>
+      </dgm:t>
+    </dgm:pt>
+    <dgm:pt modelId="{E52D7BBC-8DF7-4DE0-BEA5-2ADA1B8FB085}" type="parTrans" cxnId="{7481185B-D20E-46CA-9C25-04CA0157AB79}">
+      <dgm:prSet/>
+      <dgm:spPr/>
+      <dgm:t>
+        <a:bodyPr/>
+        <a:lstStyle/>
+        <a:p>
+          <a:endParaRPr lang="pt-BR"/>
+        </a:p>
+      </dgm:t>
+    </dgm:pt>
+    <dgm:pt modelId="{1AB401D9-5050-4F8B-8825-48B234AEA438}" type="sibTrans" cxnId="{7481185B-D20E-46CA-9C25-04CA0157AB79}">
+      <dgm:prSet/>
+      <dgm:spPr/>
+      <dgm:t>
+        <a:bodyPr/>
+        <a:lstStyle/>
+        <a:p>
+          <a:endParaRPr lang="pt-BR"/>
+        </a:p>
+      </dgm:t>
+    </dgm:pt>
+    <dgm:pt modelId="{EB882AEF-7A64-4B9B-B76B-795B048ADB91}">
+      <dgm:prSet phldrT="[Texto]"/>
+      <dgm:spPr/>
+      <dgm:t>
+        <a:bodyPr/>
+        <a:lstStyle/>
+        <a:p>
+          <a:r>
+            <a:rPr lang="pt-BR" dirty="0" err="1"/>
+            <a:t>Application</a:t>
+          </a:r>
+          <a:endParaRPr lang="pt-BR" dirty="0"/>
+        </a:p>
+      </dgm:t>
+    </dgm:pt>
+    <dgm:pt modelId="{C1141470-4DB6-4FF1-9143-2F9A5BC15C0C}" type="parTrans" cxnId="{AB3C3ACC-6CE0-4360-B6B5-5A0BAA68E87F}">
+      <dgm:prSet/>
+      <dgm:spPr/>
+      <dgm:t>
+        <a:bodyPr/>
+        <a:lstStyle/>
+        <a:p>
+          <a:endParaRPr lang="pt-BR"/>
+        </a:p>
+      </dgm:t>
+    </dgm:pt>
+    <dgm:pt modelId="{1744961A-17F4-4B79-A0F6-974F29BBCDE2}" type="sibTrans" cxnId="{AB3C3ACC-6CE0-4360-B6B5-5A0BAA68E87F}">
+      <dgm:prSet/>
+      <dgm:spPr/>
+      <dgm:t>
+        <a:bodyPr/>
+        <a:lstStyle/>
+        <a:p>
+          <a:endParaRPr lang="pt-BR"/>
+        </a:p>
+      </dgm:t>
+    </dgm:pt>
+    <dgm:pt modelId="{312A419D-6C94-48FE-96E5-C56A960B9E52}">
+      <dgm:prSet phldrT="[Texto]"/>
+      <dgm:spPr>
+        <a:solidFill>
+          <a:srgbClr val="77B900"/>
+        </a:solidFill>
+      </dgm:spPr>
+      <dgm:t>
+        <a:bodyPr/>
+        <a:lstStyle/>
+        <a:p>
+          <a:r>
+            <a:rPr lang="pt-BR" dirty="0"/>
+            <a:t>Data Science</a:t>
+          </a:r>
+        </a:p>
+      </dgm:t>
+    </dgm:pt>
+    <dgm:pt modelId="{1E800ECD-5793-4326-8766-CA5FE70AE457}" type="parTrans" cxnId="{FF72E8EF-CA72-49D7-8919-E388958505F8}">
+      <dgm:prSet/>
+      <dgm:spPr/>
+      <dgm:t>
+        <a:bodyPr/>
+        <a:lstStyle/>
+        <a:p>
+          <a:endParaRPr lang="pt-BR"/>
+        </a:p>
+      </dgm:t>
+    </dgm:pt>
+    <dgm:pt modelId="{10E26150-B378-4674-90FC-8D526EFBB23A}" type="sibTrans" cxnId="{FF72E8EF-CA72-49D7-8919-E388958505F8}">
+      <dgm:prSet/>
+      <dgm:spPr/>
+      <dgm:t>
+        <a:bodyPr/>
+        <a:lstStyle/>
+        <a:p>
+          <a:endParaRPr lang="pt-BR"/>
+        </a:p>
+      </dgm:t>
+    </dgm:pt>
+    <dgm:pt modelId="{EE169183-2C24-41A8-886E-EA57A0549B57}">
+      <dgm:prSet phldrT="[Texto]"/>
+      <dgm:spPr/>
+      <dgm:t>
+        <a:bodyPr/>
+        <a:lstStyle/>
+        <a:p>
+          <a:r>
+            <a:rPr lang="pt-BR" dirty="0" err="1"/>
+            <a:t>BigData</a:t>
+          </a:r>
+          <a:endParaRPr lang="pt-BR" dirty="0"/>
+        </a:p>
+      </dgm:t>
+    </dgm:pt>
+    <dgm:pt modelId="{32BA543B-D248-456D-B51D-296DFB52F919}" type="parTrans" cxnId="{13BD4FED-6D52-4F48-A878-A38268957256}">
+      <dgm:prSet/>
+      <dgm:spPr/>
+      <dgm:t>
+        <a:bodyPr/>
+        <a:lstStyle/>
+        <a:p>
+          <a:endParaRPr lang="pt-BR"/>
+        </a:p>
+      </dgm:t>
+    </dgm:pt>
+    <dgm:pt modelId="{6F412A3B-B5C4-4603-83A6-970880A2AE23}" type="sibTrans" cxnId="{13BD4FED-6D52-4F48-A878-A38268957256}">
+      <dgm:prSet/>
+      <dgm:spPr/>
+      <dgm:t>
+        <a:bodyPr/>
+        <a:lstStyle/>
+        <a:p>
+          <a:endParaRPr lang="pt-BR"/>
+        </a:p>
+      </dgm:t>
+    </dgm:pt>
+    <dgm:pt modelId="{EE5A0403-AA5E-4765-9E7F-A7E9E0B2D19E}">
+      <dgm:prSet phldrT="[Texto]"/>
+      <dgm:spPr/>
+      <dgm:t>
+        <a:bodyPr/>
+        <a:lstStyle/>
+        <a:p>
+          <a:r>
+            <a:rPr lang="pt-BR" dirty="0"/>
+            <a:t>Insights</a:t>
+          </a:r>
+        </a:p>
+      </dgm:t>
+    </dgm:pt>
+    <dgm:pt modelId="{E4C5C481-EA5A-4880-9046-5A065C7D66B2}" type="parTrans" cxnId="{AEFF74DF-63BF-4DAD-AC76-3525A5FDB96A}">
+      <dgm:prSet/>
+      <dgm:spPr/>
+      <dgm:t>
+        <a:bodyPr/>
+        <a:lstStyle/>
+        <a:p>
+          <a:endParaRPr lang="pt-BR"/>
+        </a:p>
+      </dgm:t>
+    </dgm:pt>
+    <dgm:pt modelId="{203D3F29-C760-4232-9E38-BE83BE5AE6DE}" type="sibTrans" cxnId="{AEFF74DF-63BF-4DAD-AC76-3525A5FDB96A}">
+      <dgm:prSet/>
+      <dgm:spPr/>
+      <dgm:t>
+        <a:bodyPr/>
+        <a:lstStyle/>
+        <a:p>
+          <a:endParaRPr lang="pt-BR"/>
+        </a:p>
+      </dgm:t>
+    </dgm:pt>
+    <dgm:pt modelId="{DD418934-55C9-45DC-B450-C390EAD6C7A7}">
+      <dgm:prSet phldrT="[Texto]"/>
+      <dgm:spPr>
+        <a:solidFill>
+          <a:srgbClr val="002060"/>
+        </a:solidFill>
+      </dgm:spPr>
+      <dgm:t>
+        <a:bodyPr/>
+        <a:lstStyle/>
+        <a:p>
+          <a:r>
+            <a:rPr lang="pt-BR" dirty="0"/>
+            <a:t>Data </a:t>
+          </a:r>
+          <a:r>
+            <a:rPr lang="pt-BR" dirty="0" err="1"/>
+            <a:t>Engineering</a:t>
+          </a:r>
+          <a:endParaRPr lang="pt-BR" dirty="0"/>
+        </a:p>
+      </dgm:t>
+    </dgm:pt>
+    <dgm:pt modelId="{FAC01FE7-6CA7-4AC4-A326-BB4D294C08A0}" type="parTrans" cxnId="{62508352-C5DF-4972-8145-871F3D3CD088}">
+      <dgm:prSet/>
+      <dgm:spPr/>
+      <dgm:t>
+        <a:bodyPr/>
+        <a:lstStyle/>
+        <a:p>
+          <a:endParaRPr lang="pt-BR"/>
+        </a:p>
+      </dgm:t>
+    </dgm:pt>
+    <dgm:pt modelId="{B81B4500-7C9B-4C4B-8EBE-A75BE2FBCF76}" type="sibTrans" cxnId="{62508352-C5DF-4972-8145-871F3D3CD088}">
+      <dgm:prSet/>
+      <dgm:spPr/>
+      <dgm:t>
+        <a:bodyPr/>
+        <a:lstStyle/>
+        <a:p>
+          <a:endParaRPr lang="pt-BR"/>
+        </a:p>
+      </dgm:t>
+    </dgm:pt>
+    <dgm:pt modelId="{7D02A4A2-4A8C-4037-8017-90CA44006D4F}">
+      <dgm:prSet phldrT="[Texto]"/>
+      <dgm:spPr/>
+      <dgm:t>
+        <a:bodyPr/>
+        <a:lstStyle/>
+        <a:p>
+          <a:r>
+            <a:rPr lang="pt-BR" dirty="0"/>
+            <a:t>Data </a:t>
+          </a:r>
+          <a:r>
+            <a:rPr lang="pt-BR" dirty="0" err="1"/>
+            <a:t>Collection</a:t>
+          </a:r>
+          <a:endParaRPr lang="pt-BR" dirty="0"/>
+        </a:p>
+      </dgm:t>
+    </dgm:pt>
+    <dgm:pt modelId="{F6967957-B86B-4D2E-B9B9-8DA680A10E8B}" type="parTrans" cxnId="{A251A998-8EAF-4074-8FE7-901D2C4B1705}">
+      <dgm:prSet/>
+      <dgm:spPr/>
+      <dgm:t>
+        <a:bodyPr/>
+        <a:lstStyle/>
+        <a:p>
+          <a:endParaRPr lang="pt-BR"/>
+        </a:p>
+      </dgm:t>
+    </dgm:pt>
+    <dgm:pt modelId="{D434B2BC-C8A2-4947-847B-76C6E39667D3}" type="sibTrans" cxnId="{A251A998-8EAF-4074-8FE7-901D2C4B1705}">
+      <dgm:prSet/>
+      <dgm:spPr/>
+      <dgm:t>
+        <a:bodyPr/>
+        <a:lstStyle/>
+        <a:p>
+          <a:endParaRPr lang="pt-BR"/>
+        </a:p>
+      </dgm:t>
+    </dgm:pt>
+    <dgm:pt modelId="{91505595-9476-4E37-B3C6-78AC54543F07}">
+      <dgm:prSet phldrT="[Texto]"/>
+      <dgm:spPr/>
+      <dgm:t>
+        <a:bodyPr/>
+        <a:lstStyle/>
+        <a:p>
+          <a:r>
+            <a:rPr lang="pt-BR" dirty="0"/>
+            <a:t>Data </a:t>
+          </a:r>
+          <a:r>
+            <a:rPr lang="pt-BR" dirty="0" err="1"/>
+            <a:t>Preparation</a:t>
+          </a:r>
+          <a:endParaRPr lang="pt-BR" dirty="0"/>
+        </a:p>
+      </dgm:t>
+    </dgm:pt>
+    <dgm:pt modelId="{36863FD4-4525-4EDB-9A3E-22793322617E}" type="parTrans" cxnId="{101B3244-8B12-407E-BBAA-84EF4B9D924A}">
+      <dgm:prSet/>
+      <dgm:spPr/>
+      <dgm:t>
+        <a:bodyPr/>
+        <a:lstStyle/>
+        <a:p>
+          <a:endParaRPr lang="pt-BR"/>
+        </a:p>
+      </dgm:t>
+    </dgm:pt>
+    <dgm:pt modelId="{95847731-3DB0-45C0-89B2-774E90C94521}" type="sibTrans" cxnId="{101B3244-8B12-407E-BBAA-84EF4B9D924A}">
+      <dgm:prSet/>
+      <dgm:spPr/>
+      <dgm:t>
+        <a:bodyPr/>
+        <a:lstStyle/>
+        <a:p>
+          <a:endParaRPr lang="pt-BR"/>
+        </a:p>
+      </dgm:t>
+    </dgm:pt>
+    <dgm:pt modelId="{42251075-6C32-4C66-A2EE-5B6CF96A1D1C}" type="pres">
+      <dgm:prSet presAssocID="{26E6752C-9159-4C46-BC02-07AFE5C6E13D}" presName="Name0" presStyleCnt="0">
+        <dgm:presLayoutVars>
+          <dgm:chMax val="3"/>
+          <dgm:chPref val="1"/>
+          <dgm:dir/>
+          <dgm:animLvl val="lvl"/>
+          <dgm:resizeHandles/>
+        </dgm:presLayoutVars>
+      </dgm:prSet>
+      <dgm:spPr/>
+    </dgm:pt>
+    <dgm:pt modelId="{FCE4ADF6-2D21-4DBE-9865-940ED2FB69DA}" type="pres">
+      <dgm:prSet presAssocID="{26E6752C-9159-4C46-BC02-07AFE5C6E13D}" presName="outerBox" presStyleCnt="0"/>
+      <dgm:spPr/>
+    </dgm:pt>
+    <dgm:pt modelId="{2552569A-13EF-4E3E-ADC8-1CCEE4548AE2}" type="pres">
+      <dgm:prSet presAssocID="{26E6752C-9159-4C46-BC02-07AFE5C6E13D}" presName="outerBoxParent" presStyleLbl="node1" presStyleIdx="0" presStyleCnt="3" custLinFactNeighborX="11270" custLinFactNeighborY="5380"/>
+      <dgm:spPr/>
+    </dgm:pt>
+    <dgm:pt modelId="{E92F04D9-10B8-45A4-A503-FD8EAEA616C1}" type="pres">
+      <dgm:prSet presAssocID="{26E6752C-9159-4C46-BC02-07AFE5C6E13D}" presName="outerBoxChildren" presStyleCnt="0"/>
+      <dgm:spPr/>
+    </dgm:pt>
+    <dgm:pt modelId="{21EC3FEF-5517-4883-BEE8-66D580F454DA}" type="pres">
+      <dgm:prSet presAssocID="{CD9D1996-26C8-47BA-BCE5-08C5F0BB0F69}" presName="oChild" presStyleLbl="fgAcc1" presStyleIdx="0" presStyleCnt="6">
+        <dgm:presLayoutVars>
+          <dgm:bulletEnabled val="1"/>
+        </dgm:presLayoutVars>
+      </dgm:prSet>
+      <dgm:spPr/>
+    </dgm:pt>
+    <dgm:pt modelId="{1EC6A2B0-AD5A-4783-A193-A9A782726D81}" type="pres">
+      <dgm:prSet presAssocID="{1AB401D9-5050-4F8B-8825-48B234AEA438}" presName="outerSibTrans" presStyleCnt="0"/>
+      <dgm:spPr/>
+    </dgm:pt>
+    <dgm:pt modelId="{080B582A-9A87-441A-B5B2-FE7F1E7D20AD}" type="pres">
+      <dgm:prSet presAssocID="{EB882AEF-7A64-4B9B-B76B-795B048ADB91}" presName="oChild" presStyleLbl="fgAcc1" presStyleIdx="1" presStyleCnt="6">
+        <dgm:presLayoutVars>
+          <dgm:bulletEnabled val="1"/>
+        </dgm:presLayoutVars>
+      </dgm:prSet>
+      <dgm:spPr/>
+    </dgm:pt>
+    <dgm:pt modelId="{5EFFAB95-CA77-4152-8C83-1760F227A70E}" type="pres">
+      <dgm:prSet presAssocID="{26E6752C-9159-4C46-BC02-07AFE5C6E13D}" presName="middleBox" presStyleCnt="0"/>
+      <dgm:spPr/>
+    </dgm:pt>
+    <dgm:pt modelId="{BD65142E-8152-4D6F-98CE-73AF32F79646}" type="pres">
+      <dgm:prSet presAssocID="{26E6752C-9159-4C46-BC02-07AFE5C6E13D}" presName="middleBoxParent" presStyleLbl="node1" presStyleIdx="1" presStyleCnt="3"/>
+      <dgm:spPr/>
+    </dgm:pt>
+    <dgm:pt modelId="{D1AE34D9-A693-4D90-8EC5-5B3BBEB589C7}" type="pres">
+      <dgm:prSet presAssocID="{26E6752C-9159-4C46-BC02-07AFE5C6E13D}" presName="middleBoxChildren" presStyleCnt="0"/>
+      <dgm:spPr/>
+    </dgm:pt>
+    <dgm:pt modelId="{1543E044-AEDA-4C95-930B-5F988C17B5BC}" type="pres">
+      <dgm:prSet presAssocID="{EE169183-2C24-41A8-886E-EA57A0549B57}" presName="mChild" presStyleLbl="fgAcc1" presStyleIdx="2" presStyleCnt="6">
+        <dgm:presLayoutVars>
+          <dgm:bulletEnabled val="1"/>
+        </dgm:presLayoutVars>
+      </dgm:prSet>
+      <dgm:spPr/>
+    </dgm:pt>
+    <dgm:pt modelId="{4D5F77BB-826F-4D0C-B979-E3C21A3324FF}" type="pres">
+      <dgm:prSet presAssocID="{6F412A3B-B5C4-4603-83A6-970880A2AE23}" presName="middleSibTrans" presStyleCnt="0"/>
+      <dgm:spPr/>
+    </dgm:pt>
+    <dgm:pt modelId="{25919A76-8CC7-45E3-B442-E6DC2493A734}" type="pres">
+      <dgm:prSet presAssocID="{EE5A0403-AA5E-4765-9E7F-A7E9E0B2D19E}" presName="mChild" presStyleLbl="fgAcc1" presStyleIdx="3" presStyleCnt="6">
+        <dgm:presLayoutVars>
+          <dgm:bulletEnabled val="1"/>
+        </dgm:presLayoutVars>
+      </dgm:prSet>
+      <dgm:spPr/>
+    </dgm:pt>
+    <dgm:pt modelId="{13685338-6D62-4990-AFF2-451780939234}" type="pres">
+      <dgm:prSet presAssocID="{26E6752C-9159-4C46-BC02-07AFE5C6E13D}" presName="centerBox" presStyleCnt="0"/>
+      <dgm:spPr/>
+    </dgm:pt>
+    <dgm:pt modelId="{37063086-67AD-4A60-816C-97A6EE25F88E}" type="pres">
+      <dgm:prSet presAssocID="{26E6752C-9159-4C46-BC02-07AFE5C6E13D}" presName="centerBoxParent" presStyleLbl="node1" presStyleIdx="2" presStyleCnt="3"/>
+      <dgm:spPr/>
+    </dgm:pt>
+    <dgm:pt modelId="{FB6D3A8C-65F4-4E38-9B93-E18AB5C851AA}" type="pres">
+      <dgm:prSet presAssocID="{26E6752C-9159-4C46-BC02-07AFE5C6E13D}" presName="centerBoxChildren" presStyleCnt="0"/>
+      <dgm:spPr/>
+    </dgm:pt>
+    <dgm:pt modelId="{17E6E08B-E2D6-4215-9A2A-1ED1E0193618}" type="pres">
+      <dgm:prSet presAssocID="{7D02A4A2-4A8C-4037-8017-90CA44006D4F}" presName="cChild" presStyleLbl="fgAcc1" presStyleIdx="4" presStyleCnt="6">
+        <dgm:presLayoutVars>
+          <dgm:bulletEnabled val="1"/>
+        </dgm:presLayoutVars>
+      </dgm:prSet>
+      <dgm:spPr/>
+    </dgm:pt>
+    <dgm:pt modelId="{FF752449-F24B-4DF5-9642-1D94BECE611E}" type="pres">
+      <dgm:prSet presAssocID="{D434B2BC-C8A2-4947-847B-76C6E39667D3}" presName="centerSibTrans" presStyleCnt="0"/>
+      <dgm:spPr/>
+    </dgm:pt>
+    <dgm:pt modelId="{C9CD35B3-3901-4E3E-9883-F585D0ECABB5}" type="pres">
+      <dgm:prSet presAssocID="{91505595-9476-4E37-B3C6-78AC54543F07}" presName="cChild" presStyleLbl="fgAcc1" presStyleIdx="5" presStyleCnt="6">
+        <dgm:presLayoutVars>
+          <dgm:bulletEnabled val="1"/>
+        </dgm:presLayoutVars>
+      </dgm:prSet>
+      <dgm:spPr/>
+    </dgm:pt>
+  </dgm:ptLst>
+  <dgm:cxnLst>
+    <dgm:cxn modelId="{2784BD0C-5B8D-4096-A253-F8BB1E856B92}" srcId="{26E6752C-9159-4C46-BC02-07AFE5C6E13D}" destId="{5C1B67AA-9080-438E-956A-36BF8FD17D54}" srcOrd="0" destOrd="0" parTransId="{E7B33D26-340B-4DA9-BB53-7C19CD375135}" sibTransId="{173562FA-ABFE-42AB-B7F5-D183AC91288E}"/>
+    <dgm:cxn modelId="{8524510F-D271-4545-A374-13E184551C7A}" type="presOf" srcId="{312A419D-6C94-48FE-96E5-C56A960B9E52}" destId="{BD65142E-8152-4D6F-98CE-73AF32F79646}" srcOrd="0" destOrd="0" presId="urn:microsoft.com/office/officeart/2005/8/layout/target2"/>
+    <dgm:cxn modelId="{1475CC1C-4BAF-49F4-A2D1-687953CE4BC5}" type="presOf" srcId="{5C1B67AA-9080-438E-956A-36BF8FD17D54}" destId="{2552569A-13EF-4E3E-ADC8-1CCEE4548AE2}" srcOrd="0" destOrd="0" presId="urn:microsoft.com/office/officeart/2005/8/layout/target2"/>
+    <dgm:cxn modelId="{21B0B827-0011-4E2A-8391-BC2DBE058844}" type="presOf" srcId="{26E6752C-9159-4C46-BC02-07AFE5C6E13D}" destId="{42251075-6C32-4C66-A2EE-5B6CF96A1D1C}" srcOrd="0" destOrd="0" presId="urn:microsoft.com/office/officeart/2005/8/layout/target2"/>
+    <dgm:cxn modelId="{7481185B-D20E-46CA-9C25-04CA0157AB79}" srcId="{5C1B67AA-9080-438E-956A-36BF8FD17D54}" destId="{CD9D1996-26C8-47BA-BCE5-08C5F0BB0F69}" srcOrd="0" destOrd="0" parTransId="{E52D7BBC-8DF7-4DE0-BEA5-2ADA1B8FB085}" sibTransId="{1AB401D9-5050-4F8B-8825-48B234AEA438}"/>
+    <dgm:cxn modelId="{101B3244-8B12-407E-BBAA-84EF4B9D924A}" srcId="{DD418934-55C9-45DC-B450-C390EAD6C7A7}" destId="{91505595-9476-4E37-B3C6-78AC54543F07}" srcOrd="1" destOrd="0" parTransId="{36863FD4-4525-4EDB-9A3E-22793322617E}" sibTransId="{95847731-3DB0-45C0-89B2-774E90C94521}"/>
+    <dgm:cxn modelId="{62508352-C5DF-4972-8145-871F3D3CD088}" srcId="{26E6752C-9159-4C46-BC02-07AFE5C6E13D}" destId="{DD418934-55C9-45DC-B450-C390EAD6C7A7}" srcOrd="2" destOrd="0" parTransId="{FAC01FE7-6CA7-4AC4-A326-BB4D294C08A0}" sibTransId="{B81B4500-7C9B-4C4B-8EBE-A75BE2FBCF76}"/>
+    <dgm:cxn modelId="{6B329485-0EC1-4D60-A2C6-CDF0F62EB200}" type="presOf" srcId="{91505595-9476-4E37-B3C6-78AC54543F07}" destId="{C9CD35B3-3901-4E3E-9883-F585D0ECABB5}" srcOrd="0" destOrd="0" presId="urn:microsoft.com/office/officeart/2005/8/layout/target2"/>
+    <dgm:cxn modelId="{A251A998-8EAF-4074-8FE7-901D2C4B1705}" srcId="{DD418934-55C9-45DC-B450-C390EAD6C7A7}" destId="{7D02A4A2-4A8C-4037-8017-90CA44006D4F}" srcOrd="0" destOrd="0" parTransId="{F6967957-B86B-4D2E-B9B9-8DA680A10E8B}" sibTransId="{D434B2BC-C8A2-4947-847B-76C6E39667D3}"/>
+    <dgm:cxn modelId="{F0EC7E9E-786B-4C64-B18B-09700B74D8EF}" type="presOf" srcId="{EE169183-2C24-41A8-886E-EA57A0549B57}" destId="{1543E044-AEDA-4C95-930B-5F988C17B5BC}" srcOrd="0" destOrd="0" presId="urn:microsoft.com/office/officeart/2005/8/layout/target2"/>
+    <dgm:cxn modelId="{35621CAE-41C7-45D3-BFFF-3D946C2FD3D1}" type="presOf" srcId="{7D02A4A2-4A8C-4037-8017-90CA44006D4F}" destId="{17E6E08B-E2D6-4215-9A2A-1ED1E0193618}" srcOrd="0" destOrd="0" presId="urn:microsoft.com/office/officeart/2005/8/layout/target2"/>
+    <dgm:cxn modelId="{0CE942BC-FF88-4E69-A053-90D0936BB019}" type="presOf" srcId="{EB882AEF-7A64-4B9B-B76B-795B048ADB91}" destId="{080B582A-9A87-441A-B5B2-FE7F1E7D20AD}" srcOrd="0" destOrd="0" presId="urn:microsoft.com/office/officeart/2005/8/layout/target2"/>
+    <dgm:cxn modelId="{79F1C8BC-209C-4178-8D34-9FF485102B58}" type="presOf" srcId="{EE5A0403-AA5E-4765-9E7F-A7E9E0B2D19E}" destId="{25919A76-8CC7-45E3-B442-E6DC2493A734}" srcOrd="0" destOrd="0" presId="urn:microsoft.com/office/officeart/2005/8/layout/target2"/>
+    <dgm:cxn modelId="{AB3C3ACC-6CE0-4360-B6B5-5A0BAA68E87F}" srcId="{5C1B67AA-9080-438E-956A-36BF8FD17D54}" destId="{EB882AEF-7A64-4B9B-B76B-795B048ADB91}" srcOrd="1" destOrd="0" parTransId="{C1141470-4DB6-4FF1-9143-2F9A5BC15C0C}" sibTransId="{1744961A-17F4-4B79-A0F6-974F29BBCDE2}"/>
+    <dgm:cxn modelId="{33CC4FCC-C134-4BF2-A7D4-67BFDD32D9CE}" type="presOf" srcId="{DD418934-55C9-45DC-B450-C390EAD6C7A7}" destId="{37063086-67AD-4A60-816C-97A6EE25F88E}" srcOrd="0" destOrd="0" presId="urn:microsoft.com/office/officeart/2005/8/layout/target2"/>
+    <dgm:cxn modelId="{AEFF74DF-63BF-4DAD-AC76-3525A5FDB96A}" srcId="{312A419D-6C94-48FE-96E5-C56A960B9E52}" destId="{EE5A0403-AA5E-4765-9E7F-A7E9E0B2D19E}" srcOrd="1" destOrd="0" parTransId="{E4C5C481-EA5A-4880-9046-5A065C7D66B2}" sibTransId="{203D3F29-C760-4232-9E38-BE83BE5AE6DE}"/>
+    <dgm:cxn modelId="{13BD4FED-6D52-4F48-A878-A38268957256}" srcId="{312A419D-6C94-48FE-96E5-C56A960B9E52}" destId="{EE169183-2C24-41A8-886E-EA57A0549B57}" srcOrd="0" destOrd="0" parTransId="{32BA543B-D248-456D-B51D-296DFB52F919}" sibTransId="{6F412A3B-B5C4-4603-83A6-970880A2AE23}"/>
+    <dgm:cxn modelId="{FF72E8EF-CA72-49D7-8919-E388958505F8}" srcId="{26E6752C-9159-4C46-BC02-07AFE5C6E13D}" destId="{312A419D-6C94-48FE-96E5-C56A960B9E52}" srcOrd="1" destOrd="0" parTransId="{1E800ECD-5793-4326-8766-CA5FE70AE457}" sibTransId="{10E26150-B378-4674-90FC-8D526EFBB23A}"/>
+    <dgm:cxn modelId="{D100EAF6-5EDD-4647-9853-87E15C3EFB57}" type="presOf" srcId="{CD9D1996-26C8-47BA-BCE5-08C5F0BB0F69}" destId="{21EC3FEF-5517-4883-BEE8-66D580F454DA}" srcOrd="0" destOrd="0" presId="urn:microsoft.com/office/officeart/2005/8/layout/target2"/>
+    <dgm:cxn modelId="{FED132F8-7D84-42BB-B48D-F90A7BBE4473}" type="presParOf" srcId="{42251075-6C32-4C66-A2EE-5B6CF96A1D1C}" destId="{FCE4ADF6-2D21-4DBE-9865-940ED2FB69DA}" srcOrd="0" destOrd="0" presId="urn:microsoft.com/office/officeart/2005/8/layout/target2"/>
+    <dgm:cxn modelId="{B4F37F6D-F43E-41C8-BF78-ABF68D7AEC45}" type="presParOf" srcId="{FCE4ADF6-2D21-4DBE-9865-940ED2FB69DA}" destId="{2552569A-13EF-4E3E-ADC8-1CCEE4548AE2}" srcOrd="0" destOrd="0" presId="urn:microsoft.com/office/officeart/2005/8/layout/target2"/>
+    <dgm:cxn modelId="{3588495F-9DE0-4462-8C41-490EED3BC995}" type="presParOf" srcId="{FCE4ADF6-2D21-4DBE-9865-940ED2FB69DA}" destId="{E92F04D9-10B8-45A4-A503-FD8EAEA616C1}" srcOrd="1" destOrd="0" presId="urn:microsoft.com/office/officeart/2005/8/layout/target2"/>
+    <dgm:cxn modelId="{E13C1BF1-B5F3-4F20-882F-9A47C231A34D}" type="presParOf" srcId="{E92F04D9-10B8-45A4-A503-FD8EAEA616C1}" destId="{21EC3FEF-5517-4883-BEE8-66D580F454DA}" srcOrd="0" destOrd="0" presId="urn:microsoft.com/office/officeart/2005/8/layout/target2"/>
+    <dgm:cxn modelId="{C7549ED3-2604-4408-951C-89D4A9C06AB0}" type="presParOf" srcId="{E92F04D9-10B8-45A4-A503-FD8EAEA616C1}" destId="{1EC6A2B0-AD5A-4783-A193-A9A782726D81}" srcOrd="1" destOrd="0" presId="urn:microsoft.com/office/officeart/2005/8/layout/target2"/>
+    <dgm:cxn modelId="{34838D75-1AAD-4C1B-8C0C-7C95F742AB66}" type="presParOf" srcId="{E92F04D9-10B8-45A4-A503-FD8EAEA616C1}" destId="{080B582A-9A87-441A-B5B2-FE7F1E7D20AD}" srcOrd="2" destOrd="0" presId="urn:microsoft.com/office/officeart/2005/8/layout/target2"/>
+    <dgm:cxn modelId="{B078C5CB-6773-4245-A52B-E3C1D7B4D117}" type="presParOf" srcId="{42251075-6C32-4C66-A2EE-5B6CF96A1D1C}" destId="{5EFFAB95-CA77-4152-8C83-1760F227A70E}" srcOrd="1" destOrd="0" presId="urn:microsoft.com/office/officeart/2005/8/layout/target2"/>
+    <dgm:cxn modelId="{01D05523-C0F0-4E80-BF07-104501F2EE01}" type="presParOf" srcId="{5EFFAB95-CA77-4152-8C83-1760F227A70E}" destId="{BD65142E-8152-4D6F-98CE-73AF32F79646}" srcOrd="0" destOrd="0" presId="urn:microsoft.com/office/officeart/2005/8/layout/target2"/>
+    <dgm:cxn modelId="{585454A0-017B-4891-904B-D5C71F6EFDBF}" type="presParOf" srcId="{5EFFAB95-CA77-4152-8C83-1760F227A70E}" destId="{D1AE34D9-A693-4D90-8EC5-5B3BBEB589C7}" srcOrd="1" destOrd="0" presId="urn:microsoft.com/office/officeart/2005/8/layout/target2"/>
+    <dgm:cxn modelId="{1A22B563-FE7E-4697-9687-330C827034E5}" type="presParOf" srcId="{D1AE34D9-A693-4D90-8EC5-5B3BBEB589C7}" destId="{1543E044-AEDA-4C95-930B-5F988C17B5BC}" srcOrd="0" destOrd="0" presId="urn:microsoft.com/office/officeart/2005/8/layout/target2"/>
+    <dgm:cxn modelId="{3B4CE98C-45A7-47B0-B51F-95CA9989BEFC}" type="presParOf" srcId="{D1AE34D9-A693-4D90-8EC5-5B3BBEB589C7}" destId="{4D5F77BB-826F-4D0C-B979-E3C21A3324FF}" srcOrd="1" destOrd="0" presId="urn:microsoft.com/office/officeart/2005/8/layout/target2"/>
+    <dgm:cxn modelId="{45B09441-BD0F-4F27-A377-781BE0F426CB}" type="presParOf" srcId="{D1AE34D9-A693-4D90-8EC5-5B3BBEB589C7}" destId="{25919A76-8CC7-45E3-B442-E6DC2493A734}" srcOrd="2" destOrd="0" presId="urn:microsoft.com/office/officeart/2005/8/layout/target2"/>
+    <dgm:cxn modelId="{0004269E-EC4F-4427-AD9F-02A618C76536}" type="presParOf" srcId="{42251075-6C32-4C66-A2EE-5B6CF96A1D1C}" destId="{13685338-6D62-4990-AFF2-451780939234}" srcOrd="2" destOrd="0" presId="urn:microsoft.com/office/officeart/2005/8/layout/target2"/>
+    <dgm:cxn modelId="{1E389AF2-EAB0-48F1-BA44-ED62B8B3C74C}" type="presParOf" srcId="{13685338-6D62-4990-AFF2-451780939234}" destId="{37063086-67AD-4A60-816C-97A6EE25F88E}" srcOrd="0" destOrd="0" presId="urn:microsoft.com/office/officeart/2005/8/layout/target2"/>
+    <dgm:cxn modelId="{6AD202E3-71BF-40A3-AE05-F861AD5B9E66}" type="presParOf" srcId="{13685338-6D62-4990-AFF2-451780939234}" destId="{FB6D3A8C-65F4-4E38-9B93-E18AB5C851AA}" srcOrd="1" destOrd="0" presId="urn:microsoft.com/office/officeart/2005/8/layout/target2"/>
+    <dgm:cxn modelId="{B92B27C4-A527-403A-8947-0EC0A8E2D209}" type="presParOf" srcId="{FB6D3A8C-65F4-4E38-9B93-E18AB5C851AA}" destId="{17E6E08B-E2D6-4215-9A2A-1ED1E0193618}" srcOrd="0" destOrd="0" presId="urn:microsoft.com/office/officeart/2005/8/layout/target2"/>
+    <dgm:cxn modelId="{B1E8B5D0-D900-4954-818F-87F84E78C6BA}" type="presParOf" srcId="{FB6D3A8C-65F4-4E38-9B93-E18AB5C851AA}" destId="{FF752449-F24B-4DF5-9642-1D94BECE611E}" srcOrd="1" destOrd="0" presId="urn:microsoft.com/office/officeart/2005/8/layout/target2"/>
+    <dgm:cxn modelId="{2AA54D75-31A5-4A2A-9E3F-6B94D2FEE758}" type="presParOf" srcId="{FB6D3A8C-65F4-4E38-9B93-E18AB5C851AA}" destId="{C9CD35B3-3901-4E3E-9883-F585D0ECABB5}" srcOrd="2" destOrd="0" presId="urn:microsoft.com/office/officeart/2005/8/layout/target2"/>
+  </dgm:cxnLst>
+  <dgm:bg/>
+  <dgm:whole/>
+  <dgm:extLst>
+    <a:ext uri="http://schemas.microsoft.com/office/drawing/2008/diagram">
+      <dsp:dataModelExt xmlns:dsp="http://schemas.microsoft.com/office/drawing/2008/diagram" relId="rId6" minVer="http://schemas.openxmlformats.org/drawingml/2006/diagram"/>
+    </a:ext>
+  </dgm:extLst>
+</dgm:dataModel>
+</file>
+
+<file path=ppt/diagrams/drawing1.xml><?xml version="1.0" encoding="utf-8"?>
+<dsp:drawing xmlns:dgm="http://schemas.openxmlformats.org/drawingml/2006/diagram" xmlns:dsp="http://schemas.microsoft.com/office/drawing/2008/diagram" xmlns:a="http://schemas.openxmlformats.org/drawingml/2006/main">
+  <dsp:spTree>
+    <dsp:nvGrpSpPr>
+      <dsp:cNvPr id="0" name=""/>
+      <dsp:cNvGrpSpPr/>
+    </dsp:nvGrpSpPr>
+    <dsp:grpSpPr/>
+    <dsp:sp modelId="{2552569A-13EF-4E3E-ADC8-1CCEE4548AE2}">
+      <dsp:nvSpPr>
+        <dsp:cNvPr id="0" name=""/>
+        <dsp:cNvSpPr/>
+      </dsp:nvSpPr>
+      <dsp:spPr>
+        <a:xfrm>
+          <a:off x="0" y="0"/>
+          <a:ext cx="11956715" cy="6858001"/>
+        </a:xfrm>
+        <a:prstGeom prst="roundRect">
+          <a:avLst>
+            <a:gd name="adj" fmla="val 8500"/>
+          </a:avLst>
+        </a:prstGeom>
+        <a:solidFill>
+          <a:srgbClr val="7030A0"/>
+        </a:solidFill>
+        <a:ln w="12700" cap="flat" cmpd="sng" algn="ctr">
+          <a:solidFill>
+            <a:schemeClr val="lt1">
+              <a:hueOff val="0"/>
+              <a:satOff val="0"/>
+              <a:lumOff val="0"/>
+              <a:alphaOff val="0"/>
+            </a:schemeClr>
+          </a:solidFill>
+          <a:prstDash val="solid"/>
+          <a:miter lim="800000"/>
+        </a:ln>
+        <a:effectLst/>
+      </dsp:spPr>
+      <dsp:style>
+        <a:lnRef idx="2">
+          <a:scrgbClr r="0" g="0" b="0"/>
+        </a:lnRef>
+        <a:fillRef idx="1">
+          <a:scrgbClr r="0" g="0" b="0"/>
+        </a:fillRef>
+        <a:effectRef idx="0">
+          <a:scrgbClr r="0" g="0" b="0"/>
+        </a:effectRef>
+        <a:fontRef idx="minor">
+          <a:schemeClr val="lt1"/>
+        </a:fontRef>
+      </dsp:style>
+      <dsp:txBody>
+        <a:bodyPr spcFirstLastPara="0" vert="horz" wrap="square" lIns="217170" tIns="217170" rIns="217170" bIns="5322571" numCol="1" spcCol="1270" anchor="t" anchorCtr="0">
+          <a:noAutofit/>
+        </a:bodyPr>
+        <a:lstStyle/>
+        <a:p>
+          <a:pPr marL="0" lvl="0" indent="0" algn="l" defTabSz="2533650">
+            <a:lnSpc>
+              <a:spcPct val="90000"/>
+            </a:lnSpc>
+            <a:spcBef>
+              <a:spcPct val="0"/>
+            </a:spcBef>
+            <a:spcAft>
+              <a:spcPct val="35000"/>
+            </a:spcAft>
+            <a:buNone/>
+          </a:pPr>
+          <a:r>
+            <a:rPr lang="pt-BR" sz="5700" kern="1200" dirty="0"/>
+            <a:t>Software </a:t>
+          </a:r>
+          <a:r>
+            <a:rPr lang="pt-BR" sz="5700" kern="1200" dirty="0" err="1"/>
+            <a:t>Engineering</a:t>
+          </a:r>
+          <a:endParaRPr lang="pt-BR" sz="5700" kern="1200" dirty="0"/>
+        </a:p>
+      </dsp:txBody>
+      <dsp:txXfrm>
+        <a:off x="170734" y="170734"/>
+        <a:ext cx="11615247" cy="6516533"/>
+      </dsp:txXfrm>
+    </dsp:sp>
+    <dsp:sp modelId="{21EC3FEF-5517-4883-BEE8-66D580F454DA}">
+      <dsp:nvSpPr>
+        <dsp:cNvPr id="0" name=""/>
+        <dsp:cNvSpPr/>
+      </dsp:nvSpPr>
+      <dsp:spPr>
+        <a:xfrm>
+          <a:off x="298917" y="1714500"/>
+          <a:ext cx="1793507" cy="2355763"/>
+        </a:xfrm>
+        <a:prstGeom prst="roundRect">
+          <a:avLst>
+            <a:gd name="adj" fmla="val 10500"/>
+          </a:avLst>
+        </a:prstGeom>
+        <a:solidFill>
+          <a:schemeClr val="lt1">
+            <a:alpha val="90000"/>
+            <a:hueOff val="0"/>
+            <a:satOff val="0"/>
+            <a:lumOff val="0"/>
+            <a:alphaOff val="0"/>
+          </a:schemeClr>
+        </a:solidFill>
+        <a:ln w="12700" cap="flat" cmpd="sng" algn="ctr">
+          <a:solidFill>
+            <a:schemeClr val="accent1">
+              <a:hueOff val="0"/>
+              <a:satOff val="0"/>
+              <a:lumOff val="0"/>
+              <a:alphaOff val="0"/>
+            </a:schemeClr>
+          </a:solidFill>
+          <a:prstDash val="solid"/>
+          <a:miter lim="800000"/>
+        </a:ln>
+        <a:effectLst/>
+      </dsp:spPr>
+      <dsp:style>
+        <a:lnRef idx="2">
+          <a:scrgbClr r="0" g="0" b="0"/>
+        </a:lnRef>
+        <a:fillRef idx="1">
+          <a:scrgbClr r="0" g="0" b="0"/>
+        </a:fillRef>
+        <a:effectRef idx="0">
+          <a:scrgbClr r="0" g="0" b="0"/>
+        </a:effectRef>
+        <a:fontRef idx="minor"/>
+      </dsp:style>
+      <dsp:txBody>
+        <a:bodyPr spcFirstLastPara="0" vert="horz" wrap="square" lIns="95250" tIns="95250" rIns="95250" bIns="95250" numCol="1" spcCol="1270" anchor="ctr" anchorCtr="0">
+          <a:noAutofit/>
+        </a:bodyPr>
+        <a:lstStyle/>
+        <a:p>
+          <a:pPr marL="0" lvl="0" indent="0" algn="ctr" defTabSz="1111250">
+            <a:lnSpc>
+              <a:spcPct val="90000"/>
+            </a:lnSpc>
+            <a:spcBef>
+              <a:spcPct val="0"/>
+            </a:spcBef>
+            <a:spcAft>
+              <a:spcPct val="35000"/>
+            </a:spcAft>
+            <a:buNone/>
+          </a:pPr>
+          <a:r>
+            <a:rPr lang="pt-BR" sz="2500" kern="1200" dirty="0"/>
+            <a:t>Data</a:t>
+          </a:r>
+        </a:p>
+      </dsp:txBody>
+      <dsp:txXfrm>
+        <a:off x="354074" y="1769657"/>
+        <a:ext cx="1683193" cy="2245449"/>
+      </dsp:txXfrm>
+    </dsp:sp>
+    <dsp:sp modelId="{080B582A-9A87-441A-B5B2-FE7F1E7D20AD}">
+      <dsp:nvSpPr>
+        <dsp:cNvPr id="0" name=""/>
+        <dsp:cNvSpPr/>
+      </dsp:nvSpPr>
+      <dsp:spPr>
+        <a:xfrm>
+          <a:off x="298917" y="4158275"/>
+          <a:ext cx="1793507" cy="2355763"/>
+        </a:xfrm>
+        <a:prstGeom prst="roundRect">
+          <a:avLst>
+            <a:gd name="adj" fmla="val 10500"/>
+          </a:avLst>
+        </a:prstGeom>
+        <a:solidFill>
+          <a:schemeClr val="lt1">
+            <a:alpha val="90000"/>
+            <a:hueOff val="0"/>
+            <a:satOff val="0"/>
+            <a:lumOff val="0"/>
+            <a:alphaOff val="0"/>
+          </a:schemeClr>
+        </a:solidFill>
+        <a:ln w="12700" cap="flat" cmpd="sng" algn="ctr">
+          <a:solidFill>
+            <a:schemeClr val="accent1">
+              <a:hueOff val="0"/>
+              <a:satOff val="0"/>
+              <a:lumOff val="0"/>
+              <a:alphaOff val="0"/>
+            </a:schemeClr>
+          </a:solidFill>
+          <a:prstDash val="solid"/>
+          <a:miter lim="800000"/>
+        </a:ln>
+        <a:effectLst/>
+      </dsp:spPr>
+      <dsp:style>
+        <a:lnRef idx="2">
+          <a:scrgbClr r="0" g="0" b="0"/>
+        </a:lnRef>
+        <a:fillRef idx="1">
+          <a:scrgbClr r="0" g="0" b="0"/>
+        </a:fillRef>
+        <a:effectRef idx="0">
+          <a:scrgbClr r="0" g="0" b="0"/>
+        </a:effectRef>
+        <a:fontRef idx="minor"/>
+      </dsp:style>
+      <dsp:txBody>
+        <a:bodyPr spcFirstLastPara="0" vert="horz" wrap="square" lIns="95250" tIns="95250" rIns="95250" bIns="95250" numCol="1" spcCol="1270" anchor="ctr" anchorCtr="0">
+          <a:noAutofit/>
+        </a:bodyPr>
+        <a:lstStyle/>
+        <a:p>
+          <a:pPr marL="0" lvl="0" indent="0" algn="ctr" defTabSz="1111250">
+            <a:lnSpc>
+              <a:spcPct val="90000"/>
+            </a:lnSpc>
+            <a:spcBef>
+              <a:spcPct val="0"/>
+            </a:spcBef>
+            <a:spcAft>
+              <a:spcPct val="35000"/>
+            </a:spcAft>
+            <a:buNone/>
+          </a:pPr>
+          <a:r>
+            <a:rPr lang="pt-BR" sz="2500" kern="1200" dirty="0" err="1"/>
+            <a:t>Application</a:t>
+          </a:r>
+          <a:endParaRPr lang="pt-BR" sz="2500" kern="1200" dirty="0"/>
+        </a:p>
+      </dsp:txBody>
+      <dsp:txXfrm>
+        <a:off x="354074" y="4213432"/>
+        <a:ext cx="1683193" cy="2245449"/>
+      </dsp:txXfrm>
+    </dsp:sp>
+    <dsp:sp modelId="{BD65142E-8152-4D6F-98CE-73AF32F79646}">
+      <dsp:nvSpPr>
+        <dsp:cNvPr id="0" name=""/>
+        <dsp:cNvSpPr/>
+      </dsp:nvSpPr>
+      <dsp:spPr>
+        <a:xfrm>
+          <a:off x="2391343" y="1714500"/>
+          <a:ext cx="9266454" cy="4800600"/>
+        </a:xfrm>
+        <a:prstGeom prst="roundRect">
+          <a:avLst>
+            <a:gd name="adj" fmla="val 10500"/>
+          </a:avLst>
+        </a:prstGeom>
+        <a:solidFill>
+          <a:srgbClr val="77B900"/>
+        </a:solidFill>
+        <a:ln w="12700" cap="flat" cmpd="sng" algn="ctr">
+          <a:solidFill>
+            <a:schemeClr val="lt1">
+              <a:hueOff val="0"/>
+              <a:satOff val="0"/>
+              <a:lumOff val="0"/>
+              <a:alphaOff val="0"/>
+            </a:schemeClr>
+          </a:solidFill>
+          <a:prstDash val="solid"/>
+          <a:miter lim="800000"/>
+        </a:ln>
+        <a:effectLst/>
+      </dsp:spPr>
+      <dsp:style>
+        <a:lnRef idx="2">
+          <a:scrgbClr r="0" g="0" b="0"/>
+        </a:lnRef>
+        <a:fillRef idx="1">
+          <a:scrgbClr r="0" g="0" b="0"/>
+        </a:fillRef>
+        <a:effectRef idx="0">
+          <a:scrgbClr r="0" g="0" b="0"/>
+        </a:effectRef>
+        <a:fontRef idx="minor">
+          <a:schemeClr val="lt1"/>
+        </a:fontRef>
+      </dsp:style>
+      <dsp:txBody>
+        <a:bodyPr spcFirstLastPara="0" vert="horz" wrap="square" lIns="217170" tIns="217170" rIns="217170" bIns="3048381" numCol="1" spcCol="1270" anchor="t" anchorCtr="0">
+          <a:noAutofit/>
+        </a:bodyPr>
+        <a:lstStyle/>
+        <a:p>
+          <a:pPr marL="0" lvl="0" indent="0" algn="l" defTabSz="2533650">
+            <a:lnSpc>
+              <a:spcPct val="90000"/>
+            </a:lnSpc>
+            <a:spcBef>
+              <a:spcPct val="0"/>
+            </a:spcBef>
+            <a:spcAft>
+              <a:spcPct val="35000"/>
+            </a:spcAft>
+            <a:buNone/>
+          </a:pPr>
+          <a:r>
+            <a:rPr lang="pt-BR" sz="5700" kern="1200" dirty="0"/>
+            <a:t>Data Science</a:t>
+          </a:r>
+        </a:p>
+      </dsp:txBody>
+      <dsp:txXfrm>
+        <a:off x="2538978" y="1862135"/>
+        <a:ext cx="8971184" cy="4505330"/>
+      </dsp:txXfrm>
+    </dsp:sp>
+    <dsp:sp modelId="{1543E044-AEDA-4C95-930B-5F988C17B5BC}">
+      <dsp:nvSpPr>
+        <dsp:cNvPr id="0" name=""/>
+        <dsp:cNvSpPr/>
+      </dsp:nvSpPr>
+      <dsp:spPr>
+        <a:xfrm>
+          <a:off x="2623004" y="3394710"/>
+          <a:ext cx="1853290" cy="1335694"/>
+        </a:xfrm>
+        <a:prstGeom prst="roundRect">
+          <a:avLst>
+            <a:gd name="adj" fmla="val 10500"/>
+          </a:avLst>
+        </a:prstGeom>
+        <a:solidFill>
+          <a:schemeClr val="lt1">
+            <a:alpha val="90000"/>
+            <a:hueOff val="0"/>
+            <a:satOff val="0"/>
+            <a:lumOff val="0"/>
+            <a:alphaOff val="0"/>
+          </a:schemeClr>
+        </a:solidFill>
+        <a:ln w="12700" cap="flat" cmpd="sng" algn="ctr">
+          <a:solidFill>
+            <a:schemeClr val="accent1">
+              <a:hueOff val="0"/>
+              <a:satOff val="0"/>
+              <a:lumOff val="0"/>
+              <a:alphaOff val="0"/>
+            </a:schemeClr>
+          </a:solidFill>
+          <a:prstDash val="solid"/>
+          <a:miter lim="800000"/>
+        </a:ln>
+        <a:effectLst/>
+      </dsp:spPr>
+      <dsp:style>
+        <a:lnRef idx="2">
+          <a:scrgbClr r="0" g="0" b="0"/>
+        </a:lnRef>
+        <a:fillRef idx="1">
+          <a:scrgbClr r="0" g="0" b="0"/>
+        </a:fillRef>
+        <a:effectRef idx="0">
+          <a:scrgbClr r="0" g="0" b="0"/>
+        </a:effectRef>
+        <a:fontRef idx="minor"/>
+      </dsp:style>
+      <dsp:txBody>
+        <a:bodyPr spcFirstLastPara="0" vert="horz" wrap="square" lIns="95250" tIns="95250" rIns="95250" bIns="95250" numCol="1" spcCol="1270" anchor="ctr" anchorCtr="0">
+          <a:noAutofit/>
+        </a:bodyPr>
+        <a:lstStyle/>
+        <a:p>
+          <a:pPr marL="0" lvl="0" indent="0" algn="ctr" defTabSz="1111250">
+            <a:lnSpc>
+              <a:spcPct val="90000"/>
+            </a:lnSpc>
+            <a:spcBef>
+              <a:spcPct val="0"/>
+            </a:spcBef>
+            <a:spcAft>
+              <a:spcPct val="35000"/>
+            </a:spcAft>
+            <a:buNone/>
+          </a:pPr>
+          <a:r>
+            <a:rPr lang="pt-BR" sz="2500" kern="1200" dirty="0" err="1"/>
+            <a:t>BigData</a:t>
+          </a:r>
+          <a:endParaRPr lang="pt-BR" sz="2500" kern="1200" dirty="0"/>
+        </a:p>
+      </dsp:txBody>
+      <dsp:txXfrm>
+        <a:off x="2664081" y="3435787"/>
+        <a:ext cx="1771136" cy="1253540"/>
+      </dsp:txXfrm>
+    </dsp:sp>
+    <dsp:sp modelId="{25919A76-8CC7-45E3-B442-E6DC2493A734}">
+      <dsp:nvSpPr>
+        <dsp:cNvPr id="0" name=""/>
+        <dsp:cNvSpPr/>
+      </dsp:nvSpPr>
+      <dsp:spPr>
+        <a:xfrm>
+          <a:off x="2623004" y="4817190"/>
+          <a:ext cx="1853290" cy="1335694"/>
+        </a:xfrm>
+        <a:prstGeom prst="roundRect">
+          <a:avLst>
+            <a:gd name="adj" fmla="val 10500"/>
+          </a:avLst>
+        </a:prstGeom>
+        <a:solidFill>
+          <a:schemeClr val="lt1">
+            <a:alpha val="90000"/>
+            <a:hueOff val="0"/>
+            <a:satOff val="0"/>
+            <a:lumOff val="0"/>
+            <a:alphaOff val="0"/>
+          </a:schemeClr>
+        </a:solidFill>
+        <a:ln w="12700" cap="flat" cmpd="sng" algn="ctr">
+          <a:solidFill>
+            <a:schemeClr val="accent1">
+              <a:hueOff val="0"/>
+              <a:satOff val="0"/>
+              <a:lumOff val="0"/>
+              <a:alphaOff val="0"/>
+            </a:schemeClr>
+          </a:solidFill>
+          <a:prstDash val="solid"/>
+          <a:miter lim="800000"/>
+        </a:ln>
+        <a:effectLst/>
+      </dsp:spPr>
+      <dsp:style>
+        <a:lnRef idx="2">
+          <a:scrgbClr r="0" g="0" b="0"/>
+        </a:lnRef>
+        <a:fillRef idx="1">
+          <a:scrgbClr r="0" g="0" b="0"/>
+        </a:fillRef>
+        <a:effectRef idx="0">
+          <a:scrgbClr r="0" g="0" b="0"/>
+        </a:effectRef>
+        <a:fontRef idx="minor"/>
+      </dsp:style>
+      <dsp:txBody>
+        <a:bodyPr spcFirstLastPara="0" vert="horz" wrap="square" lIns="95250" tIns="95250" rIns="95250" bIns="95250" numCol="1" spcCol="1270" anchor="ctr" anchorCtr="0">
+          <a:noAutofit/>
+        </a:bodyPr>
+        <a:lstStyle/>
+        <a:p>
+          <a:pPr marL="0" lvl="0" indent="0" algn="ctr" defTabSz="1111250">
+            <a:lnSpc>
+              <a:spcPct val="90000"/>
+            </a:lnSpc>
+            <a:spcBef>
+              <a:spcPct val="0"/>
+            </a:spcBef>
+            <a:spcAft>
+              <a:spcPct val="35000"/>
+            </a:spcAft>
+            <a:buNone/>
+          </a:pPr>
+          <a:r>
+            <a:rPr lang="pt-BR" sz="2500" kern="1200" dirty="0"/>
+            <a:t>Insights</a:t>
+          </a:r>
+        </a:p>
+      </dsp:txBody>
+      <dsp:txXfrm>
+        <a:off x="2664081" y="4858267"/>
+        <a:ext cx="1771136" cy="1253540"/>
+      </dsp:txXfrm>
+    </dsp:sp>
+    <dsp:sp modelId="{37063086-67AD-4A60-816C-97A6EE25F88E}">
+      <dsp:nvSpPr>
+        <dsp:cNvPr id="0" name=""/>
+        <dsp:cNvSpPr/>
+      </dsp:nvSpPr>
+      <dsp:spPr>
+        <a:xfrm>
+          <a:off x="4722902" y="3429000"/>
+          <a:ext cx="6635976" cy="2743200"/>
+        </a:xfrm>
+        <a:prstGeom prst="roundRect">
+          <a:avLst>
+            <a:gd name="adj" fmla="val 10500"/>
+          </a:avLst>
+        </a:prstGeom>
+        <a:solidFill>
+          <a:srgbClr val="002060"/>
+        </a:solidFill>
+        <a:ln w="12700" cap="flat" cmpd="sng" algn="ctr">
+          <a:solidFill>
+            <a:schemeClr val="lt1">
+              <a:hueOff val="0"/>
+              <a:satOff val="0"/>
+              <a:lumOff val="0"/>
+              <a:alphaOff val="0"/>
+            </a:schemeClr>
+          </a:solidFill>
+          <a:prstDash val="solid"/>
+          <a:miter lim="800000"/>
+        </a:ln>
+        <a:effectLst/>
+      </dsp:spPr>
+      <dsp:style>
+        <a:lnRef idx="2">
+          <a:scrgbClr r="0" g="0" b="0"/>
+        </a:lnRef>
+        <a:fillRef idx="1">
+          <a:scrgbClr r="0" g="0" b="0"/>
+        </a:fillRef>
+        <a:effectRef idx="0">
+          <a:scrgbClr r="0" g="0" b="0"/>
+        </a:effectRef>
+        <a:fontRef idx="minor">
+          <a:schemeClr val="lt1"/>
+        </a:fontRef>
+      </dsp:style>
+      <dsp:txBody>
+        <a:bodyPr spcFirstLastPara="0" vert="horz" wrap="square" lIns="217170" tIns="217170" rIns="217170" bIns="1548384" numCol="1" spcCol="1270" anchor="t" anchorCtr="0">
+          <a:noAutofit/>
+        </a:bodyPr>
+        <a:lstStyle/>
+        <a:p>
+          <a:pPr marL="0" lvl="0" indent="0" algn="l" defTabSz="2533650">
+            <a:lnSpc>
+              <a:spcPct val="90000"/>
+            </a:lnSpc>
+            <a:spcBef>
+              <a:spcPct val="0"/>
+            </a:spcBef>
+            <a:spcAft>
+              <a:spcPct val="35000"/>
+            </a:spcAft>
+            <a:buNone/>
+          </a:pPr>
+          <a:r>
+            <a:rPr lang="pt-BR" sz="5700" kern="1200" dirty="0"/>
+            <a:t>Data </a:t>
+          </a:r>
+          <a:r>
+            <a:rPr lang="pt-BR" sz="5700" kern="1200" dirty="0" err="1"/>
+            <a:t>Engineering</a:t>
+          </a:r>
+          <a:endParaRPr lang="pt-BR" sz="5700" kern="1200" dirty="0"/>
+        </a:p>
+      </dsp:txBody>
+      <dsp:txXfrm>
+        <a:off x="4807265" y="3513363"/>
+        <a:ext cx="6467250" cy="2574474"/>
+      </dsp:txXfrm>
+    </dsp:sp>
+    <dsp:sp modelId="{17E6E08B-E2D6-4215-9A2A-1ED1E0193618}">
+      <dsp:nvSpPr>
+        <dsp:cNvPr id="0" name=""/>
+        <dsp:cNvSpPr/>
+      </dsp:nvSpPr>
+      <dsp:spPr>
+        <a:xfrm>
+          <a:off x="4888801" y="4663440"/>
+          <a:ext cx="3105915" cy="1234440"/>
+        </a:xfrm>
+        <a:prstGeom prst="roundRect">
+          <a:avLst>
+            <a:gd name="adj" fmla="val 10500"/>
+          </a:avLst>
+        </a:prstGeom>
+        <a:solidFill>
+          <a:schemeClr val="lt1">
+            <a:alpha val="90000"/>
+            <a:hueOff val="0"/>
+            <a:satOff val="0"/>
+            <a:lumOff val="0"/>
+            <a:alphaOff val="0"/>
+          </a:schemeClr>
+        </a:solidFill>
+        <a:ln w="12700" cap="flat" cmpd="sng" algn="ctr">
+          <a:solidFill>
+            <a:schemeClr val="accent1">
+              <a:hueOff val="0"/>
+              <a:satOff val="0"/>
+              <a:lumOff val="0"/>
+              <a:alphaOff val="0"/>
+            </a:schemeClr>
+          </a:solidFill>
+          <a:prstDash val="solid"/>
+          <a:miter lim="800000"/>
+        </a:ln>
+        <a:effectLst/>
+      </dsp:spPr>
+      <dsp:style>
+        <a:lnRef idx="2">
+          <a:scrgbClr r="0" g="0" b="0"/>
+        </a:lnRef>
+        <a:fillRef idx="1">
+          <a:scrgbClr r="0" g="0" b="0"/>
+        </a:fillRef>
+        <a:effectRef idx="0">
+          <a:scrgbClr r="0" g="0" b="0"/>
+        </a:effectRef>
+        <a:fontRef idx="minor"/>
+      </dsp:style>
+      <dsp:txBody>
+        <a:bodyPr spcFirstLastPara="0" vert="horz" wrap="square" lIns="95250" tIns="95250" rIns="95250" bIns="95250" numCol="1" spcCol="1270" anchor="ctr" anchorCtr="0">
+          <a:noAutofit/>
+        </a:bodyPr>
+        <a:lstStyle/>
+        <a:p>
+          <a:pPr marL="0" lvl="0" indent="0" algn="ctr" defTabSz="1111250">
+            <a:lnSpc>
+              <a:spcPct val="90000"/>
+            </a:lnSpc>
+            <a:spcBef>
+              <a:spcPct val="0"/>
+            </a:spcBef>
+            <a:spcAft>
+              <a:spcPct val="35000"/>
+            </a:spcAft>
+            <a:buNone/>
+          </a:pPr>
+          <a:r>
+            <a:rPr lang="pt-BR" sz="2500" kern="1200" dirty="0"/>
+            <a:t>Data </a:t>
+          </a:r>
+          <a:r>
+            <a:rPr lang="pt-BR" sz="2500" kern="1200" dirty="0" err="1"/>
+            <a:t>Collection</a:t>
+          </a:r>
+          <a:endParaRPr lang="pt-BR" sz="2500" kern="1200" dirty="0"/>
+        </a:p>
+      </dsp:txBody>
+      <dsp:txXfrm>
+        <a:off x="4926764" y="4701403"/>
+        <a:ext cx="3029989" cy="1158514"/>
+      </dsp:txXfrm>
+    </dsp:sp>
+    <dsp:sp modelId="{C9CD35B3-3901-4E3E-9883-F585D0ECABB5}">
+      <dsp:nvSpPr>
+        <dsp:cNvPr id="0" name=""/>
+        <dsp:cNvSpPr/>
+      </dsp:nvSpPr>
+      <dsp:spPr>
+        <a:xfrm>
+          <a:off x="8083079" y="4663440"/>
+          <a:ext cx="3105915" cy="1234440"/>
+        </a:xfrm>
+        <a:prstGeom prst="roundRect">
+          <a:avLst>
+            <a:gd name="adj" fmla="val 10500"/>
+          </a:avLst>
+        </a:prstGeom>
+        <a:solidFill>
+          <a:schemeClr val="lt1">
+            <a:alpha val="90000"/>
+            <a:hueOff val="0"/>
+            <a:satOff val="0"/>
+            <a:lumOff val="0"/>
+            <a:alphaOff val="0"/>
+          </a:schemeClr>
+        </a:solidFill>
+        <a:ln w="12700" cap="flat" cmpd="sng" algn="ctr">
+          <a:solidFill>
+            <a:schemeClr val="accent1">
+              <a:hueOff val="0"/>
+              <a:satOff val="0"/>
+              <a:lumOff val="0"/>
+              <a:alphaOff val="0"/>
+            </a:schemeClr>
+          </a:solidFill>
+          <a:prstDash val="solid"/>
+          <a:miter lim="800000"/>
+        </a:ln>
+        <a:effectLst/>
+      </dsp:spPr>
+      <dsp:style>
+        <a:lnRef idx="2">
+          <a:scrgbClr r="0" g="0" b="0"/>
+        </a:lnRef>
+        <a:fillRef idx="1">
+          <a:scrgbClr r="0" g="0" b="0"/>
+        </a:fillRef>
+        <a:effectRef idx="0">
+          <a:scrgbClr r="0" g="0" b="0"/>
+        </a:effectRef>
+        <a:fontRef idx="minor"/>
+      </dsp:style>
+      <dsp:txBody>
+        <a:bodyPr spcFirstLastPara="0" vert="horz" wrap="square" lIns="95250" tIns="95250" rIns="95250" bIns="95250" numCol="1" spcCol="1270" anchor="ctr" anchorCtr="0">
+          <a:noAutofit/>
+        </a:bodyPr>
+        <a:lstStyle/>
+        <a:p>
+          <a:pPr marL="0" lvl="0" indent="0" algn="ctr" defTabSz="1111250">
+            <a:lnSpc>
+              <a:spcPct val="90000"/>
+            </a:lnSpc>
+            <a:spcBef>
+              <a:spcPct val="0"/>
+            </a:spcBef>
+            <a:spcAft>
+              <a:spcPct val="35000"/>
+            </a:spcAft>
+            <a:buNone/>
+          </a:pPr>
+          <a:r>
+            <a:rPr lang="pt-BR" sz="2500" kern="1200" dirty="0"/>
+            <a:t>Data </a:t>
+          </a:r>
+          <a:r>
+            <a:rPr lang="pt-BR" sz="2500" kern="1200" dirty="0" err="1"/>
+            <a:t>Preparation</a:t>
+          </a:r>
+          <a:endParaRPr lang="pt-BR" sz="2500" kern="1200" dirty="0"/>
+        </a:p>
+      </dsp:txBody>
+      <dsp:txXfrm>
+        <a:off x="8121042" y="4701403"/>
+        <a:ext cx="3029989" cy="1158514"/>
+      </dsp:txXfrm>
+    </dsp:sp>
+  </dsp:spTree>
+</dsp:drawing>
+</file>
+
+<file path=ppt/diagrams/layout1.xml><?xml version="1.0" encoding="utf-8"?>
+<dgm:layoutDef xmlns:dgm="http://schemas.openxmlformats.org/drawingml/2006/diagram" xmlns:a="http://schemas.openxmlformats.org/drawingml/2006/main" uniqueId="urn:microsoft.com/office/officeart/2005/8/layout/target2">
+  <dgm:title val=""/>
+  <dgm:desc val=""/>
+  <dgm:catLst>
+    <dgm:cat type="relationship" pri="12000"/>
+  </dgm:catLst>
+  <dgm:sampData>
+    <dgm:dataModel>
+      <dgm:ptLst>
+        <dgm:pt modelId="0" type="doc"/>
+        <dgm:pt modelId="1">
+          <dgm:prSet phldr="1"/>
+        </dgm:pt>
+        <dgm:pt modelId="11">
+          <dgm:prSet phldr="1"/>
+        </dgm:pt>
+        <dgm:pt modelId="12">
+          <dgm:prSet phldr="1"/>
+        </dgm:pt>
+        <dgm:pt modelId="2">
+          <dgm:prSet phldr="1"/>
+        </dgm:pt>
+        <dgm:pt modelId="21">
+          <dgm:prSet phldr="1"/>
+        </dgm:pt>
+        <dgm:pt modelId="22">
+          <dgm:prSet phldr="1"/>
+        </dgm:pt>
+        <dgm:pt modelId="3">
+          <dgm:prSet phldr="1"/>
+        </dgm:pt>
+        <dgm:pt modelId="31">
+          <dgm:prSet phldr="1"/>
+        </dgm:pt>
+        <dgm:pt modelId="32">
+          <dgm:prSet phldr="1"/>
+        </dgm:pt>
+      </dgm:ptLst>
+      <dgm:cxnLst>
+        <dgm:cxn modelId="4" srcId="0" destId="1" srcOrd="0" destOrd="0"/>
+        <dgm:cxn modelId="5" srcId="0" destId="2" srcOrd="1" destOrd="0"/>
+        <dgm:cxn modelId="6" srcId="0" destId="3" srcOrd="2" destOrd="0"/>
+        <dgm:cxn modelId="13" srcId="1" destId="11" srcOrd="0" destOrd="0"/>
+        <dgm:cxn modelId="14" srcId="1" destId="12" srcOrd="1" destOrd="0"/>
+        <dgm:cxn modelId="23" srcId="2" destId="21" srcOrd="0" destOrd="0"/>
+        <dgm:cxn modelId="24" srcId="2" destId="22" srcOrd="1" destOrd="0"/>
+        <dgm:cxn modelId="33" srcId="3" destId="31" srcOrd="0" destOrd="0"/>
+        <dgm:cxn modelId="34" srcId="3" destId="32" srcOrd="1" destOrd="0"/>
+      </dgm:cxnLst>
+      <dgm:bg/>
+      <dgm:whole/>
+    </dgm:dataModel>
+  </dgm:sampData>
+  <dgm:styleData>
+    <dgm:dataModel>
+      <dgm:ptLst>
+        <dgm:pt modelId="0" type="doc"/>
+        <dgm:pt modelId="1"/>
+        <dgm:pt modelId="11"/>
+        <dgm:pt modelId="2"/>
+        <dgm:pt modelId="21"/>
+      </dgm:ptLst>
+      <dgm:cxnLst>
+        <dgm:cxn modelId="4" srcId="0" destId="1" srcOrd="0" destOrd="0"/>
+        <dgm:cxn modelId="5" srcId="0" destId="2" srcOrd="1" destOrd="0"/>
+        <dgm:cxn modelId="13" srcId="1" destId="11" srcOrd="0" destOrd="0"/>
+        <dgm:cxn modelId="23" srcId="2" destId="21" srcOrd="0" destOrd="0"/>
+      </dgm:cxnLst>
+      <dgm:bg/>
+      <dgm:whole/>
+    </dgm:dataModel>
+  </dgm:styleData>
+  <dgm:clrData>
+    <dgm:dataModel>
+      <dgm:ptLst>
+        <dgm:pt modelId="0" type="doc"/>
+        <dgm:pt modelId="1"/>
+        <dgm:pt modelId="11"/>
+        <dgm:pt modelId="2"/>
+        <dgm:pt modelId="21"/>
+        <dgm:pt modelId="3"/>
+        <dgm:pt modelId="31"/>
+        <dgm:pt modelId="4"/>
+        <dgm:pt modelId="41"/>
+      </dgm:ptLst>
+      <dgm:cxnLst>
+        <dgm:cxn modelId="5" srcId="0" destId="1" srcOrd="0" destOrd="0"/>
+        <dgm:cxn modelId="6" srcId="0" destId="2" srcOrd="1" destOrd="0"/>
+        <dgm:cxn modelId="7" srcId="0" destId="3" srcOrd="2" destOrd="0"/>
+        <dgm:cxn modelId="8" srcId="0" destId="4" srcOrd="3" destOrd="0"/>
+        <dgm:cxn modelId="13" srcId="1" destId="11" srcOrd="0" destOrd="0"/>
+        <dgm:cxn modelId="23" srcId="2" destId="21" srcOrd="0" destOrd="0"/>
+        <dgm:cxn modelId="33" srcId="3" destId="31" srcOrd="0" destOrd="0"/>
+        <dgm:cxn modelId="43" srcId="4" destId="41" srcOrd="0" destOrd="0"/>
+      </dgm:cxnLst>
+      <dgm:bg/>
+      <dgm:whole/>
+    </dgm:dataModel>
+  </dgm:clrData>
+  <dgm:layoutNode name="Name0">
+    <dgm:varLst>
+      <dgm:chMax val="3"/>
+      <dgm:chPref val="1"/>
+      <dgm:dir/>
+      <dgm:animLvl val="lvl"/>
+      <dgm:resizeHandles/>
+    </dgm:varLst>
+    <dgm:alg type="composite">
+      <dgm:param type="horzAlign" val="none"/>
+      <dgm:param type="vertAlign" val="none"/>
+    </dgm:alg>
+    <dgm:shape xmlns:r="http://schemas.openxmlformats.org/officeDocument/2006/relationships" r:blip="">
+      <dgm:adjLst/>
+    </dgm:shape>
+    <dgm:presOf/>
+    <dgm:choose name="Name1">
+      <dgm:if name="Name2" func="var" arg="dir" op="equ" val="norm">
+        <dgm:choose name="Name3">
+          <dgm:if name="Name4" axis="ch ch" ptType="node node" st="1 1" cnt="1 0" func="cnt" op="gt" val="0">
+            <dgm:choose name="Name5">
+              <dgm:if name="Name6" axis="ch ch" ptType="node node" st="2 1" cnt="1 0" func="cnt" op="gt" val="0">
+                <dgm:constrLst>
+                  <dgm:constr type="primFontSz" for="des" forName="middleBoxParent" val="65"/>
+                  <dgm:constr type="primFontSz" for="des" forName="mChild" val="65"/>
+                  <dgm:constr type="primFontSz" for="des" forName="outerBoxParent" refType="primFontSz" refFor="des" refForName="middleBoxParent" op="equ"/>
+                  <dgm:constr type="primFontSz" for="des" forName="centerBoxParent" refType="primFontSz" refFor="des" refForName="middleBoxParent" op="equ"/>
+                  <dgm:constr type="primFontSz" for="des" forName="oChild" refType="primFontSz" refFor="des" refForName="mChild" op="equ"/>
+                  <dgm:constr type="primFontSz" for="des" forName="cChild" refType="primFontSz" refFor="des" refForName="mChild" op="equ"/>
+                  <dgm:constr type="l" for="ch" forName="outerBox"/>
+                  <dgm:constr type="t" for="ch" forName="outerBox"/>
+                  <dgm:constr type="w" for="ch" forName="outerBox" refType="w"/>
+                  <dgm:constr type="h" for="ch" forName="outerBox" refType="h"/>
+                  <dgm:constr type="l" for="ch" forName="middleBox" refType="w" fact="0.2"/>
+                  <dgm:constr type="t" for="ch" forName="middleBox" refType="h" fact="0.25"/>
+                  <dgm:constr type="w" for="ch" forName="middleBox" refType="w" fact="0.775"/>
+                  <dgm:constr type="h" for="ch" forName="middleBox" refType="h" fact="0.7"/>
+                  <dgm:constr type="l" for="ch" forName="centerBox" refType="w" fact="0.395"/>
+                  <dgm:constr type="t" for="ch" forName="centerBox" refType="h" fact="0.5"/>
+                  <dgm:constr type="w" for="ch" forName="centerBox" refType="w" fact="0.555"/>
+                  <dgm:constr type="h" for="ch" forName="centerBox" refType="h" fact="0.4"/>
+                  <dgm:constr type="userA" for="des" forName="outerSibTrans" refType="w"/>
+                  <dgm:constr type="userA" for="des" forName="middleSibTrans" refType="w"/>
+                  <dgm:constr type="userA" for="des" forName="centerSibTrans" refType="w"/>
+                </dgm:constrLst>
+              </dgm:if>
+              <dgm:else name="Name7">
+                <dgm:constrLst>
+                  <dgm:constr type="primFontSz" for="des" forName="middleBoxParent" val="65"/>
+                  <dgm:constr type="primFontSz" for="des" forName="mChild" val="65"/>
+                  <dgm:constr type="primFontSz" for="des" forName="outerBoxParent" refType="primFontSz" refFor="des" refForName="middleBoxParent" op="equ"/>
+                  <dgm:constr type="primFontSz" for="des" forName="centerBoxParent" refType="primFontSz" refFor="des" refForName="middleBoxParent" op="equ"/>
+                  <dgm:constr type="primFontSz" for="des" forName="oChild" refType="primFontSz" refFor="des" refForName="mChild" op="equ"/>
+                  <dgm:constr type="primFontSz" for="des" forName="cChild" refType="primFontSz" refFor="des" refForName="mChild" op="equ"/>
+                  <dgm:constr type="l" for="ch" forName="outerBox"/>
+                  <dgm:constr type="t" for="ch" forName="outerBox"/>
+                  <dgm:constr type="w" for="ch" forName="outerBox" refType="w"/>
+                  <dgm:constr type="h" for="ch" forName="outerBox" refType="h"/>
+                  <dgm:constr type="l" for="ch" forName="middleBox" refType="w" fact="0.2"/>
+                  <dgm:constr type="t" for="ch" forName="middleBox" refType="h" fact="0.25"/>
+                  <dgm:constr type="w" for="ch" forName="middleBox" refType="w" fact="0.775"/>
+                  <dgm:constr type="h" for="ch" forName="middleBox" refType="h" fact="0.7"/>
+                  <dgm:constr type="l" for="ch" forName="centerBox" refType="w" fact="0.225"/>
+                  <dgm:constr type="t" for="ch" forName="centerBox" refType="h" fact="0.5"/>
+                  <dgm:constr type="w" for="ch" forName="centerBox" refType="w" fact="0.725"/>
+                  <dgm:constr type="h" for="ch" forName="centerBox" refType="h" fact="0.4"/>
+                  <dgm:constr type="userA" for="des" forName="outerSibTrans" refType="w"/>
+                  <dgm:constr type="userA" for="des" forName="middleSibTrans" refType="w"/>
+                  <dgm:constr type="userA" for="des" forName="centerSibTrans" refType="w"/>
+                </dgm:constrLst>
+              </dgm:else>
+            </dgm:choose>
+          </dgm:if>
+          <dgm:else name="Name8">
+            <dgm:choose name="Name9">
+              <dgm:if name="Name10" axis="ch ch" ptType="node node" st="2 1" cnt="1 0" func="cnt" op="gt" val="0">
+                <dgm:constrLst>
+                  <dgm:constr type="primFontSz" for="des" forName="middleBoxParent" val="65"/>
+                  <dgm:constr type="primFontSz" for="des" forName="mChild" val="65"/>
+                  <dgm:constr type="primFontSz" for="des" forName="outerBoxParent" refType="primFontSz" refFor="des" refForName="middleBoxParent" op="equ"/>
+                  <dgm:constr type="primFontSz" for="des" forName="centerBoxParent" refType="primFontSz" refFor="des" refForName="middleBoxParent" op="equ"/>
+                  <dgm:constr type="primFontSz" for="des" forName="oChild" refType="primFontSz" refFor="des" refForName="mChild" op="equ"/>
+                  <dgm:constr type="primFontSz" for="des" forName="cChild" refType="primFontSz" refFor="des" refForName="mChild" op="equ"/>
+                  <dgm:constr type="l" for="ch" forName="outerBox"/>
+                  <dgm:constr type="t" for="ch" forName="outerBox"/>
+                  <dgm:constr type="w" for="ch" forName="outerBox" refType="w"/>
+                  <dgm:constr type="h" for="ch" forName="outerBox" refType="h"/>
+                  <dgm:constr type="l" for="ch" forName="middleBox" refType="w" fact="0.025"/>
+                  <dgm:constr type="t" for="ch" forName="middleBox" refType="h" fact="0.25"/>
+                  <dgm:constr type="w" for="ch" forName="middleBox" refType="w" fact="0.95"/>
+                  <dgm:constr type="h" for="ch" forName="middleBox" refType="h" fact="0.7"/>
+                  <dgm:constr type="l" for="ch" forName="centerBox" refType="w" fact="0.26"/>
+                  <dgm:constr type="t" for="ch" forName="centerBox" refType="h" fact="0.5"/>
+                  <dgm:constr type="w" for="ch" forName="centerBox" refType="w" fact="0.69"/>
+                  <dgm:constr type="h" for="ch" forName="centerBox" refType="h" fact="0.4"/>
+                  <dgm:constr type="userA" for="des" forName="outerSibTrans" refType="w"/>
+                  <dgm:constr type="userA" for="des" forName="middleSibTrans" refType="w"/>
+                  <dgm:constr type="userA" for="des" forName="centerSibTrans" refType="w"/>
+                </dgm:constrLst>
+              </dgm:if>
+              <dgm:else name="Name11">
+                <dgm:constrLst>
+                  <dgm:constr type="primFontSz" for="des" forName="middleBoxParent" val="65"/>
+                  <dgm:constr type="primFontSz" for="des" forName="mChild" val="65"/>
+                  <dgm:constr type="primFontSz" for="des" forName="outerBoxParent" refType="primFontSz" refFor="des" refForName="middleBoxParent" op="equ"/>
+                  <dgm:constr type="primFontSz" for="des" forName="centerBoxParent" refType="primFontSz" refFor="des" refForName="middleBoxParent" op="equ"/>
+                  <dgm:constr type="primFontSz" for="des" forName="oChild" refType="primFontSz" refFor="des" refForName="mChild" op="equ"/>
+                  <dgm:constr type="primFontSz" for="des" forName="cChild" refType="primFontSz" refFor="des" refForName="mChild" op="equ"/>
+                  <dgm:constr type="l" for="ch" forName="outerBox"/>
+                  <dgm:constr type="t" for="ch" forName="outerBox"/>
+                  <dgm:constr type="w" for="ch" forName="outerBox" refType="w"/>
+                  <dgm:constr type="h" for="ch" forName="outerBox" refType="h"/>
+                  <dgm:constr type="l" for="ch" forName="middleBox" refType="w" fact="0.025"/>
+                  <dgm:constr type="t" for="ch" forName="middleBox" refType="h" fact="0.25"/>
+                  <dgm:constr type="w" for="ch" forName="middleBox" refType="w" fact="0.95"/>
+                  <dgm:constr type="h" for="ch" forName="middleBox" refType="h" fact="0.7"/>
+                  <dgm:constr type="l" for="ch" forName="centerBox" refType="w" fact="0.05"/>
+                  <dgm:constr type="t" for="ch" forName="centerBox" refType="h" fact="0.5"/>
+                  <dgm:constr type="w" for="ch" forName="centerBox" refType="w" fact="0.9"/>
+                  <dgm:constr type="h" for="ch" forName="centerBox" refType="h" fact="0.4"/>
+                  <dgm:constr type="userA" for="des" forName="outerSibTrans" refType="w"/>
+                  <dgm:constr type="userA" for="des" forName="middleSibTrans" refType="w"/>
+                  <dgm:constr type="userA" for="des" forName="centerSibTrans" refType="w"/>
+                </dgm:constrLst>
+              </dgm:else>
+            </dgm:choose>
+          </dgm:else>
+        </dgm:choose>
+      </dgm:if>
+      <dgm:else name="Name12">
+        <dgm:choose name="Name13">
+          <dgm:if name="Name14" axis="ch ch" ptType="node node" st="1 1" cnt="1 0" func="cnt" op="gt" val="0">
+            <dgm:choose name="Name15">
+              <dgm:if name="Name16" axis="ch ch" ptType="node node" st="2 1" cnt="1 0" func="cnt" op="gt" val="0">
+                <dgm:constrLst>
+                  <dgm:constr type="primFontSz" for="des" forName="middleBoxParent" val="65"/>
+                  <dgm:constr type="primFontSz" for="des" forName="mChild" val="65"/>
+                  <dgm:constr type="primFontSz" for="des" forName="outerBoxParent" refType="primFontSz" refFor="des" refForName="middleBoxParent" op="equ"/>
+                  <dgm:constr type="primFontSz" for="des" forName="centerBoxParent" refType="primFontSz" refFor="des" refForName="middleBoxParent" op="equ"/>
+                  <dgm:constr type="primFontSz" for="des" forName="oChild" refType="primFontSz" refFor="des" refForName="mChild" op="equ"/>
+                  <dgm:constr type="primFontSz" for="des" forName="cChild" refType="primFontSz" refFor="des" refForName="mChild" op="equ"/>
+                  <dgm:constr type="l" for="ch" forName="outerBox"/>
+                  <dgm:constr type="t" for="ch" forName="outerBox"/>
+                  <dgm:constr type="w" for="ch" forName="outerBox" refType="w"/>
+                  <dgm:constr type="h" for="ch" forName="outerBox" refType="h"/>
+                  <dgm:constr type="l" for="ch" forName="middleBox" refType="w" fact="0.025"/>
+                  <dgm:constr type="t" for="ch" forName="middleBox" refType="h" fact="0.25"/>
+                  <dgm:constr type="w" for="ch" forName="middleBox" refType="w" fact="0.775"/>
+                  <dgm:constr type="h" for="ch" forName="middleBox" refType="h" fact="0.7"/>
+                  <dgm:constr type="l" for="ch" forName="centerBox" refType="w" fact="0.05"/>
+                  <dgm:constr type="t" for="ch" forName="centerBox" refType="h" fact="0.5"/>
+                  <dgm:constr type="w" for="ch" forName="centerBox" refType="w" fact="0.55"/>
+                  <dgm:constr type="h" for="ch" forName="centerBox" refType="h" fact="0.4"/>
+                  <dgm:constr type="userA" for="des" forName="outerSibTrans" refType="w"/>
+                  <dgm:constr type="userA" for="des" forName="middleSibTrans" refType="w"/>
+                  <dgm:constr type="userA" for="des" forName="centerSibTrans" refType="w"/>
+                </dgm:constrLst>
+              </dgm:if>
+              <dgm:else name="Name17">
+                <dgm:constrLst>
+                  <dgm:constr type="primFontSz" for="des" forName="middleBoxParent" val="65"/>
+                  <dgm:constr type="primFontSz" for="des" forName="mChild" val="65"/>
+                  <dgm:constr type="primFontSz" for="des" forName="outerBoxParent" refType="primFontSz" refFor="des" refForName="middleBoxParent" op="equ"/>
+                  <dgm:constr type="primFontSz" for="des" forName="centerBoxParent" refType="primFontSz" refFor="des" refForName="middleBoxParent" op="equ"/>
+                  <dgm:constr type="primFontSz" for="des" forName="oChild" refType="primFontSz" refFor="des" refForName="mChild" op="equ"/>
+                  <dgm:constr type="primFontSz" for="des" forName="cChild" refType="primFontSz" refFor="des" refForName="mChild" op="equ"/>
+                  <dgm:constr type="l" for="ch" forName="outerBox"/>
+                  <dgm:constr type="t" for="ch" forName="outerBox"/>
+                  <dgm:constr type="w" for="ch" forName="outerBox" refType="w"/>
+                  <dgm:constr type="h" for="ch" forName="outerBox" refType="h"/>
+                  <dgm:constr type="l" for="ch" forName="middleBox" refType="w" fact="0.025"/>
+                  <dgm:constr type="t" for="ch" forName="middleBox" refType="h" fact="0.25"/>
+                  <dgm:constr type="w" for="ch" forName="middleBox" refType="w" fact="0.775"/>
+                  <dgm:constr type="h" for="ch" forName="middleBox" refType="h" fact="0.7"/>
+                  <dgm:constr type="l" for="ch" forName="centerBox" refType="w" fact="0.05"/>
+                  <dgm:constr type="t" for="ch" forName="centerBox" refType="h" fact="0.5"/>
+                  <dgm:constr type="w" for="ch" forName="centerBox" refType="w" fact="0.725"/>
+                  <dgm:constr type="h" for="ch" forName="centerBox" refType="h" fact="0.4"/>
+                  <dgm:constr type="userA" for="des" forName="outerSibTrans" refType="w"/>
+                  <dgm:constr type="userA" for="des" forName="middleSibTrans" refType="w"/>
+                  <dgm:constr type="userA" for="des" forName="centerSibTrans" refType="w"/>
+                </dgm:constrLst>
+              </dgm:else>
+            </dgm:choose>
+          </dgm:if>
+          <dgm:else name="Name18">
+            <dgm:choose name="Name19">
+              <dgm:if name="Name20" axis="ch ch" ptType="node node" st="2 1" cnt="1 0" func="cnt" op="gt" val="0">
+                <dgm:constrLst>
+                  <dgm:constr type="primFontSz" for="des" forName="middleBoxParent" val="65"/>
+                  <dgm:constr type="primFontSz" for="des" forName="mChild" val="65"/>
+                  <dgm:constr type="primFontSz" for="des" forName="outerBoxParent" refType="primFontSz" refFor="des" refForName="middleBoxParent" op="equ"/>
+                  <dgm:constr type="primFontSz" for="des" forName="centerBoxParent" refType="primFontSz" refFor="des" refForName="middleBoxParent" op="equ"/>
+                  <dgm:constr type="primFontSz" for="des" forName="oChild" refType="primFontSz" refFor="des" refForName="mChild" op="equ"/>
+                  <dgm:constr type="primFontSz" for="des" forName="cChild" refType="primFontSz" refFor="des" refForName="mChild" op="equ"/>
+                  <dgm:constr type="l" for="ch" forName="outerBox"/>
+                  <dgm:constr type="t" for="ch" forName="outerBox"/>
+                  <dgm:constr type="w" for="ch" forName="outerBox" refType="w"/>
+                  <dgm:constr type="h" for="ch" forName="outerBox" refType="h"/>
+                  <dgm:constr type="l" for="ch" forName="middleBox" refType="w" fact="0.025"/>
+                  <dgm:constr type="t" for="ch" forName="middleBox" refType="h" fact="0.25"/>
+                  <dgm:constr type="w" for="ch" forName="middleBox" refType="w" fact="0.95"/>
+                  <dgm:constr type="h" for="ch" forName="middleBox" refType="h" fact="0.7"/>
+                  <dgm:constr type="l" for="ch" forName="centerBox" refType="w" fact="0.05"/>
+                  <dgm:constr type="t" for="ch" forName="centerBox" refType="h" fact="0.5"/>
+                  <dgm:constr type="w" for="ch" forName="centerBox" refType="w" fact="0.69"/>
+                  <dgm:constr type="h" for="ch" forName="centerBox" refType="h" fact="0.4"/>
+                  <dgm:constr type="userA" for="des" forName="outerSibTrans" refType="w"/>
+                  <dgm:constr type="userA" for="des" forName="middleSibTrans" refType="w"/>
+                  <dgm:constr type="userA" for="des" forName="centerSibTrans" refType="w"/>
+                </dgm:constrLst>
+              </dgm:if>
+              <dgm:else name="Name21">
+                <dgm:constrLst>
+                  <dgm:constr type="primFontSz" for="des" forName="middleBoxParent" val="65"/>
+                  <dgm:constr type="primFontSz" for="des" forName="mChild" val="65"/>
+                  <dgm:constr type="primFontSz" for="des" forName="outerBoxParent" refType="primFontSz" refFor="des" refForName="middleBoxParent" op="equ"/>
+                  <dgm:constr type="primFontSz" for="des" forName="centerBoxParent" refType="primFontSz" refFor="des" refForName="middleBoxParent" op="equ"/>
+                  <dgm:constr type="primFontSz" for="des" forName="oChild" refType="primFontSz" refFor="des" refForName="mChild" op="equ"/>
+                  <dgm:constr type="primFontSz" for="des" forName="cChild" refType="primFontSz" refFor="des" refForName="mChild" op="equ"/>
+                  <dgm:constr type="l" for="ch" forName="outerBox"/>
+                  <dgm:constr type="t" for="ch" forName="outerBox"/>
+                  <dgm:constr type="w" for="ch" forName="outerBox" refType="w"/>
+                  <dgm:constr type="h" for="ch" forName="outerBox" refType="h"/>
+                  <dgm:constr type="l" for="ch" forName="middleBox" refType="w" fact="0.025"/>
+                  <dgm:constr type="t" for="ch" forName="middleBox" refType="h" fact="0.25"/>
+                  <dgm:constr type="w" for="ch" forName="middleBox" refType="w" fact="0.95"/>
+                  <dgm:constr type="h" for="ch" forName="middleBox" refType="h" fact="0.7"/>
+                  <dgm:constr type="l" for="ch" forName="centerBox" refType="w" fact="0.05"/>
+                  <dgm:constr type="t" for="ch" forName="centerBox" refType="h" fact="0.5"/>
+                  <dgm:constr type="w" for="ch" forName="centerBox" refType="w" fact="0.9"/>
+                  <dgm:constr type="h" for="ch" forName="centerBox" refType="h" fact="0.4"/>
+                  <dgm:constr type="userA" for="des" forName="outerSibTrans" refType="w"/>
+                  <dgm:constr type="userA" for="des" forName="middleSibTrans" refType="w"/>
+                  <dgm:constr type="userA" for="des" forName="centerSibTrans" refType="w"/>
+                </dgm:constrLst>
+              </dgm:else>
+            </dgm:choose>
+          </dgm:else>
+        </dgm:choose>
+      </dgm:else>
+    </dgm:choose>
+    <dgm:ruleLst/>
+    <dgm:choose name="Name22">
+      <dgm:if name="Name23" axis="root ch" ptType="all node" st="1 1" cnt="0 0" func="cnt" op="gte" val="1">
+        <dgm:layoutNode name="outerBox" styleLbl="node1">
+          <dgm:alg type="composite">
+            <dgm:param type="horzAlign" val="none"/>
+            <dgm:param type="vertAlign" val="none"/>
+          </dgm:alg>
+          <dgm:shape xmlns:r="http://schemas.openxmlformats.org/officeDocument/2006/relationships" r:blip="">
+            <dgm:adjLst/>
+          </dgm:shape>
+          <dgm:presOf/>
+          <dgm:choose name="Name24">
+            <dgm:if name="Name25" axis="root ch" ptType="all node" st="1 1" cnt="0 0" func="cnt" op="gt" val="1">
+              <dgm:choose name="Name26">
+                <dgm:if name="Name27" func="var" arg="dir" op="equ" val="norm">
+                  <dgm:constrLst>
+                    <dgm:constr type="l" for="ch" forName="outerBoxParent"/>
+                    <dgm:constr type="t" for="ch" forName="outerBoxParent"/>
+                    <dgm:constr type="w" for="ch" forName="outerBoxParent" refType="w"/>
+                    <dgm:constr type="h" for="ch" forName="outerBoxParent" refType="h"/>
+                    <dgm:constr type="bMarg" for="ch" forName="outerBoxParent" refType="h" fact="2.2"/>
+                    <dgm:constr type="l" for="ch" forName="outerBoxChildren" refType="w" fact="0.025"/>
+                    <dgm:constr type="t" for="ch" forName="outerBoxChildren" refType="h" fact="0.25"/>
+                    <dgm:constr type="w" for="ch" forName="outerBoxChildren" refType="w" fact="0.15"/>
+                    <dgm:constr type="h" for="ch" forName="outerBoxChildren" refType="h" fact="0.7"/>
+                  </dgm:constrLst>
+                </dgm:if>
+                <dgm:else name="Name28">
+                  <dgm:constrLst>
+                    <dgm:constr type="l" for="ch" forName="outerBoxParent"/>
+                    <dgm:constr type="t" for="ch" forName="outerBoxParent"/>
+                    <dgm:constr type="w" for="ch" forName="outerBoxParent" refType="w"/>
+                    <dgm:constr type="h" for="ch" forName="outerBoxParent" refType="h"/>
+                    <dgm:constr type="bMarg" for="ch" forName="outerBoxParent" refType="h" fact="2.2"/>
+                    <dgm:constr type="l" for="ch" forName="outerBoxChildren" refType="w" fact="0.825"/>
+                    <dgm:constr type="t" for="ch" forName="outerBoxChildren" refType="h" fact="0.25"/>
+                    <dgm:constr type="w" for="ch" forName="outerBoxChildren" refType="w" fact="0.15"/>
+                    <dgm:constr type="h" for="ch" forName="outerBoxChildren" refType="h" fact="0.7"/>
+                  </dgm:constrLst>
+                </dgm:else>
+              </dgm:choose>
+            </dgm:if>
+            <dgm:else name="Name29">
+              <dgm:constrLst>
+                <dgm:constr type="l" for="ch" forName="outerBoxParent"/>
+                <dgm:constr type="t" for="ch" forName="outerBoxParent"/>
+                <dgm:constr type="w" for="ch" forName="outerBoxParent" refType="w"/>
+                <dgm:constr type="h" for="ch" forName="outerBoxParent" refType="h"/>
+                <dgm:constr type="bMarg" for="ch" forName="outerBoxParent" refType="h" fact="1.75"/>
+                <dgm:constr type="l" for="ch" forName="outerBoxChildren" refType="w" fact="0.025"/>
+                <dgm:constr type="t" for="ch" forName="outerBoxChildren" refType="h" fact="0.45"/>
+                <dgm:constr type="w" for="ch" forName="outerBoxChildren" refType="w" fact="0.95"/>
+                <dgm:constr type="h" for="ch" forName="outerBoxChildren" refType="h" fact="0.45"/>
+              </dgm:constrLst>
+            </dgm:else>
+          </dgm:choose>
+          <dgm:ruleLst/>
+          <dgm:layoutNode name="outerBoxParent" styleLbl="node1">
+            <dgm:alg type="tx">
+              <dgm:param type="txAnchorVert" val="t"/>
+              <dgm:param type="parTxLTRAlign" val="l"/>
+              <dgm:param type="parTxRTLAlign" val="r"/>
+            </dgm:alg>
+            <dgm:shape xmlns:r="http://schemas.openxmlformats.org/officeDocument/2006/relationships" type="roundRect" r:blip="">
+              <dgm:adjLst>
+                <dgm:adj idx="1" val="0.085"/>
+              </dgm:adjLst>
+            </dgm:shape>
+            <dgm:presOf axis="ch" ptType="node" cnt="1"/>
+            <dgm:constrLst>
+              <dgm:constr type="tMarg" refType="primFontSz" fact="0.3"/>
+              <dgm:constr type="lMarg" refType="primFontSz" fact="0.3"/>
+              <dgm:constr type="rMarg" refType="primFontSz" fact="0.3"/>
+            </dgm:constrLst>
+            <dgm:ruleLst>
+              <dgm:rule type="primFontSz" val="5" fact="NaN" max="NaN"/>
+            </dgm:ruleLst>
+          </dgm:layoutNode>
+          <dgm:layoutNode name="outerBoxChildren">
+            <dgm:choose name="Name30">
+              <dgm:if name="Name31" axis="root ch" ptType="all node" st="1 1" cnt="0 0" func="cnt" op="gt" val="1">
+                <dgm:alg type="lin">
+                  <dgm:param type="linDir" val="fromT"/>
+                  <dgm:param type="vertAlign" val="t"/>
+                </dgm:alg>
+              </dgm:if>
+              <dgm:else name="Name32">
+                <dgm:choose name="Name33">
+                  <dgm:if name="Name34" func="var" arg="dir" op="equ" val="norm">
+                    <dgm:alg type="lin">
+                      <dgm:param type="horzAlign" val="l"/>
+                    </dgm:alg>
+                  </dgm:if>
+                  <dgm:else name="Name35">
+                    <dgm:alg type="lin">
+                      <dgm:param type="linDir" val="fromR"/>
+                      <dgm:param type="horzAlign" val="r"/>
+                    </dgm:alg>
+                  </dgm:else>
+                </dgm:choose>
+              </dgm:else>
+            </dgm:choose>
+            <dgm:shape xmlns:r="http://schemas.openxmlformats.org/officeDocument/2006/relationships" r:blip="">
+              <dgm:adjLst/>
+            </dgm:shape>
+            <dgm:presOf/>
+            <dgm:constrLst>
+              <dgm:constr type="w" for="ch" forName="oChild" refType="w"/>
+              <dgm:constr type="h" for="ch" forName="oChild" refType="h"/>
+            </dgm:constrLst>
+            <dgm:ruleLst/>
+            <dgm:forEach name="Name36" axis="ch ch" ptType="node node" st="1 1" cnt="1 0">
+              <dgm:layoutNode name="oChild" styleLbl="fgAcc1">
+                <dgm:varLst>
+                  <dgm:bulletEnabled val="1"/>
+                </dgm:varLst>
+                <dgm:alg type="tx"/>
+                <dgm:shape xmlns:r="http://schemas.openxmlformats.org/officeDocument/2006/relationships" type="roundRect" r:blip="">
+                  <dgm:adjLst>
+                    <dgm:adj idx="1" val="0.105"/>
+                  </dgm:adjLst>
+                </dgm:shape>
+                <dgm:presOf axis="desOrSelf" ptType="node"/>
+                <dgm:constrLst>
+                  <dgm:constr type="tMarg" refType="primFontSz" fact="0.3"/>
+                  <dgm:constr type="bMarg" refType="primFontSz" fact="0.3"/>
+                  <dgm:constr type="lMarg" refType="primFontSz" fact="0.3"/>
+                  <dgm:constr type="rMarg" refType="primFontSz" fact="0.3"/>
+                </dgm:constrLst>
+                <dgm:ruleLst>
+                  <dgm:rule type="primFontSz" val="5" fact="NaN" max="NaN"/>
+                </dgm:ruleLst>
+              </dgm:layoutNode>
+              <dgm:forEach name="Name37" axis="followSib" ptType="sibTrans" cnt="1">
+                <dgm:layoutNode name="outerSibTrans">
+                  <dgm:alg type="sp"/>
+                  <dgm:shape xmlns:r="http://schemas.openxmlformats.org/officeDocument/2006/relationships" r:blip="">
+                    <dgm:adjLst/>
+                  </dgm:shape>
+                  <dgm:presOf/>
+                  <dgm:constrLst>
+                    <dgm:constr type="userA"/>
+                    <dgm:constr type="w" refType="userA" fact="0.015"/>
+                    <dgm:constr type="h" refType="userA" fact="0.015"/>
+                  </dgm:constrLst>
+                  <dgm:ruleLst/>
+                </dgm:layoutNode>
+              </dgm:forEach>
+            </dgm:forEach>
+          </dgm:layoutNode>
+        </dgm:layoutNode>
+      </dgm:if>
+      <dgm:else name="Name38"/>
+    </dgm:choose>
+    <dgm:choose name="Name39">
+      <dgm:if name="Name40" axis="root ch" ptType="all node" st="1 1" cnt="0 0" func="cnt" op="gte" val="2">
+        <dgm:layoutNode name="middleBox">
+          <dgm:alg type="composite">
+            <dgm:param type="horzAlign" val="none"/>
+            <dgm:param type="vertAlign" val="none"/>
+          </dgm:alg>
+          <dgm:shape xmlns:r="http://schemas.openxmlformats.org/officeDocument/2006/relationships" r:blip="">
+            <dgm:adjLst/>
+          </dgm:shape>
+          <dgm:presOf/>
+          <dgm:choose name="Name41">
+            <dgm:if name="Name42" axis="root ch" ptType="all node" st="1 1" cnt="0 0" func="cnt" op="gt" val="2">
+              <dgm:choose name="Name43">
+                <dgm:if name="Name44" func="var" arg="dir" op="equ" val="norm">
+                  <dgm:constrLst>
+                    <dgm:constr type="l" for="ch" forName="middleBoxParent"/>
+                    <dgm:constr type="t" for="ch" forName="middleBoxParent"/>
+                    <dgm:constr type="w" for="ch" forName="middleBoxParent" refType="w"/>
+                    <dgm:constr type="h" for="ch" forName="middleBoxParent" refType="h"/>
+                    <dgm:constr type="bMarg" for="ch" forName="middleBoxParent" refType="h" fact="1.8"/>
+                    <dgm:constr type="l" for="ch" forName="middleBoxChildren" refType="w" fact="0.025"/>
+                    <dgm:constr type="t" for="ch" forName="middleBoxChildren" refType="h" fact="0.35"/>
+                    <dgm:constr type="w" for="ch" forName="middleBoxChildren" refType="w" fact="0.2"/>
+                    <dgm:constr type="h" for="ch" forName="middleBoxChildren" refType="h" fact="0.575"/>
+                  </dgm:constrLst>
+                </dgm:if>
+                <dgm:else name="Name45">
+                  <dgm:constrLst>
+                    <dgm:constr type="l" for="ch" forName="middleBoxParent"/>
+                    <dgm:constr type="t" for="ch" forName="middleBoxParent"/>
+                    <dgm:constr type="w" for="ch" forName="middleBoxParent" refType="w"/>
+                    <dgm:constr type="h" for="ch" forName="middleBoxParent" refType="h"/>
+                    <dgm:constr type="bMarg" for="ch" forName="middleBoxParent" refType="h" fact="1.8"/>
+                    <dgm:constr type="l" for="ch" forName="middleBoxChildren" refType="w" fact="0.775"/>
+                    <dgm:constr type="t" for="ch" forName="middleBoxChildren" refType="h" fact="0.35"/>
+                    <dgm:constr type="w" for="ch" forName="middleBoxChildren" refType="w" fact="0.2"/>
+                    <dgm:constr type="h" for="ch" forName="middleBoxChildren" refType="h" fact="0.575"/>
+                  </dgm:constrLst>
+                </dgm:else>
+              </dgm:choose>
+            </dgm:if>
+            <dgm:else name="Name46">
+              <dgm:constrLst>
+                <dgm:constr type="l" for="ch" forName="middleBoxParent"/>
+                <dgm:constr type="t" for="ch" forName="middleBoxParent"/>
+                <dgm:constr type="w" for="ch" forName="middleBoxParent" refType="w"/>
+                <dgm:constr type="h" for="ch" forName="middleBoxParent" refType="h"/>
+                <dgm:constr type="bMarg" for="ch" forName="middleBoxParent" refType="h" fact="1.8"/>
+                <dgm:constr type="l" for="ch" forName="middleBoxChildren" refType="w" fact="0.025"/>
+                <dgm:constr type="t" for="ch" forName="middleBoxChildren" refType="h" fact="0.45"/>
+                <dgm:constr type="w" for="ch" forName="middleBoxChildren" refType="w" fact="0.95"/>
+                <dgm:constr type="h" for="ch" forName="middleBoxChildren" refType="h" fact="0.45"/>
+              </dgm:constrLst>
+            </dgm:else>
+          </dgm:choose>
+          <dgm:ruleLst/>
+          <dgm:layoutNode name="middleBoxParent" styleLbl="node1">
+            <dgm:alg type="tx">
+              <dgm:param type="txAnchorVert" val="t"/>
+              <dgm:param type="parTxLTRAlign" val="l"/>
+              <dgm:param type="parTxRTLAlign" val="r"/>
+            </dgm:alg>
+            <dgm:shape xmlns:r="http://schemas.openxmlformats.org/officeDocument/2006/relationships" type="roundRect" r:blip="">
+              <dgm:adjLst>
+                <dgm:adj idx="1" val="0.105"/>
+              </dgm:adjLst>
+            </dgm:shape>
+            <dgm:presOf axis="ch" ptType="node" st="2" cnt="1"/>
+            <dgm:constrLst>
+              <dgm:constr type="tMarg" refType="primFontSz" fact="0.3"/>
+              <dgm:constr type="lMarg" refType="primFontSz" fact="0.3"/>
+              <dgm:constr type="rMarg" refType="primFontSz" fact="0.3"/>
+            </dgm:constrLst>
+            <dgm:ruleLst>
+              <dgm:rule type="primFontSz" val="5" fact="NaN" max="NaN"/>
+            </dgm:ruleLst>
+          </dgm:layoutNode>
+          <dgm:layoutNode name="middleBoxChildren">
+            <dgm:choose name="Name47">
+              <dgm:if name="Name48" axis="root ch" ptType="all node" st="1 1" cnt="0 0" func="cnt" op="gt" val="2">
+                <dgm:alg type="lin">
+                  <dgm:param type="linDir" val="fromT"/>
+                  <dgm:param type="vertAlign" val="t"/>
+                </dgm:alg>
+              </dgm:if>
+              <dgm:else name="Name49">
+                <dgm:choose name="Name50">
+                  <dgm:if name="Name51" func="var" arg="dir" op="equ" val="norm">
+                    <dgm:alg type="lin">
+                      <dgm:param type="horzAlign" val="l"/>
+                    </dgm:alg>
+                  </dgm:if>
+                  <dgm:else name="Name52">
+                    <dgm:alg type="lin">
+                      <dgm:param type="linDir" val="fromR"/>
+                      <dgm:param type="horzAlign" val="r"/>
+                    </dgm:alg>
+                  </dgm:else>
+                </dgm:choose>
+              </dgm:else>
+            </dgm:choose>
+            <dgm:shape xmlns:r="http://schemas.openxmlformats.org/officeDocument/2006/relationships" r:blip="">
+              <dgm:adjLst/>
+            </dgm:shape>
+            <dgm:presOf/>
+            <dgm:constrLst>
+              <dgm:constr type="w" for="ch" forName="mChild" refType="w"/>
+              <dgm:constr type="h" for="ch" forName="mChild" refType="h"/>
+            </dgm:constrLst>
+            <dgm:ruleLst/>
+            <dgm:forEach name="Name53" axis="ch ch" ptType="node node" st="2 1" cnt="1 0">
+              <dgm:layoutNode name="mChild" styleLbl="fgAcc1">
+                <dgm:varLst>
+                  <dgm:bulletEnabled val="1"/>
+                </dgm:varLst>
+                <dgm:alg type="tx"/>
+                <dgm:shape xmlns:r="http://schemas.openxmlformats.org/officeDocument/2006/relationships" type="roundRect" r:blip="">
+                  <dgm:adjLst>
+                    <dgm:adj idx="1" val="0.105"/>
+                  </dgm:adjLst>
+                </dgm:shape>
+                <dgm:presOf axis="desOrSelf" ptType="node"/>
+                <dgm:constrLst>
+                  <dgm:constr type="tMarg" refType="primFontSz" fact="0.3"/>
+                  <dgm:constr type="bMarg" refType="primFontSz" fact="0.3"/>
+                  <dgm:constr type="lMarg" refType="primFontSz" fact="0.3"/>
+                  <dgm:constr type="rMarg" refType="primFontSz" fact="0.3"/>
+                </dgm:constrLst>
+                <dgm:ruleLst>
+                  <dgm:rule type="primFontSz" val="5" fact="NaN" max="NaN"/>
+                </dgm:ruleLst>
+              </dgm:layoutNode>
+              <dgm:forEach name="Name54" axis="followSib" ptType="sibTrans" cnt="1">
+                <dgm:layoutNode name="middleSibTrans">
+                  <dgm:alg type="sp"/>
+                  <dgm:shape xmlns:r="http://schemas.openxmlformats.org/officeDocument/2006/relationships" r:blip="">
+                    <dgm:adjLst/>
+                  </dgm:shape>
+                  <dgm:presOf/>
+                  <dgm:constrLst>
+                    <dgm:constr type="userA"/>
+                    <dgm:constr type="w" refType="userA" fact="0.015"/>
+                    <dgm:constr type="h" refType="userA" fact="0.015"/>
+                  </dgm:constrLst>
+                  <dgm:ruleLst/>
+                </dgm:layoutNode>
+              </dgm:forEach>
+            </dgm:forEach>
+          </dgm:layoutNode>
+        </dgm:layoutNode>
+      </dgm:if>
+      <dgm:else name="Name55"/>
+    </dgm:choose>
+    <dgm:choose name="Name56">
+      <dgm:if name="Name57" axis="root ch" ptType="all node" st="1 1" cnt="0 0" func="cnt" op="gte" val="3">
+        <dgm:layoutNode name="centerBox">
+          <dgm:alg type="composite">
+            <dgm:param type="horzAlign" val="none"/>
+            <dgm:param type="vertAlign" val="none"/>
+          </dgm:alg>
+          <dgm:shape xmlns:r="http://schemas.openxmlformats.org/officeDocument/2006/relationships" r:blip="">
+            <dgm:adjLst/>
+          </dgm:shape>
+          <dgm:presOf/>
+          <dgm:choose name="Name58">
+            <dgm:if name="Name59" axis="ch ch" ptType="node node" st="3 1" cnt="1 0" func="cnt" op="gt" val="0">
+              <dgm:constrLst>
+                <dgm:constr type="l" for="ch" forName="centerBoxParent"/>
+                <dgm:constr type="t" for="ch" forName="centerBoxParent"/>
+                <dgm:constr type="w" for="ch" forName="centerBoxParent" refType="w"/>
+                <dgm:constr type="h" for="ch" forName="centerBoxParent" refType="h"/>
+                <dgm:constr type="bMarg" for="ch" forName="centerBoxParent" refType="h" fact="1.6"/>
+                <dgm:constr type="l" for="ch" forName="centerBoxChildren" refType="w" fact="0.025"/>
+                <dgm:constr type="t" for="ch" forName="centerBoxChildren" refType="h" fact="0.45"/>
+                <dgm:constr type="w" for="ch" forName="centerBoxChildren" refType="w" fact="0.95"/>
+                <dgm:constr type="h" for="ch" forName="centerBoxChildren" refType="h" fact="0.45"/>
+              </dgm:constrLst>
+            </dgm:if>
+            <dgm:else name="Name60">
+              <dgm:constrLst>
+                <dgm:constr type="l" for="ch" forName="centerBoxParent"/>
+                <dgm:constr type="t" for="ch" forName="centerBoxParent"/>
+                <dgm:constr type="w" for="ch" forName="centerBoxParent" refType="w"/>
+                <dgm:constr type="h" for="ch" forName="centerBoxParent" refType="h"/>
+              </dgm:constrLst>
+            </dgm:else>
+          </dgm:choose>
+          <dgm:ruleLst/>
+          <dgm:layoutNode name="centerBoxParent" styleLbl="node1">
+            <dgm:alg type="tx">
+              <dgm:param type="txAnchorVert" val="t"/>
+              <dgm:param type="parTxLTRAlign" val="l"/>
+              <dgm:param type="parTxRTLAlign" val="r"/>
+            </dgm:alg>
+            <dgm:shape xmlns:r="http://schemas.openxmlformats.org/officeDocument/2006/relationships" type="roundRect" r:blip="">
+              <dgm:adjLst>
+                <dgm:adj idx="1" val="0.105"/>
+              </dgm:adjLst>
+            </dgm:shape>
+            <dgm:presOf axis="ch" ptType="node" st="3" cnt="1"/>
+            <dgm:constrLst>
+              <dgm:constr type="tMarg" refType="primFontSz" fact="0.3"/>
+              <dgm:constr type="lMarg" refType="primFontSz" fact="0.3"/>
+              <dgm:constr type="rMarg" refType="primFontSz" fact="0.3"/>
+            </dgm:constrLst>
+            <dgm:ruleLst>
+              <dgm:rule type="primFontSz" val="5" fact="NaN" max="NaN"/>
+            </dgm:ruleLst>
+          </dgm:layoutNode>
+          <dgm:choose name="Name61">
+            <dgm:if name="Name62" axis="ch ch" ptType="node node" st="3 1" cnt="1 0" func="cnt" op="gt" val="0">
+              <dgm:layoutNode name="centerBoxChildren">
+                <dgm:choose name="Name63">
+                  <dgm:if name="Name64" func="var" arg="dir" op="equ" val="norm">
+                    <dgm:alg type="lin">
+                      <dgm:param type="horzAlign" val="l"/>
+                    </dgm:alg>
+                  </dgm:if>
+                  <dgm:else name="Name65">
+                    <dgm:alg type="lin">
+                      <dgm:param type="linDir" val="fromR"/>
+                      <dgm:param type="horzAlign" val="r"/>
+                    </dgm:alg>
+                  </dgm:else>
+                </dgm:choose>
+                <dgm:shape xmlns:r="http://schemas.openxmlformats.org/officeDocument/2006/relationships" r:blip="">
+                  <dgm:adjLst/>
+                </dgm:shape>
+                <dgm:presOf/>
+                <dgm:constrLst>
+                  <dgm:constr type="w" for="ch" forName="cChild" refType="w"/>
+                  <dgm:constr type="h" for="ch" forName="cChild" refType="h"/>
+                </dgm:constrLst>
+                <dgm:ruleLst/>
+                <dgm:forEach name="Name66" axis="ch ch" ptType="node node" st="3 1" cnt="1 0">
+                  <dgm:layoutNode name="cChild" styleLbl="fgAcc1">
+                    <dgm:varLst>
+                      <dgm:bulletEnabled val="1"/>
+                    </dgm:varLst>
+                    <dgm:alg type="tx"/>
+                    <dgm:shape xmlns:r="http://schemas.openxmlformats.org/officeDocument/2006/relationships" type="roundRect" r:blip="">
+                      <dgm:adjLst>
+                        <dgm:adj idx="1" val="0.105"/>
+                      </dgm:adjLst>
+                    </dgm:shape>
+                    <dgm:presOf axis="desOrSelf" ptType="node"/>
+                    <dgm:constrLst>
+                      <dgm:constr type="tMarg" refType="primFontSz" fact="0.3"/>
+                      <dgm:constr type="bMarg" refType="primFontSz" fact="0.3"/>
+                      <dgm:constr type="lMarg" refType="primFontSz" fact="0.3"/>
+                      <dgm:constr type="rMarg" refType="primFontSz" fact="0.3"/>
+                    </dgm:constrLst>
+                    <dgm:ruleLst>
+                      <dgm:rule type="primFontSz" val="5" fact="NaN" max="NaN"/>
+                    </dgm:ruleLst>
+                  </dgm:layoutNode>
+                  <dgm:forEach name="Name67" axis="followSib" ptType="sibTrans" cnt="1">
+                    <dgm:layoutNode name="centerSibTrans">
+                      <dgm:alg type="sp"/>
+                      <dgm:shape xmlns:r="http://schemas.openxmlformats.org/officeDocument/2006/relationships" r:blip="">
+                        <dgm:adjLst/>
+                      </dgm:shape>
+                      <dgm:presOf/>
+                      <dgm:constrLst>
+                        <dgm:constr type="userA"/>
+                        <dgm:constr type="w" refType="userA" fact="0.015"/>
+                        <dgm:constr type="h" refType="userA" fact="0.015"/>
+                      </dgm:constrLst>
+                      <dgm:ruleLst/>
+                    </dgm:layoutNode>
+                  </dgm:forEach>
+                </dgm:forEach>
+              </dgm:layoutNode>
+            </dgm:if>
+            <dgm:else name="Name68"/>
+          </dgm:choose>
+        </dgm:layoutNode>
+      </dgm:if>
+      <dgm:else name="Name69"/>
+    </dgm:choose>
+  </dgm:layoutNode>
+</dgm:layoutDef>
+</file>
+
+<file path=ppt/diagrams/quickStyle1.xml><?xml version="1.0" encoding="utf-8"?>
+<dgm:styleDef xmlns:dgm="http://schemas.openxmlformats.org/drawingml/2006/diagram" xmlns:a="http://schemas.openxmlformats.org/drawingml/2006/main" uniqueId="urn:microsoft.com/office/officeart/2005/8/quickstyle/simple1">
+  <dgm:title val=""/>
+  <dgm:desc val=""/>
+  <dgm:catLst>
+    <dgm:cat type="simple" pri="10100"/>
+  </dgm:catLst>
+  <dgm:scene3d>
+    <a:camera prst="orthographicFront"/>
+    <a:lightRig rig="threePt" dir="t"/>
+  </dgm:scene3d>
+  <dgm:styleLbl name="node0">
+    <dgm:scene3d>
+      <a:camera prst="orthographicFront"/>
+      <a:lightRig rig="threePt" dir="t"/>
+    </dgm:scene3d>
+    <dgm:sp3d/>
+    <dgm:txPr/>
+    <dgm:style>
+      <a:lnRef idx="2">
+        <a:scrgbClr r="0" g="0" b="0"/>
+      </a:lnRef>
+      <a:fillRef idx="1">
+        <a:scrgbClr r="0" g="0" b="0"/>
+      </a:fillRef>
+      <a:effectRef idx="0">
+        <a:scrgbClr r="0" g="0" b="0"/>
+      </a:effectRef>
+      <a:fontRef idx="minor">
+        <a:schemeClr val="lt1"/>
+      </a:fontRef>
+    </dgm:style>
+  </dgm:styleLbl>
+  <dgm:styleLbl name="lnNode1">
+    <dgm:scene3d>
+      <a:camera prst="orthographicFront"/>
+      <a:lightRig rig="threePt" dir="t"/>
+    </dgm:scene3d>
+    <dgm:sp3d/>
+    <dgm:txPr/>
+    <dgm:style>
+      <a:lnRef idx="2">
+        <a:scrgbClr r="0" g="0" b="0"/>
+      </a:lnRef>
+      <a:fillRef idx="1">
+        <a:scrgbClr r="0" g="0" b="0"/>
+      </a:fillRef>
+      <a:effectRef idx="0">
+        <a:scrgbClr r="0" g="0" b="0"/>
+      </a:effectRef>
+      <a:fontRef idx="minor">
+        <a:schemeClr val="lt1"/>
+      </a:fontRef>
+    </dgm:style>
+  </dgm:styleLbl>
+  <dgm:styleLbl name="vennNode1">
+    <dgm:scene3d>
+      <a:camera prst="orthographicFront"/>
+      <a:lightRig rig="threePt" dir="t"/>
+    </dgm:scene3d>
+    <dgm:sp3d/>
+    <dgm:txPr/>
+    <dgm:style>
+      <a:lnRef idx="2">
+        <a:scrgbClr r="0" g="0" b="0"/>
+      </a:lnRef>
+      <a:fillRef idx="1">
+        <a:scrgbClr r="0" g="0" b="0"/>
+      </a:fillRef>
+      <a:effectRef idx="0">
+        <a:scrgbClr r="0" g="0" b="0"/>
+      </a:effectRef>
+      <a:fontRef idx="minor">
+        <a:schemeClr val="tx1"/>
+      </a:fontRef>
+    </dgm:style>
+  </dgm:styleLbl>
+  <dgm:styleLbl name="alignNode1">
+    <dgm:scene3d>
+      <a:camera prst="orthographicFront"/>
+      <a:lightRig rig="threePt" dir="t"/>
+    </dgm:scene3d>
+    <dgm:sp3d/>
+    <dgm:txPr/>
+    <dgm:style>
+      <a:lnRef idx="2">
+        <a:scrgbClr r="0" g="0" b="0"/>
+      </a:lnRef>
+      <a:fillRef idx="1">
+        <a:scrgbClr r="0" g="0" b="0"/>
+      </a:fillRef>
+      <a:effectRef idx="0">
+        <a:scrgbClr r="0" g="0" b="0"/>
+      </a:effectRef>
+      <a:fontRef idx="minor">
+        <a:schemeClr val="lt1"/>
+      </a:fontRef>
+    </dgm:style>
+  </dgm:styleLbl>
+  <dgm:styleLbl name="node1">
+    <dgm:scene3d>
+      <a:camera prst="orthographicFront"/>
+      <a:lightRig rig="threePt" dir="t"/>
+    </dgm:scene3d>
+    <dgm:sp3d/>
+    <dgm:txPr/>
+    <dgm:style>
+      <a:lnRef idx="2">
+        <a:scrgbClr r="0" g="0" b="0"/>
+      </a:lnRef>
+      <a:fillRef idx="1">
+        <a:scrgbClr r="0" g="0" b="0"/>
+      </a:fillRef>
+      <a:effectRef idx="0">
+        <a:scrgbClr r="0" g="0" b="0"/>
+      </a:effectRef>
+      <a:fontRef idx="minor">
+        <a:schemeClr val="lt1"/>
+      </a:fontRef>
+    </dgm:style>
+  </dgm:styleLbl>
+  <dgm:styleLbl name="node2">
+    <dgm:scene3d>
+      <a:camera prst="orthographicFront"/>
+      <a:lightRig rig="threePt" dir="t"/>
+    </dgm:scene3d>
+    <dgm:sp3d/>
+    <dgm:txPr/>
+    <dgm:style>
+      <a:lnRef idx="2">
+        <a:scrgbClr r="0" g="0" b="0"/>
+      </a:lnRef>
+      <a:fillRef idx="1">
+        <a:scrgbClr r="0" g="0" b="0"/>
+      </a:fillRef>
+      <a:effectRef idx="0">
+        <a:scrgbClr r="0" g="0" b="0"/>
+      </a:effectRef>
+      <a:fontRef idx="minor">
+        <a:schemeClr val="lt1"/>
+      </a:fontRef>
+    </dgm:style>
+  </dgm:styleLbl>
+  <dgm:styleLbl name="node3">
+    <dgm:scene3d>
+      <a:camera prst="orthographicFront"/>
+      <a:lightRig rig="threePt" dir="t"/>
+    </dgm:scene3d>
+    <dgm:sp3d/>
+    <dgm:txPr/>
+    <dgm:style>
+      <a:lnRef idx="2">
+        <a:scrgbClr r="0" g="0" b="0"/>
+      </a:lnRef>
+      <a:fillRef idx="1">
+        <a:scrgbClr r="0" g="0" b="0"/>
+      </a:fillRef>
+      <a:effectRef idx="0">
+        <a:scrgbClr r="0" g="0" b="0"/>
+      </a:effectRef>
+      <a:fontRef idx="minor">
+        <a:schemeClr val="lt1"/>
+      </a:fontRef>
+    </dgm:style>
+  </dgm:styleLbl>
+  <dgm:styleLbl name="node4">
+    <dgm:scene3d>
+      <a:camera prst="orthographicFront"/>
+      <a:lightRig rig="threePt" dir="t"/>
+    </dgm:scene3d>
+    <dgm:sp3d/>
+    <dgm:txPr/>
+    <dgm:style>
+      <a:lnRef idx="2">
+        <a:scrgbClr r="0" g="0" b="0"/>
+      </a:lnRef>
+      <a:fillRef idx="1">
+        <a:scrgbClr r="0" g="0" b="0"/>
+      </a:fillRef>
+      <a:effectRef idx="0">
+        <a:scrgbClr r="0" g="0" b="0"/>
+      </a:effectRef>
+      <a:fontRef idx="minor">
+        <a:schemeClr val="lt1"/>
+      </a:fontRef>
+    </dgm:style>
+  </dgm:styleLbl>
+  <dgm:styleLbl name="fgImgPlace1">
+    <dgm:scene3d>
+      <a:camera prst="orthographicFront"/>
+      <a:lightRig rig="threePt" dir="t"/>
+    </dgm:scene3d>
+    <dgm:sp3d/>
+    <dgm:txPr/>
+    <dgm:style>
+      <a:lnRef idx="2">
+        <a:scrgbClr r="0" g="0" b="0"/>
+      </a:lnRef>
+      <a:fillRef idx="1">
+        <a:scrgbClr r="0" g="0" b="0"/>
+      </a:fillRef>
+      <a:effectRef idx="0">
+        <a:scrgbClr r="0" g="0" b="0"/>
+      </a:effectRef>
+      <a:fontRef idx="minor"/>
+    </dgm:style>
+  </dgm:styleLbl>
+  <dgm:styleLbl name="alignImgPlace1">
+    <dgm:scene3d>
+      <a:camera prst="orthographicFront"/>
+      <a:lightRig rig="threePt" dir="t"/>
+    </dgm:scene3d>
+    <dgm:sp3d/>
+    <dgm:txPr/>
+    <dgm:style>
+      <a:lnRef idx="2">
+        <a:scrgbClr r="0" g="0" b="0"/>
+      </a:lnRef>
+      <a:fillRef idx="1">
+        <a:scrgbClr r="0" g="0" b="0"/>
+      </a:fillRef>
+      <a:effectRef idx="0">
+        <a:scrgbClr r="0" g="0" b="0"/>
+      </a:effectRef>
+      <a:fontRef idx="minor"/>
+    </dgm:style>
+  </dgm:styleLbl>
+  <dgm:styleLbl name="bgImgPlace1">
+    <dgm:scene3d>
+      <a:camera prst="orthographicFront"/>
+      <a:lightRig rig="threePt" dir="t"/>
+    </dgm:scene3d>
+    <dgm:sp3d/>
+    <dgm:txPr/>
+    <dgm:style>
+      <a:lnRef idx="2">
+        <a:scrgbClr r="0" g="0" b="0"/>
+      </a:lnRef>
+      <a:fillRef idx="1">
+        <a:scrgbClr r="0" g="0" b="0"/>
+      </a:fillRef>
+      <a:effectRef idx="0">
+        <a:scrgbClr r="0" g="0" b="0"/>
+      </a:effectRef>
+      <a:fontRef idx="minor"/>
+    </dgm:style>
+  </dgm:styleLbl>
+  <dgm:styleLbl name="sibTrans2D1">
+    <dgm:scene3d>
+      <a:camera prst="orthographicFront"/>
+      <a:lightRig rig="threePt" dir="t"/>
+    </dgm:scene3d>
+    <dgm:sp3d/>
+    <dgm:txPr/>
+    <dgm:style>
+      <a:lnRef idx="0">
+        <a:scrgbClr r="0" g="0" b="0"/>
+      </a:lnRef>
+      <a:fillRef idx="1">
+        <a:scrgbClr r="0" g="0" b="0"/>
+      </a:fillRef>
+      <a:effectRef idx="0">
+        <a:scrgbClr r="0" g="0" b="0"/>
+      </a:effectRef>
+      <a:fontRef idx="minor">
+        <a:schemeClr val="lt1"/>
+      </a:fontRef>
+    </dgm:style>
+  </dgm:styleLbl>
+  <dgm:styleLbl name="fgSibTrans2D1">
+    <dgm:scene3d>
+      <a:camera prst="orthographicFront"/>
+      <a:lightRig rig="threePt" dir="t"/>
+    </dgm:scene3d>
+    <dgm:sp3d/>
+    <dgm:txPr/>
+    <dgm:style>
+      <a:lnRef idx="0">
+        <a:scrgbClr r="0" g="0" b="0"/>
+      </a:lnRef>
+      <a:fillRef idx="1">
+        <a:scrgbClr r="0" g="0" b="0"/>
+      </a:fillRef>
+      <a:effectRef idx="0">
+        <a:scrgbClr r="0" g="0" b="0"/>
+      </a:effectRef>
+      <a:fontRef idx="minor">
+        <a:schemeClr val="lt1"/>
+      </a:fontRef>
+    </dgm:style>
+  </dgm:styleLbl>
+  <dgm:styleLbl name="bgSibTrans2D1">
+    <dgm:scene3d>
+      <a:camera prst="orthographicFront"/>
+      <a:lightRig rig="threePt" dir="t"/>
+    </dgm:scene3d>
+    <dgm:sp3d/>
+    <dgm:txPr/>
+    <dgm:style>
+      <a:lnRef idx="0">
+        <a:scrgbClr r="0" g="0" b="0"/>
+      </a:lnRef>
+      <a:fillRef idx="1">
+        <a:scrgbClr r="0" g="0" b="0"/>
+      </a:fillRef>
+      <a:effectRef idx="0">
+        <a:scrgbClr r="0" g="0" b="0"/>
+      </a:effectRef>
+      <a:fontRef idx="minor">
+        <a:schemeClr val="lt1"/>
+      </a:fontRef>
+    </dgm:style>
+  </dgm:styleLbl>
+  <dgm:styleLbl name="sibTrans1D1">
+    <dgm:scene3d>
+      <a:camera prst="orthographicFront"/>
+      <a:lightRig rig="threePt" dir="t"/>
+    </dgm:scene3d>
+    <dgm:sp3d/>
+    <dgm:txPr/>
+    <dgm:style>
+      <a:lnRef idx="1">
+        <a:scrgbClr r="0" g="0" b="0"/>
+      </a:lnRef>
+      <a:fillRef idx="0">
+        <a:scrgbClr r="0" g="0" b="0"/>
+      </a:fillRef>
+      <a:effectRef idx="0">
+        <a:scrgbClr r="0" g="0" b="0"/>
+      </a:effectRef>
+      <a:fontRef idx="minor"/>
+    </dgm:style>
+  </dgm:styleLbl>
+  <dgm:styleLbl name="callout">
+    <dgm:scene3d>
+      <a:camera prst="orthographicFront"/>
+      <a:lightRig rig="threePt" dir="t"/>
+    </dgm:scene3d>
+    <dgm:sp3d/>
+    <dgm:txPr/>
+    <dgm:style>
+      <a:lnRef idx="2">
+        <a:scrgbClr r="0" g="0" b="0"/>
+      </a:lnRef>
+      <a:fillRef idx="1">
+        <a:scrgbClr r="0" g="0" b="0"/>
+      </a:fillRef>
+      <a:effectRef idx="0">
+        <a:scrgbClr r="0" g="0" b="0"/>
+      </a:effectRef>
+      <a:fontRef idx="minor"/>
+    </dgm:style>
+  </dgm:styleLbl>
+  <dgm:styleLbl name="asst0">
+    <dgm:scene3d>
+      <a:camera prst="orthographicFront"/>
+      <a:lightRig rig="threePt" dir="t"/>
+    </dgm:scene3d>
+    <dgm:sp3d/>
+    <dgm:txPr/>
+    <dgm:style>
+      <a:lnRef idx="2">
+        <a:scrgbClr r="0" g="0" b="0"/>
+      </a:lnRef>
+      <a:fillRef idx="1">
+        <a:scrgbClr r="0" g="0" b="0"/>
+      </a:fillRef>
+      <a:effectRef idx="0">
+        <a:scrgbClr r="0" g="0" b="0"/>
+      </a:effectRef>
+      <a:fontRef idx="minor">
+        <a:schemeClr val="lt1"/>
+      </a:fontRef>
+    </dgm:style>
+  </dgm:styleLbl>
+  <dgm:styleLbl name="asst1">
+    <dgm:scene3d>
+      <a:camera prst="orthographicFront"/>
+      <a:lightRig rig="threePt" dir="t"/>
+    </dgm:scene3d>
+    <dgm:sp3d/>
+    <dgm:txPr/>
+    <dgm:style>
+      <a:lnRef idx="2">
+        <a:scrgbClr r="0" g="0" b="0"/>
+      </a:lnRef>
+      <a:fillRef idx="1">
+        <a:scrgbClr r="0" g="0" b="0"/>
+      </a:fillRef>
+      <a:effectRef idx="0">
+        <a:scrgbClr r="0" g="0" b="0"/>
+      </a:effectRef>
+      <a:fontRef idx="minor">
+        <a:schemeClr val="lt1"/>
+      </a:fontRef>
+    </dgm:style>
+  </dgm:styleLbl>
+  <dgm:styleLbl name="asst2">
+    <dgm:scene3d>
+      <a:camera prst="orthographicFront"/>
+      <a:lightRig rig="threePt" dir="t"/>
+    </dgm:scene3d>
+    <dgm:sp3d/>
+    <dgm:txPr/>
+    <dgm:style>
+      <a:lnRef idx="2">
+        <a:scrgbClr r="0" g="0" b="0"/>
+      </a:lnRef>
+      <a:fillRef idx="1">
+        <a:scrgbClr r="0" g="0" b="0"/>
+      </a:fillRef>
+      <a:effectRef idx="0">
+        <a:scrgbClr r="0" g="0" b="0"/>
+      </a:effectRef>
+      <a:fontRef idx="minor">
+        <a:schemeClr val="lt1"/>
+      </a:fontRef>
+    </dgm:style>
+  </dgm:styleLbl>
+  <dgm:styleLbl name="asst3">
+    <dgm:scene3d>
+      <a:camera prst="orthographicFront"/>
+      <a:lightRig rig="threePt" dir="t"/>
+    </dgm:scene3d>
+    <dgm:sp3d/>
+    <dgm:txPr/>
+    <dgm:style>
+      <a:lnRef idx="2">
+        <a:scrgbClr r="0" g="0" b="0"/>
+      </a:lnRef>
+      <a:fillRef idx="1">
+        <a:scrgbClr r="0" g="0" b="0"/>
+      </a:fillRef>
+      <a:effectRef idx="0">
+        <a:scrgbClr r="0" g="0" b="0"/>
+      </a:effectRef>
+      <a:fontRef idx="minor">
+        <a:schemeClr val="lt1"/>
+      </a:fontRef>
+    </dgm:style>
+  </dgm:styleLbl>
+  <dgm:styleLbl name="asst4">
+    <dgm:scene3d>
+      <a:camera prst="orthographicFront"/>
+      <a:lightRig rig="threePt" dir="t"/>
+    </dgm:scene3d>
+    <dgm:sp3d/>
+    <dgm:txPr/>
+    <dgm:style>
+      <a:lnRef idx="2">
+        <a:scrgbClr r="0" g="0" b="0"/>
+      </a:lnRef>
+      <a:fillRef idx="1">
+        <a:scrgbClr r="0" g="0" b="0"/>
+      </a:fillRef>
+      <a:effectRef idx="0">
+        <a:scrgbClr r="0" g="0" b="0"/>
+      </a:effectRef>
+      <a:fontRef idx="minor">
+        <a:schemeClr val="lt1"/>
+      </a:fontRef>
+    </dgm:style>
+  </dgm:styleLbl>
+  <dgm:styleLbl name="parChTrans2D1">
+    <dgm:scene3d>
+      <a:camera prst="orthographicFront"/>
+      <a:lightRig rig="threePt" dir="t"/>
+    </dgm:scene3d>
+    <dgm:sp3d/>
+    <dgm:txPr/>
+    <dgm:style>
+      <a:lnRef idx="2">
+        <a:scrgbClr r="0" g="0" b="0"/>
+      </a:lnRef>
+      <a:fillRef idx="1">
+        <a:scrgbClr r="0" g="0" b="0"/>
+      </a:fillRef>
+      <a:effectRef idx="0">
+        <a:scrgbClr r="0" g="0" b="0"/>
+      </a:effectRef>
+      <a:fontRef idx="minor">
+        <a:schemeClr val="lt1"/>
+      </a:fontRef>
+    </dgm:style>
+  </dgm:styleLbl>
+  <dgm:styleLbl name="parChTrans2D2">
+    <dgm:scene3d>
+      <a:camera prst="orthographicFront"/>
+      <a:lightRig rig="threePt" dir="t"/>
+    </dgm:scene3d>
+    <dgm:sp3d/>
+    <dgm:txPr/>
+    <dgm:style>
+      <a:lnRef idx="2">
+        <a:scrgbClr r="0" g="0" b="0"/>
+      </a:lnRef>
+      <a:fillRef idx="1">
+        <a:scrgbClr r="0" g="0" b="0"/>
+      </a:fillRef>
+      <a:effectRef idx="0">
+        <a:scrgbClr r="0" g="0" b="0"/>
+      </a:effectRef>
+      <a:fontRef idx="minor">
+        <a:schemeClr val="lt1"/>
+      </a:fontRef>
+    </dgm:style>
+  </dgm:styleLbl>
+  <dgm:styleLbl name="parChTrans2D3">
+    <dgm:scene3d>
+      <a:camera prst="orthographicFront"/>
+      <a:lightRig rig="threePt" dir="t"/>
+    </dgm:scene3d>
+    <dgm:sp3d/>
+    <dgm:txPr/>
+    <dgm:style>
+      <a:lnRef idx="2">
+        <a:scrgbClr r="0" g="0" b="0"/>
+      </a:lnRef>
+      <a:fillRef idx="1">
+        <a:scrgbClr r="0" g="0" b="0"/>
+      </a:fillRef>
+      <a:effectRef idx="0">
+        <a:scrgbClr r="0" g="0" b="0"/>
+      </a:effectRef>
+      <a:fontRef idx="minor">
+        <a:schemeClr val="lt1"/>
+      </a:fontRef>
+    </dgm:style>
+  </dgm:styleLbl>
+  <dgm:styleLbl name="parChTrans2D4">
+    <dgm:scene3d>
+      <a:camera prst="orthographicFront"/>
+      <a:lightRig rig="threePt" dir="t"/>
+    </dgm:scene3d>
+    <dgm:sp3d/>
+    <dgm:txPr/>
+    <dgm:style>
+      <a:lnRef idx="2">
+        <a:scrgbClr r="0" g="0" b="0"/>
+      </a:lnRef>
+      <a:fillRef idx="1">
+        <a:scrgbClr r="0" g="0" b="0"/>
+      </a:fillRef>
+      <a:effectRef idx="0">
+        <a:scrgbClr r="0" g="0" b="0"/>
+      </a:effectRef>
+      <a:fontRef idx="minor">
+        <a:schemeClr val="lt1"/>
+      </a:fontRef>
+    </dgm:style>
+  </dgm:styleLbl>
+  <dgm:styleLbl name="parChTrans1D1">
+    <dgm:scene3d>
+      <a:camera prst="orthographicFront"/>
+      <a:lightRig rig="threePt" dir="t"/>
+    </dgm:scene3d>
+    <dgm:sp3d/>
+    <dgm:txPr/>
+    <dgm:style>
+      <a:lnRef idx="2">
+        <a:scrgbClr r="0" g="0" b="0"/>
+      </a:lnRef>
+      <a:fillRef idx="0">
+        <a:scrgbClr r="0" g="0" b="0"/>
+      </a:fillRef>
+      <a:effectRef idx="0">
+        <a:scrgbClr r="0" g="0" b="0"/>
+      </a:effectRef>
+      <a:fontRef idx="minor"/>
+    </dgm:style>
+  </dgm:styleLbl>
+  <dgm:styleLbl name="parChTrans1D2">
+    <dgm:scene3d>
+      <a:camera prst="orthographicFront"/>
+      <a:lightRig rig="threePt" dir="t"/>
+    </dgm:scene3d>
+    <dgm:sp3d/>
+    <dgm:txPr/>
+    <dgm:style>
+      <a:lnRef idx="2">
+        <a:scrgbClr r="0" g="0" b="0"/>
+      </a:lnRef>
+      <a:fillRef idx="0">
+        <a:scrgbClr r="0" g="0" b="0"/>
+      </a:fillRef>
+      <a:effectRef idx="0">
+        <a:scrgbClr r="0" g="0" b="0"/>
+      </a:effectRef>
+      <a:fontRef idx="minor"/>
+    </dgm:style>
+  </dgm:styleLbl>
+  <dgm:styleLbl name="parChTrans1D3">
+    <dgm:scene3d>
+      <a:camera prst="orthographicFront"/>
+      <a:lightRig rig="threePt" dir="t"/>
+    </dgm:scene3d>
+    <dgm:sp3d/>
+    <dgm:txPr/>
+    <dgm:style>
+      <a:lnRef idx="2">
+        <a:scrgbClr r="0" g="0" b="0"/>
+      </a:lnRef>
+      <a:fillRef idx="0">
+        <a:scrgbClr r="0" g="0" b="0"/>
+      </a:fillRef>
+      <a:effectRef idx="0">
+        <a:scrgbClr r="0" g="0" b="0"/>
+      </a:effectRef>
+      <a:fontRef idx="minor"/>
+    </dgm:style>
+  </dgm:styleLbl>
+  <dgm:styleLbl name="parChTrans1D4">
+    <dgm:scene3d>
+      <a:camera prst="orthographicFront"/>
+      <a:lightRig rig="threePt" dir="t"/>
+    </dgm:scene3d>
+    <dgm:sp3d/>
+    <dgm:txPr/>
+    <dgm:style>
+      <a:lnRef idx="2">
+        <a:scrgbClr r="0" g="0" b="0"/>
+      </a:lnRef>
+      <a:fillRef idx="0">
+        <a:scrgbClr r="0" g="0" b="0"/>
+      </a:fillRef>
+      <a:effectRef idx="0">
+        <a:scrgbClr r="0" g="0" b="0"/>
+      </a:effectRef>
+      <a:fontRef idx="minor"/>
+    </dgm:style>
+  </dgm:styleLbl>
+  <dgm:styleLbl name="fgAcc1">
+    <dgm:scene3d>
+      <a:camera prst="orthographicFront"/>
+      <a:lightRig rig="threePt" dir="t"/>
+    </dgm:scene3d>
+    <dgm:sp3d/>
+    <dgm:txPr/>
+    <dgm:style>
+      <a:lnRef idx="2">
+        <a:scrgbClr r="0" g="0" b="0"/>
+      </a:lnRef>
+      <a:fillRef idx="1">
+        <a:scrgbClr r="0" g="0" b="0"/>
+      </a:fillRef>
+      <a:effectRef idx="0">
+        <a:scrgbClr r="0" g="0" b="0"/>
+      </a:effectRef>
+      <a:fontRef idx="minor"/>
+    </dgm:style>
+  </dgm:styleLbl>
+  <dgm:styleLbl name="conFgAcc1">
+    <dgm:scene3d>
+      <a:camera prst="orthographicFront"/>
+      <a:lightRig rig="threePt" dir="t"/>
+    </dgm:scene3d>
+    <dgm:sp3d/>
+    <dgm:txPr/>
+    <dgm:style>
+      <a:lnRef idx="2">
+        <a:scrgbClr r="0" g="0" b="0"/>
+      </a:lnRef>
+      <a:fillRef idx="1">
+        <a:scrgbClr r="0" g="0" b="0"/>
+      </a:fillRef>
+      <a:effectRef idx="0">
+        <a:scrgbClr r="0" g="0" b="0"/>
+      </a:effectRef>
+      <a:fontRef idx="minor"/>
+    </dgm:style>
+  </dgm:styleLbl>
+  <dgm:styleLbl name="alignAcc1">
+    <dgm:scene3d>
+      <a:camera prst="orthographicFront"/>
+      <a:lightRig rig="threePt" dir="t"/>
+    </dgm:scene3d>
+    <dgm:sp3d/>
+    <dgm:txPr/>
+    <dgm:style>
+      <a:lnRef idx="2">
+        <a:scrgbClr r="0" g="0" b="0"/>
+      </a:lnRef>
+      <a:fillRef idx="1">
+        <a:scrgbClr r="0" g="0" b="0"/>
+      </a:fillRef>
+      <a:effectRef idx="0">
+        <a:scrgbClr r="0" g="0" b="0"/>
+      </a:effectRef>
+      <a:fontRef idx="minor"/>
+    </dgm:style>
+  </dgm:styleLbl>
+  <dgm:styleLbl name="trAlignAcc1">
+    <dgm:scene3d>
+      <a:camera prst="orthographicFront"/>
+      <a:lightRig rig="threePt" dir="t"/>
+    </dgm:scene3d>
+    <dgm:sp3d/>
+    <dgm:txPr/>
+    <dgm:style>
+      <a:lnRef idx="1">
+        <a:scrgbClr r="0" g="0" b="0"/>
+      </a:lnRef>
+      <a:fillRef idx="1">
+        <a:scrgbClr r="0" g="0" b="0"/>
+      </a:fillRef>
+      <a:effectRef idx="0">
+        <a:scrgbClr r="0" g="0" b="0"/>
+      </a:effectRef>
+      <a:fontRef idx="minor"/>
+    </dgm:style>
+  </dgm:styleLbl>
+  <dgm:styleLbl name="bgAcc1">
+    <dgm:scene3d>
+      <a:camera prst="orthographicFront"/>
+      <a:lightRig rig="threePt" dir="t"/>
+    </dgm:scene3d>
+    <dgm:sp3d/>
+    <dgm:txPr/>
+    <dgm:style>
+      <a:lnRef idx="2">
+        <a:scrgbClr r="0" g="0" b="0"/>
+      </a:lnRef>
+      <a:fillRef idx="1">
+        <a:scrgbClr r="0" g="0" b="0"/>
+      </a:fillRef>
+      <a:effectRef idx="0">
+        <a:scrgbClr r="0" g="0" b="0"/>
+      </a:effectRef>
+      <a:fontRef idx="minor"/>
+    </dgm:style>
+  </dgm:styleLbl>
+  <dgm:styleLbl name="solidFgAcc1">
+    <dgm:scene3d>
+      <a:camera prst="orthographicFront"/>
+      <a:lightRig rig="threePt" dir="t"/>
+    </dgm:scene3d>
+    <dgm:sp3d/>
+    <dgm:txPr/>
+    <dgm:style>
+      <a:lnRef idx="2">
+        <a:scrgbClr r="0" g="0" b="0"/>
+      </a:lnRef>
+      <a:fillRef idx="1">
+        <a:scrgbClr r="0" g="0" b="0"/>
+      </a:fillRef>
+      <a:effectRef idx="0">
+        <a:scrgbClr r="0" g="0" b="0"/>
+      </a:effectRef>
+      <a:fontRef idx="minor"/>
+    </dgm:style>
+  </dgm:styleLbl>
+  <dgm:styleLbl name="solidAlignAcc1">
+    <dgm:scene3d>
+      <a:camera prst="orthographicFront"/>
+      <a:lightRig rig="threePt" dir="t"/>
+    </dgm:scene3d>
+    <dgm:sp3d/>
+    <dgm:txPr/>
+    <dgm:style>
+      <a:lnRef idx="2">
+        <a:scrgbClr r="0" g="0" b="0"/>
+      </a:lnRef>
+      <a:fillRef idx="1">
+        <a:scrgbClr r="0" g="0" b="0"/>
+      </a:fillRef>
+      <a:effectRef idx="0">
+        <a:scrgbClr r="0" g="0" b="0"/>
+      </a:effectRef>
+      <a:fontRef idx="minor"/>
+    </dgm:style>
+  </dgm:styleLbl>
+  <dgm:styleLbl name="solidBgAcc1">
+    <dgm:scene3d>
+      <a:camera prst="orthographicFront"/>
+      <a:lightRig rig="threePt" dir="t"/>
+    </dgm:scene3d>
+    <dgm:sp3d/>
+    <dgm:txPr/>
+    <dgm:style>
+      <a:lnRef idx="2">
+        <a:scrgbClr r="0" g="0" b="0"/>
+      </a:lnRef>
+      <a:fillRef idx="1">
+        <a:scrgbClr r="0" g="0" b="0"/>
+      </a:fillRef>
+      <a:effectRef idx="0">
+        <a:scrgbClr r="0" g="0" b="0"/>
+      </a:effectRef>
+      <a:fontRef idx="minor"/>
+    </dgm:style>
+  </dgm:styleLbl>
+  <dgm:styleLbl name="fgAccFollowNode1">
+    <dgm:scene3d>
+      <a:camera prst="orthographicFront"/>
+      <a:lightRig rig="threePt" dir="t"/>
+    </dgm:scene3d>
+    <dgm:sp3d/>
+    <dgm:txPr/>
+    <dgm:style>
+      <a:lnRef idx="2">
+        <a:scrgbClr r="0" g="0" b="0"/>
+      </a:lnRef>
+      <a:fillRef idx="1">
+        <a:scrgbClr r="0" g="0" b="0"/>
+      </a:fillRef>
+      <a:effectRef idx="0">
+        <a:scrgbClr r="0" g="0" b="0"/>
+      </a:effectRef>
+      <a:fontRef idx="minor"/>
+    </dgm:style>
+  </dgm:styleLbl>
+  <dgm:styleLbl name="alignAccFollowNode1">
+    <dgm:scene3d>
+      <a:camera prst="orthographicFront"/>
+      <a:lightRig rig="threePt" dir="t"/>
+    </dgm:scene3d>
+    <dgm:sp3d/>
+    <dgm:txPr/>
+    <dgm:style>
+      <a:lnRef idx="2">
+        <a:scrgbClr r="0" g="0" b="0"/>
+      </a:lnRef>
+      <a:fillRef idx="1">
+        <a:scrgbClr r="0" g="0" b="0"/>
+      </a:fillRef>
+      <a:effectRef idx="0">
+        <a:scrgbClr r="0" g="0" b="0"/>
+      </a:effectRef>
+      <a:fontRef idx="minor"/>
+    </dgm:style>
+  </dgm:styleLbl>
+  <dgm:styleLbl name="bgAccFollowNode1">
+    <dgm:scene3d>
+      <a:camera prst="orthographicFront"/>
+      <a:lightRig rig="threePt" dir="t"/>
+    </dgm:scene3d>
+    <dgm:sp3d/>
+    <dgm:txPr/>
+    <dgm:style>
+      <a:lnRef idx="2">
+        <a:scrgbClr r="0" g="0" b="0"/>
+      </a:lnRef>
+      <a:fillRef idx="1">
+        <a:scrgbClr r="0" g="0" b="0"/>
+      </a:fillRef>
+      <a:effectRef idx="0">
+        <a:scrgbClr r="0" g="0" b="0"/>
+      </a:effectRef>
+      <a:fontRef idx="minor"/>
+    </dgm:style>
+  </dgm:styleLbl>
+  <dgm:styleLbl name="fgAcc0">
+    <dgm:scene3d>
+      <a:camera prst="orthographicFront"/>
+      <a:lightRig rig="threePt" dir="t"/>
+    </dgm:scene3d>
+    <dgm:sp3d/>
+    <dgm:txPr/>
+    <dgm:style>
+      <a:lnRef idx="2">
+        <a:scrgbClr r="0" g="0" b="0"/>
+      </a:lnRef>
+      <a:fillRef idx="1">
+        <a:scrgbClr r="0" g="0" b="0"/>
+      </a:fillRef>
+      <a:effectRef idx="0">
+        <a:scrgbClr r="0" g="0" b="0"/>
+      </a:effectRef>
+      <a:fontRef idx="minor"/>
+    </dgm:style>
+  </dgm:styleLbl>
+  <dgm:styleLbl name="fgAcc2">
+    <dgm:scene3d>
+      <a:camera prst="orthographicFront"/>
+      <a:lightRig rig="threePt" dir="t"/>
+    </dgm:scene3d>
+    <dgm:sp3d/>
+    <dgm:txPr/>
+    <dgm:style>
+      <a:lnRef idx="2">
+        <a:scrgbClr r="0" g="0" b="0"/>
+      </a:lnRef>
+      <a:fillRef idx="1">
+        <a:scrgbClr r="0" g="0" b="0"/>
+      </a:fillRef>
+      <a:effectRef idx="0">
+        <a:scrgbClr r="0" g="0" b="0"/>
+      </a:effectRef>
+      <a:fontRef idx="minor"/>
+    </dgm:style>
+  </dgm:styleLbl>
+  <dgm:styleLbl name="fgAcc3">
+    <dgm:scene3d>
+      <a:camera prst="orthographicFront"/>
+      <a:lightRig rig="threePt" dir="t"/>
+    </dgm:scene3d>
+    <dgm:sp3d/>
+    <dgm:txPr/>
+    <dgm:style>
+      <a:lnRef idx="2">
+        <a:scrgbClr r="0" g="0" b="0"/>
+      </a:lnRef>
+      <a:fillRef idx="1">
+        <a:scrgbClr r="0" g="0" b="0"/>
+      </a:fillRef>
+      <a:effectRef idx="0">
+        <a:scrgbClr r="0" g="0" b="0"/>
+      </a:effectRef>
+      <a:fontRef idx="minor"/>
+    </dgm:style>
+  </dgm:styleLbl>
+  <dgm:styleLbl name="fgAcc4">
+    <dgm:scene3d>
+      <a:camera prst="orthographicFront"/>
+      <a:lightRig rig="threePt" dir="t"/>
+    </dgm:scene3d>
+    <dgm:sp3d/>
+    <dgm:txPr/>
+    <dgm:style>
+      <a:lnRef idx="2">
+        <a:scrgbClr r="0" g="0" b="0"/>
+      </a:lnRef>
+      <a:fillRef idx="1">
+        <a:scrgbClr r="0" g="0" b="0"/>
+      </a:fillRef>
+      <a:effectRef idx="0">
+        <a:scrgbClr r="0" g="0" b="0"/>
+      </a:effectRef>
+      <a:fontRef idx="minor"/>
+    </dgm:style>
+  </dgm:styleLbl>
+  <dgm:styleLbl name="bgShp">
+    <dgm:scene3d>
+      <a:camera prst="orthographicFront"/>
+      <a:lightRig rig="threePt" dir="t"/>
+    </dgm:scene3d>
+    <dgm:sp3d/>
+    <dgm:txPr/>
+    <dgm:style>
+      <a:lnRef idx="0">
+        <a:scrgbClr r="0" g="0" b="0"/>
+      </a:lnRef>
+      <a:fillRef idx="1">
+        <a:scrgbClr r="0" g="0" b="0"/>
+      </a:fillRef>
+      <a:effectRef idx="0">
+        <a:scrgbClr r="0" g="0" b="0"/>
+      </a:effectRef>
+      <a:fontRef idx="minor"/>
+    </dgm:style>
+  </dgm:styleLbl>
+  <dgm:styleLbl name="dkBgShp">
+    <dgm:scene3d>
+      <a:camera prst="orthographicFront"/>
+      <a:lightRig rig="threePt" dir="t"/>
+    </dgm:scene3d>
+    <dgm:sp3d/>
+    <dgm:txPr/>
+    <dgm:style>
+      <a:lnRef idx="0">
+        <a:scrgbClr r="0" g="0" b="0"/>
+      </a:lnRef>
+      <a:fillRef idx="1">
+        <a:scrgbClr r="0" g="0" b="0"/>
+      </a:fillRef>
+      <a:effectRef idx="0">
+        <a:scrgbClr r="0" g="0" b="0"/>
+      </a:effectRef>
+      <a:fontRef idx="minor"/>
+    </dgm:style>
+  </dgm:styleLbl>
+  <dgm:styleLbl name="trBgShp">
+    <dgm:scene3d>
+      <a:camera prst="orthographicFront"/>
+      <a:lightRig rig="threePt" dir="t"/>
+    </dgm:scene3d>
+    <dgm:sp3d/>
+    <dgm:txPr/>
+    <dgm:style>
+      <a:lnRef idx="0">
+        <a:scrgbClr r="0" g="0" b="0"/>
+      </a:lnRef>
+      <a:fillRef idx="1">
+        <a:scrgbClr r="0" g="0" b="0"/>
+      </a:fillRef>
+      <a:effectRef idx="0">
+        <a:scrgbClr r="0" g="0" b="0"/>
+      </a:effectRef>
+      <a:fontRef idx="minor"/>
+    </dgm:style>
+  </dgm:styleLbl>
+  <dgm:styleLbl name="fgShp">
+    <dgm:scene3d>
+      <a:camera prst="orthographicFront"/>
+      <a:lightRig rig="threePt" dir="t"/>
+    </dgm:scene3d>
+    <dgm:sp3d/>
+    <dgm:txPr/>
+    <dgm:style>
+      <a:lnRef idx="2">
+        <a:scrgbClr r="0" g="0" b="0"/>
+      </a:lnRef>
+      <a:fillRef idx="1">
+        <a:scrgbClr r="0" g="0" b="0"/>
+      </a:fillRef>
+      <a:effectRef idx="0">
+        <a:scrgbClr r="0" g="0" b="0"/>
+      </a:effectRef>
+      <a:fontRef idx="minor"/>
+    </dgm:style>
+  </dgm:styleLbl>
+  <dgm:styleLbl name="revTx">
+    <dgm:scene3d>
+      <a:camera prst="orthographicFront"/>
+      <a:lightRig rig="threePt" dir="t"/>
+    </dgm:scene3d>
+    <dgm:sp3d/>
+    <dgm:txPr/>
+    <dgm:style>
+      <a:lnRef idx="0">
+        <a:scrgbClr r="0" g="0" b="0"/>
+      </a:lnRef>
+      <a:fillRef idx="0">
+        <a:scrgbClr r="0" g="0" b="0"/>
+      </a:fillRef>
+      <a:effectRef idx="0">
+        <a:scrgbClr r="0" g="0" b="0"/>
+      </a:effectRef>
+      <a:fontRef idx="minor"/>
+    </dgm:style>
+  </dgm:styleLbl>
+</dgm:styleDef>
 </file>
 
 <file path=ppt/slideLayouts/slideLayout1.xml><?xml version="1.0" encoding="utf-8"?>
@@ -12971,6 +16798,64 @@
 </p:sld>
 </file>
 
+<file path=ppt/slides/slide14.xml><?xml version="1.0" encoding="utf-8"?>
+<p:sld xmlns:a="http://schemas.openxmlformats.org/drawingml/2006/main" xmlns:r="http://schemas.openxmlformats.org/officeDocument/2006/relationships" xmlns:p="http://schemas.openxmlformats.org/presentationml/2006/main">
+  <p:cSld>
+    <p:spTree>
+      <p:nvGrpSpPr>
+        <p:cNvPr id="1" name=""/>
+        <p:cNvGrpSpPr/>
+        <p:nvPr/>
+      </p:nvGrpSpPr>
+      <p:grpSpPr>
+        <a:xfrm>
+          <a:off x="0" y="0"/>
+          <a:ext cx="0" cy="0"/>
+          <a:chOff x="0" y="0"/>
+          <a:chExt cx="0" cy="0"/>
+        </a:xfrm>
+      </p:grpSpPr>
+      <p:graphicFrame>
+        <p:nvGraphicFramePr>
+          <p:cNvPr id="4" name="Diagrama 3">
+            <a:extLst>
+              <a:ext uri="{FF2B5EF4-FFF2-40B4-BE49-F238E27FC236}">
+                <a16:creationId xmlns:a16="http://schemas.microsoft.com/office/drawing/2014/main" id="{2C0B43B9-DC89-4B07-A45C-56BBDE528C09}"/>
+              </a:ext>
+            </a:extLst>
+          </p:cNvPr>
+          <p:cNvGraphicFramePr/>
+          <p:nvPr>
+            <p:extLst>
+              <p:ext uri="{D42A27DB-BD31-4B8C-83A1-F6EECF244321}">
+                <p14:modId xmlns:p14="http://schemas.microsoft.com/office/powerpoint/2010/main" val="3831007380"/>
+              </p:ext>
+            </p:extLst>
+          </p:nvPr>
+        </p:nvGraphicFramePr>
+        <p:xfrm>
+          <a:off x="0" y="0"/>
+          <a:ext cx="11956715" cy="6858001"/>
+        </p:xfrm>
+        <a:graphic>
+          <a:graphicData uri="http://schemas.openxmlformats.org/drawingml/2006/diagram">
+            <dgm:relIds xmlns:dgm="http://schemas.openxmlformats.org/drawingml/2006/diagram" xmlns:r="http://schemas.openxmlformats.org/officeDocument/2006/relationships" r:dm="rId2" r:lo="rId3" r:qs="rId4" r:cs="rId5"/>
+          </a:graphicData>
+        </a:graphic>
+      </p:graphicFrame>
+    </p:spTree>
+    <p:extLst>
+      <p:ext uri="{BB962C8B-B14F-4D97-AF65-F5344CB8AC3E}">
+        <p14:creationId xmlns:p14="http://schemas.microsoft.com/office/powerpoint/2010/main" val="2236599351"/>
+      </p:ext>
+    </p:extLst>
+  </p:cSld>
+  <p:clrMapOvr>
+    <a:masterClrMapping/>
+  </p:clrMapOvr>
+</p:sld>
+</file>
+
 <file path=ppt/slides/slide2.xml><?xml version="1.0" encoding="utf-8"?>
 <p:sld xmlns:a="http://schemas.openxmlformats.org/drawingml/2006/main" xmlns:r="http://schemas.openxmlformats.org/officeDocument/2006/relationships" xmlns:p="http://schemas.openxmlformats.org/presentationml/2006/main">
   <p:cSld>

</xml_diff>